<commit_message>
Added development environment option in Windows installer.
Switched to version 3.2.
</commit_message>
<xml_diff>
--- a/doc/tsduck-presentation.pptx
+++ b/doc/tsduck-presentation.pptx
@@ -5,10 +5,10 @@
     <p:sldMasterId id="2147483660" r:id="rId1"/>
   </p:sldMasterIdLst>
   <p:notesMasterIdLst>
-    <p:notesMasterId r:id="rId33"/>
+    <p:notesMasterId r:id="rId35"/>
   </p:notesMasterIdLst>
   <p:handoutMasterIdLst>
-    <p:handoutMasterId r:id="rId34"/>
+    <p:handoutMasterId r:id="rId36"/>
   </p:handoutMasterIdLst>
   <p:sldIdLst>
     <p:sldId id="256" r:id="rId2"/>
@@ -41,7 +41,9 @@
     <p:sldId id="284" r:id="rId29"/>
     <p:sldId id="285" r:id="rId30"/>
     <p:sldId id="286" r:id="rId31"/>
-    <p:sldId id="258" r:id="rId32"/>
+    <p:sldId id="288" r:id="rId32"/>
+    <p:sldId id="287" r:id="rId33"/>
+    <p:sldId id="258" r:id="rId34"/>
   </p:sldIdLst>
   <p:sldSz cx="9144000" cy="5143500" type="screen16x9"/>
   <p:notesSz cx="6858000" cy="9144000"/>
@@ -225,7 +227,7 @@
           <a:p>
             <a:fld id="{C55B0BA7-B0E2-4C07-8528-84B7AE1BAF72}" type="datetimeFigureOut">
               <a:rPr lang="en-US" smtClean="0"/>
-              <a:t>2017-06-30</a:t>
+              <a:t>2017-07-25</a:t>
             </a:fld>
             <a:endParaRPr lang="en-US"/>
           </a:p>
@@ -391,7 +393,7 @@
           <a:p>
             <a:fld id="{66F6DD61-880C-4F33-96A2-51E92479021F}" type="datetimeFigureOut">
               <a:rPr lang="en-US" smtClean="0"/>
-              <a:t>2017-06-30</a:t>
+              <a:t>2017-07-25</a:t>
             </a:fld>
             <a:endParaRPr lang="en-US" dirty="0"/>
           </a:p>
@@ -2742,6 +2744,174 @@
             <a:fld id="{C9210C38-A4D4-4515-9CA7-8160947F5FEA}" type="slidenum">
               <a:rPr lang="en-US" smtClean="0"/>
               <a:t>31</a:t>
+            </a:fld>
+            <a:endParaRPr lang="en-US" dirty="0"/>
+          </a:p>
+        </p:txBody>
+      </p:sp>
+    </p:spTree>
+    <p:extLst>
+      <p:ext uri="{BB962C8B-B14F-4D97-AF65-F5344CB8AC3E}">
+        <p14:creationId xmlns:p14="http://schemas.microsoft.com/office/powerpoint/2010/main" val="1966998389"/>
+      </p:ext>
+    </p:extLst>
+  </p:cSld>
+  <p:clrMapOvr>
+    <a:masterClrMapping/>
+  </p:clrMapOvr>
+</p:notes>
+</file>
+
+<file path=ppt/notesSlides/notesSlide32.xml><?xml version="1.0" encoding="utf-8"?>
+<p:notes xmlns:a="http://schemas.openxmlformats.org/drawingml/2006/main" xmlns:r="http://schemas.openxmlformats.org/officeDocument/2006/relationships" xmlns:p="http://schemas.openxmlformats.org/presentationml/2006/main">
+  <p:cSld>
+    <p:spTree>
+      <p:nvGrpSpPr>
+        <p:cNvPr id="1" name=""/>
+        <p:cNvGrpSpPr/>
+        <p:nvPr/>
+      </p:nvGrpSpPr>
+      <p:grpSpPr>
+        <a:xfrm>
+          <a:off x="0" y="0"/>
+          <a:ext cx="0" cy="0"/>
+          <a:chOff x="0" y="0"/>
+          <a:chExt cx="0" cy="0"/>
+        </a:xfrm>
+      </p:grpSpPr>
+      <p:sp>
+        <p:nvSpPr>
+          <p:cNvPr id="2" name="Espace réservé de l'image des diapositives 1"/>
+          <p:cNvSpPr>
+            <a:spLocks noGrp="1" noRot="1" noChangeAspect="1"/>
+          </p:cNvSpPr>
+          <p:nvPr>
+            <p:ph type="sldImg"/>
+          </p:nvPr>
+        </p:nvSpPr>
+        <p:spPr/>
+      </p:sp>
+      <p:sp>
+        <p:nvSpPr>
+          <p:cNvPr id="3" name="Espace réservé des commentaires 2"/>
+          <p:cNvSpPr>
+            <a:spLocks noGrp="1"/>
+          </p:cNvSpPr>
+          <p:nvPr>
+            <p:ph type="body" idx="1"/>
+          </p:nvPr>
+        </p:nvSpPr>
+        <p:spPr/>
+        <p:txBody>
+          <a:bodyPr/>
+          <a:lstStyle/>
+          <a:p>
+            <a:endParaRPr lang="en-US" dirty="0"/>
+          </a:p>
+        </p:txBody>
+      </p:sp>
+      <p:sp>
+        <p:nvSpPr>
+          <p:cNvPr id="4" name="Espace réservé du numéro de diapositive 3"/>
+          <p:cNvSpPr>
+            <a:spLocks noGrp="1"/>
+          </p:cNvSpPr>
+          <p:nvPr>
+            <p:ph type="sldNum" sz="quarter" idx="10"/>
+          </p:nvPr>
+        </p:nvSpPr>
+        <p:spPr/>
+        <p:txBody>
+          <a:bodyPr/>
+          <a:lstStyle/>
+          <a:p>
+            <a:fld id="{C9210C38-A4D4-4515-9CA7-8160947F5FEA}" type="slidenum">
+              <a:rPr lang="en-US" smtClean="0"/>
+              <a:t>32</a:t>
+            </a:fld>
+            <a:endParaRPr lang="en-US" dirty="0"/>
+          </a:p>
+        </p:txBody>
+      </p:sp>
+    </p:spTree>
+    <p:extLst>
+      <p:ext uri="{BB962C8B-B14F-4D97-AF65-F5344CB8AC3E}">
+        <p14:creationId xmlns:p14="http://schemas.microsoft.com/office/powerpoint/2010/main" val="1966998389"/>
+      </p:ext>
+    </p:extLst>
+  </p:cSld>
+  <p:clrMapOvr>
+    <a:masterClrMapping/>
+  </p:clrMapOvr>
+</p:notes>
+</file>
+
+<file path=ppt/notesSlides/notesSlide33.xml><?xml version="1.0" encoding="utf-8"?>
+<p:notes xmlns:a="http://schemas.openxmlformats.org/drawingml/2006/main" xmlns:r="http://schemas.openxmlformats.org/officeDocument/2006/relationships" xmlns:p="http://schemas.openxmlformats.org/presentationml/2006/main">
+  <p:cSld>
+    <p:spTree>
+      <p:nvGrpSpPr>
+        <p:cNvPr id="1" name=""/>
+        <p:cNvGrpSpPr/>
+        <p:nvPr/>
+      </p:nvGrpSpPr>
+      <p:grpSpPr>
+        <a:xfrm>
+          <a:off x="0" y="0"/>
+          <a:ext cx="0" cy="0"/>
+          <a:chOff x="0" y="0"/>
+          <a:chExt cx="0" cy="0"/>
+        </a:xfrm>
+      </p:grpSpPr>
+      <p:sp>
+        <p:nvSpPr>
+          <p:cNvPr id="2" name="Espace réservé de l'image des diapositives 1"/>
+          <p:cNvSpPr>
+            <a:spLocks noGrp="1" noRot="1" noChangeAspect="1"/>
+          </p:cNvSpPr>
+          <p:nvPr>
+            <p:ph type="sldImg"/>
+          </p:nvPr>
+        </p:nvSpPr>
+        <p:spPr/>
+      </p:sp>
+      <p:sp>
+        <p:nvSpPr>
+          <p:cNvPr id="3" name="Espace réservé des commentaires 2"/>
+          <p:cNvSpPr>
+            <a:spLocks noGrp="1"/>
+          </p:cNvSpPr>
+          <p:nvPr>
+            <p:ph type="body" idx="1"/>
+          </p:nvPr>
+        </p:nvSpPr>
+        <p:spPr/>
+        <p:txBody>
+          <a:bodyPr/>
+          <a:lstStyle/>
+          <a:p>
+            <a:endParaRPr lang="en-US" dirty="0"/>
+          </a:p>
+        </p:txBody>
+      </p:sp>
+      <p:sp>
+        <p:nvSpPr>
+          <p:cNvPr id="4" name="Espace réservé du numéro de diapositive 3"/>
+          <p:cNvSpPr>
+            <a:spLocks noGrp="1"/>
+          </p:cNvSpPr>
+          <p:nvPr>
+            <p:ph type="sldNum" sz="quarter" idx="10"/>
+          </p:nvPr>
+        </p:nvSpPr>
+        <p:spPr/>
+        <p:txBody>
+          <a:bodyPr/>
+          <a:lstStyle/>
+          <a:p>
+            <a:fld id="{C9210C38-A4D4-4515-9CA7-8160947F5FEA}" type="slidenum">
+              <a:rPr lang="en-US" smtClean="0"/>
+              <a:t>33</a:t>
             </a:fld>
             <a:endParaRPr lang="en-US" dirty="0"/>
           </a:p>
@@ -5213,7 +5383,7 @@
             </a:r>
             <a:r>
               <a:rPr lang="en-US" sz="1700" dirty="0" smtClean="0"/>
-              <a:t>3.1</a:t>
+              <a:t>3.2</a:t>
             </a:r>
             <a:endParaRPr lang="en-US" sz="1700" dirty="0"/>
           </a:p>
@@ -11641,20 +11811,23 @@
             <a:pPr lvl="2"/>
             <a:r>
               <a:rPr lang="en-US" dirty="0" smtClean="0"/>
-              <a:t>Doxygen-generated</a:t>
-            </a:r>
-          </a:p>
-          <a:p>
-            <a:pPr marL="896937" lvl="3" indent="0">
-              <a:buNone/>
-            </a:pPr>
+              <a:t>Doxygen-generated, see </a:t>
+            </a:r>
             <a:r>
               <a:rPr lang="en-US" dirty="0" smtClean="0">
                 <a:latin typeface="Consolas" panose="020B0609020204030204" pitchFamily="49" charset="0"/>
                 <a:cs typeface="Consolas" panose="020B0609020204030204" pitchFamily="49" charset="0"/>
                 <a:hlinkClick r:id="rId3"/>
               </a:rPr>
-              <a:t>https://tsduck.github.io/</a:t>
+              <a:t>https</a:t>
+            </a:r>
+            <a:r>
+              <a:rPr lang="en-US" dirty="0" smtClean="0">
+                <a:latin typeface="Consolas" panose="020B0609020204030204" pitchFamily="49" charset="0"/>
+                <a:cs typeface="Consolas" panose="020B0609020204030204" pitchFamily="49" charset="0"/>
+                <a:hlinkClick r:id="rId3"/>
+              </a:rPr>
+              <a:t>://tsduck.github.io/</a:t>
             </a:r>
             <a:r>
               <a:rPr lang="en-US" dirty="0" smtClean="0">
@@ -12285,21 +12458,8 @@
             </a:r>
             <a:r>
               <a:rPr lang="en-US" dirty="0" smtClean="0"/>
-              <a:t>64-bit Windows, use </a:t>
-            </a:r>
-            <a:r>
-              <a:rPr lang="en-US" dirty="0" smtClean="0"/>
-              <a:t>32-bit TSDuck </a:t>
-            </a:r>
-            <a:r>
-              <a:rPr lang="en-US" dirty="0" smtClean="0"/>
-              <a:t>if your </a:t>
-            </a:r>
-            <a:r>
-              <a:rPr lang="en-US" dirty="0" smtClean="0"/>
-              <a:t>DVB tuner driver is 32-bit only</a:t>
-            </a:r>
-            <a:endParaRPr lang="en-US" dirty="0" smtClean="0"/>
+              <a:t>64-bit Windows, use 32-bit TSDuck if your DVB tuner driver is 32-bit only</a:t>
+            </a:r>
           </a:p>
           <a:p>
             <a:pPr lvl="1"/>
@@ -12634,7 +12794,7 @@
           <a:p>
             <a:r>
               <a:rPr lang="en-US" dirty="0" smtClean="0"/>
-              <a:t>Using TSDuck as a library (1/2)</a:t>
+              <a:t>The TSDuck library</a:t>
             </a:r>
             <a:endParaRPr lang="en-US" dirty="0"/>
           </a:p>
@@ -12868,21 +13028,73 @@
           <a:p>
             <a:r>
               <a:rPr lang="en-US" dirty="0" smtClean="0"/>
-              <a:t>Used in an application outside TSDuck</a:t>
-            </a:r>
-          </a:p>
-          <a:p>
-            <a:r>
-              <a:rPr lang="en-US" dirty="0" smtClean="0"/>
-              <a:t>Typical Makefile (Linux, </a:t>
-            </a:r>
-            <a:r>
-              <a:rPr lang="en-US" dirty="0" err="1" smtClean="0"/>
-              <a:t>macOS</a:t>
-            </a:r>
-            <a:r>
-              <a:rPr lang="en-US" dirty="0" smtClean="0"/>
-              <a:t>)</a:t>
+              <a:t>Used in an application outside </a:t>
+            </a:r>
+            <a:r>
+              <a:rPr lang="en-US" dirty="0" smtClean="0"/>
+              <a:t>TSDuck</a:t>
+            </a:r>
+          </a:p>
+          <a:p>
+            <a:r>
+              <a:rPr lang="en-US" dirty="0" smtClean="0"/>
+              <a:t>Install the TSDuck development environment</a:t>
+            </a:r>
+          </a:p>
+          <a:p>
+            <a:pPr lvl="1"/>
+            <a:r>
+              <a:rPr lang="en-US" dirty="0" smtClean="0"/>
+              <a:t>Windows: “Development” option in installer</a:t>
+            </a:r>
+          </a:p>
+          <a:p>
+            <a:pPr lvl="1"/>
+            <a:r>
+              <a:rPr lang="en-US" dirty="0" smtClean="0"/>
+              <a:t>Ubuntu: package </a:t>
+            </a:r>
+            <a:r>
+              <a:rPr lang="en-US" dirty="0" err="1" smtClean="0">
+                <a:latin typeface="Consolas" panose="020B0609020204030204" pitchFamily="49" charset="0"/>
+                <a:cs typeface="Consolas" panose="020B0609020204030204" pitchFamily="49" charset="0"/>
+              </a:rPr>
+              <a:t>tsduck</a:t>
+            </a:r>
+            <a:r>
+              <a:rPr lang="en-US" dirty="0" smtClean="0">
+                <a:latin typeface="Consolas" panose="020B0609020204030204" pitchFamily="49" charset="0"/>
+                <a:cs typeface="Consolas" panose="020B0609020204030204" pitchFamily="49" charset="0"/>
+              </a:rPr>
+              <a:t>-dev</a:t>
+            </a:r>
+          </a:p>
+          <a:p>
+            <a:pPr lvl="1"/>
+            <a:r>
+              <a:rPr lang="en-US" dirty="0" smtClean="0"/>
+              <a:t>Fedora, Red Hat, CentOS: </a:t>
+            </a:r>
+            <a:r>
+              <a:rPr lang="en-US" dirty="0"/>
+              <a:t>package </a:t>
+            </a:r>
+            <a:r>
+              <a:rPr lang="en-US" dirty="0" err="1" smtClean="0">
+                <a:latin typeface="Consolas" panose="020B0609020204030204" pitchFamily="49" charset="0"/>
+                <a:cs typeface="Consolas" panose="020B0609020204030204" pitchFamily="49" charset="0"/>
+              </a:rPr>
+              <a:t>tsduck-devel</a:t>
+            </a:r>
+            <a:endParaRPr lang="en-US" dirty="0" smtClean="0">
+              <a:latin typeface="Consolas" panose="020B0609020204030204" pitchFamily="49" charset="0"/>
+              <a:cs typeface="Consolas" panose="020B0609020204030204" pitchFamily="49" charset="0"/>
+            </a:endParaRPr>
+          </a:p>
+          <a:p>
+            <a:r>
+              <a:rPr lang="en-US" dirty="0"/>
+              <a:t>Typical application source file</a:t>
             </a:r>
           </a:p>
           <a:p>
@@ -12895,7 +13107,21 @@
                 <a:latin typeface="Consolas" panose="020B0609020204030204" pitchFamily="49" charset="0"/>
                 <a:cs typeface="Consolas" panose="020B0609020204030204" pitchFamily="49" charset="0"/>
               </a:rPr>
-              <a:t># Include TSDuck makefile (adapt to your location)</a:t>
+              <a:t>#include "</a:t>
+            </a:r>
+            <a:r>
+              <a:rPr lang="en-US" sz="1600" b="1" dirty="0" err="1">
+                <a:latin typeface="Consolas" panose="020B0609020204030204" pitchFamily="49" charset="0"/>
+                <a:cs typeface="Consolas" panose="020B0609020204030204" pitchFamily="49" charset="0"/>
+              </a:rPr>
+              <a:t>tsduck.h</a:t>
+            </a:r>
+            <a:r>
+              <a:rPr lang="en-US" sz="1600" b="1" dirty="0">
+                <a:latin typeface="Consolas" panose="020B0609020204030204" pitchFamily="49" charset="0"/>
+                <a:cs typeface="Consolas" panose="020B0609020204030204" pitchFamily="49" charset="0"/>
+              </a:rPr>
+              <a:t>"</a:t>
             </a:r>
           </a:p>
           <a:p>
@@ -12908,148 +13134,20 @@
                 <a:latin typeface="Consolas" panose="020B0609020204030204" pitchFamily="49" charset="0"/>
                 <a:cs typeface="Consolas" panose="020B0609020204030204" pitchFamily="49" charset="0"/>
               </a:rPr>
-              <a:t>include $(HOME)/</a:t>
-            </a:r>
-            <a:r>
-              <a:rPr lang="en-US" sz="1600" b="1" dirty="0" err="1">
-                <a:latin typeface="Consolas" panose="020B0609020204030204" pitchFamily="49" charset="0"/>
-                <a:cs typeface="Consolas" panose="020B0609020204030204" pitchFamily="49" charset="0"/>
-              </a:rPr>
-              <a:t>tsduck</a:t>
-            </a:r>
-            <a:r>
-              <a:rPr lang="en-US" sz="1600" b="1" dirty="0">
-                <a:latin typeface="Consolas" panose="020B0609020204030204" pitchFamily="49" charset="0"/>
-                <a:cs typeface="Consolas" panose="020B0609020204030204" pitchFamily="49" charset="0"/>
-              </a:rPr>
-              <a:t>/</a:t>
-            </a:r>
-            <a:r>
-              <a:rPr lang="en-US" sz="1600" b="1" dirty="0" err="1">
-                <a:latin typeface="Consolas" panose="020B0609020204030204" pitchFamily="49" charset="0"/>
-                <a:cs typeface="Consolas" panose="020B0609020204030204" pitchFamily="49" charset="0"/>
-              </a:rPr>
-              <a:t>Makefile.tsduck</a:t>
+              <a:t>... application code </a:t>
+            </a:r>
+            <a:r>
+              <a:rPr lang="en-US" sz="1600" b="1" dirty="0" smtClean="0">
+                <a:latin typeface="Consolas" panose="020B0609020204030204" pitchFamily="49" charset="0"/>
+                <a:cs typeface="Consolas" panose="020B0609020204030204" pitchFamily="49" charset="0"/>
+              </a:rPr>
+              <a:t>...</a:t>
             </a:r>
             <a:endParaRPr lang="en-US" sz="1600" b="1" dirty="0">
               <a:latin typeface="Consolas" panose="020B0609020204030204" pitchFamily="49" charset="0"/>
               <a:cs typeface="Consolas" panose="020B0609020204030204" pitchFamily="49" charset="0"/>
             </a:endParaRPr>
           </a:p>
-          <a:p>
-            <a:pPr lvl="2">
-              <a:buFont typeface="Wingdings" pitchFamily="2" charset="2"/>
-              <a:buNone/>
-            </a:pPr>
-            <a:r>
-              <a:rPr lang="en-US" sz="1600" b="1" dirty="0" smtClean="0">
-                <a:latin typeface="Consolas" panose="020B0609020204030204" pitchFamily="49" charset="0"/>
-                <a:cs typeface="Consolas" panose="020B0609020204030204" pitchFamily="49" charset="0"/>
-              </a:rPr>
-              <a:t>default</a:t>
-            </a:r>
-            <a:r>
-              <a:rPr lang="en-US" sz="1600" b="1" dirty="0">
-                <a:latin typeface="Consolas" panose="020B0609020204030204" pitchFamily="49" charset="0"/>
-                <a:cs typeface="Consolas" panose="020B0609020204030204" pitchFamily="49" charset="0"/>
-              </a:rPr>
-              <a:t>: </a:t>
-            </a:r>
-            <a:r>
-              <a:rPr lang="en-US" sz="1600" b="1" i="1" dirty="0" err="1">
-                <a:latin typeface="Consolas" panose="020B0609020204030204" pitchFamily="49" charset="0"/>
-                <a:cs typeface="Consolas" panose="020B0609020204030204" pitchFamily="49" charset="0"/>
-              </a:rPr>
-              <a:t>myexec</a:t>
-            </a:r>
-            <a:endParaRPr lang="en-US" sz="1600" b="1" i="1" dirty="0">
-              <a:latin typeface="Consolas" panose="020B0609020204030204" pitchFamily="49" charset="0"/>
-              <a:cs typeface="Consolas" panose="020B0609020204030204" pitchFamily="49" charset="0"/>
-            </a:endParaRPr>
-          </a:p>
-          <a:p>
-            <a:pPr lvl="2">
-              <a:buFont typeface="Wingdings" pitchFamily="2" charset="2"/>
-              <a:buNone/>
-            </a:pPr>
-            <a:r>
-              <a:rPr lang="en-US" sz="1600" b="1" i="1" dirty="0" err="1">
-                <a:latin typeface="Consolas" panose="020B0609020204030204" pitchFamily="49" charset="0"/>
-                <a:cs typeface="Consolas" panose="020B0609020204030204" pitchFamily="49" charset="0"/>
-              </a:rPr>
-              <a:t>myexec</a:t>
-            </a:r>
-            <a:r>
-              <a:rPr lang="en-US" sz="1600" b="1" dirty="0">
-                <a:latin typeface="Consolas" panose="020B0609020204030204" pitchFamily="49" charset="0"/>
-                <a:cs typeface="Consolas" panose="020B0609020204030204" pitchFamily="49" charset="0"/>
-              </a:rPr>
-              <a:t>: $(LIBTSDUCK)</a:t>
-            </a:r>
-          </a:p>
-          <a:p>
-            <a:pPr lvl="2">
-              <a:buFont typeface="Wingdings" pitchFamily="2" charset="2"/>
-              <a:buNone/>
-            </a:pPr>
-            <a:r>
-              <a:rPr lang="en-US" sz="1600" b="1" i="1" dirty="0" smtClean="0">
-                <a:latin typeface="Consolas" panose="020B0609020204030204" pitchFamily="49" charset="0"/>
-                <a:cs typeface="Consolas" panose="020B0609020204030204" pitchFamily="49" charset="0"/>
-              </a:rPr>
-              <a:t>... application-specific rules ...</a:t>
-            </a:r>
-          </a:p>
-          <a:p>
-            <a:r>
-              <a:rPr lang="en-US" dirty="0" smtClean="0"/>
-              <a:t>Typical application source file</a:t>
-            </a:r>
-          </a:p>
-          <a:p>
-            <a:pPr lvl="2">
-              <a:buFont typeface="Wingdings" pitchFamily="2" charset="2"/>
-              <a:buNone/>
-            </a:pPr>
-            <a:r>
-              <a:rPr lang="en-US" sz="1600" b="1" dirty="0" smtClean="0">
-                <a:latin typeface="Consolas" panose="020B0609020204030204" pitchFamily="49" charset="0"/>
-                <a:cs typeface="Consolas" panose="020B0609020204030204" pitchFamily="49" charset="0"/>
-              </a:rPr>
-              <a:t>#include "</a:t>
-            </a:r>
-            <a:r>
-              <a:rPr lang="en-US" sz="1600" b="1" dirty="0" err="1" smtClean="0">
-                <a:latin typeface="Consolas" panose="020B0609020204030204" pitchFamily="49" charset="0"/>
-                <a:cs typeface="Consolas" panose="020B0609020204030204" pitchFamily="49" charset="0"/>
-              </a:rPr>
-              <a:t>tsduck.h</a:t>
-            </a:r>
-            <a:r>
-              <a:rPr lang="en-US" sz="1600" b="1" dirty="0" smtClean="0">
-                <a:latin typeface="Consolas" panose="020B0609020204030204" pitchFamily="49" charset="0"/>
-                <a:cs typeface="Consolas" panose="020B0609020204030204" pitchFamily="49" charset="0"/>
-              </a:rPr>
-              <a:t>"</a:t>
-            </a:r>
-          </a:p>
-          <a:p>
-            <a:pPr lvl="2">
-              <a:buFont typeface="Wingdings" pitchFamily="2" charset="2"/>
-              <a:buNone/>
-            </a:pPr>
-            <a:r>
-              <a:rPr lang="en-US" sz="1600" b="1" dirty="0" smtClean="0">
-                <a:latin typeface="Consolas" panose="020B0609020204030204" pitchFamily="49" charset="0"/>
-                <a:cs typeface="Consolas" panose="020B0609020204030204" pitchFamily="49" charset="0"/>
-              </a:rPr>
-              <a:t>... application code ...</a:t>
-            </a:r>
-            <a:endParaRPr lang="en-US" sz="1600" b="1" dirty="0">
-              <a:latin typeface="Consolas" panose="020B0609020204030204" pitchFamily="49" charset="0"/>
-              <a:cs typeface="Consolas" panose="020B0609020204030204" pitchFamily="49" charset="0"/>
-            </a:endParaRPr>
-          </a:p>
         </p:txBody>
       </p:sp>
       <p:sp>
@@ -13069,7 +13167,11 @@
           <a:p>
             <a:r>
               <a:rPr lang="en-US" dirty="0" smtClean="0"/>
-              <a:t>Using TSDuck as a library (2/2)</a:t>
+              <a:t>Using TSDuck as a </a:t>
+            </a:r>
+            <a:r>
+              <a:rPr lang="en-US" dirty="0" smtClean="0"/>
+              <a:t>library</a:t>
             </a:r>
             <a:endParaRPr lang="en-US" dirty="0"/>
           </a:p>
@@ -13108,6 +13210,432 @@
 </file>
 
 <file path=ppt/slides/slide31.xml><?xml version="1.0" encoding="utf-8"?>
+<p:sld xmlns:a="http://schemas.openxmlformats.org/drawingml/2006/main" xmlns:r="http://schemas.openxmlformats.org/officeDocument/2006/relationships" xmlns:p="http://schemas.openxmlformats.org/presentationml/2006/main">
+  <p:cSld>
+    <p:spTree>
+      <p:nvGrpSpPr>
+        <p:cNvPr id="1" name=""/>
+        <p:cNvGrpSpPr/>
+        <p:nvPr/>
+      </p:nvGrpSpPr>
+      <p:grpSpPr>
+        <a:xfrm>
+          <a:off x="0" y="0"/>
+          <a:ext cx="0" cy="0"/>
+          <a:chOff x="0" y="0"/>
+          <a:chExt cx="0" cy="0"/>
+        </a:xfrm>
+      </p:grpSpPr>
+      <p:sp>
+        <p:nvSpPr>
+          <p:cNvPr id="2" name="Espace réservé du contenu 1"/>
+          <p:cNvSpPr>
+            <a:spLocks noGrp="1"/>
+          </p:cNvSpPr>
+          <p:nvPr>
+            <p:ph idx="1"/>
+          </p:nvPr>
+        </p:nvSpPr>
+        <p:spPr/>
+        <p:txBody>
+          <a:bodyPr>
+            <a:normAutofit/>
+          </a:bodyPr>
+          <a:lstStyle/>
+          <a:p>
+            <a:r>
+              <a:rPr lang="en-US" dirty="0" smtClean="0"/>
+              <a:t>Typical Linux Makefile</a:t>
+            </a:r>
+            <a:endParaRPr lang="en-US" dirty="0" smtClean="0"/>
+          </a:p>
+          <a:p>
+            <a:pPr lvl="2">
+              <a:buFont typeface="Wingdings" pitchFamily="2" charset="2"/>
+              <a:buNone/>
+            </a:pPr>
+            <a:r>
+              <a:rPr lang="en-US" sz="1600" b="1" dirty="0">
+                <a:latin typeface="Consolas" panose="020B0609020204030204" pitchFamily="49" charset="0"/>
+                <a:cs typeface="Consolas" panose="020B0609020204030204" pitchFamily="49" charset="0"/>
+              </a:rPr>
+              <a:t>include /</a:t>
+            </a:r>
+            <a:r>
+              <a:rPr lang="en-US" sz="1600" b="1" dirty="0" smtClean="0">
+                <a:latin typeface="Consolas" panose="020B0609020204030204" pitchFamily="49" charset="0"/>
+                <a:cs typeface="Consolas" panose="020B0609020204030204" pitchFamily="49" charset="0"/>
+              </a:rPr>
+              <a:t>usr/include/tsduck/tsduck.mk</a:t>
+            </a:r>
+          </a:p>
+          <a:p>
+            <a:pPr lvl="2">
+              <a:buFont typeface="Wingdings" pitchFamily="2" charset="2"/>
+              <a:buNone/>
+            </a:pPr>
+            <a:r>
+              <a:rPr lang="en-US" sz="1600" b="1" i="1" dirty="0" smtClean="0">
+                <a:latin typeface="Consolas" panose="020B0609020204030204" pitchFamily="49" charset="0"/>
+                <a:cs typeface="Consolas" panose="020B0609020204030204" pitchFamily="49" charset="0"/>
+              </a:rPr>
+              <a:t>... </a:t>
+            </a:r>
+            <a:r>
+              <a:rPr lang="en-US" sz="1600" b="1" i="1" dirty="0" smtClean="0">
+                <a:latin typeface="Consolas" panose="020B0609020204030204" pitchFamily="49" charset="0"/>
+                <a:cs typeface="Consolas" panose="020B0609020204030204" pitchFamily="49" charset="0"/>
+              </a:rPr>
+              <a:t>application-specific rules ...</a:t>
+            </a:r>
+          </a:p>
+          <a:p>
+            <a:r>
+              <a:rPr lang="en-US" dirty="0"/>
+              <a:t>Typical </a:t>
+            </a:r>
+            <a:r>
+              <a:rPr lang="en-US" dirty="0" smtClean="0"/>
+              <a:t>macOS Makefile</a:t>
+            </a:r>
+            <a:endParaRPr lang="en-US" dirty="0"/>
+          </a:p>
+          <a:p>
+            <a:pPr lvl="2">
+              <a:buFont typeface="Wingdings" pitchFamily="2" charset="2"/>
+              <a:buNone/>
+            </a:pPr>
+            <a:r>
+              <a:rPr lang="en-US" sz="1600" b="1" dirty="0">
+                <a:latin typeface="Consolas" panose="020B0609020204030204" pitchFamily="49" charset="0"/>
+                <a:cs typeface="Consolas" panose="020B0609020204030204" pitchFamily="49" charset="0"/>
+              </a:rPr>
+              <a:t>include /</a:t>
+            </a:r>
+            <a:r>
+              <a:rPr lang="en-US" sz="1600" b="1" dirty="0" smtClean="0">
+                <a:latin typeface="Consolas" panose="020B0609020204030204" pitchFamily="49" charset="0"/>
+                <a:cs typeface="Consolas" panose="020B0609020204030204" pitchFamily="49" charset="0"/>
+              </a:rPr>
+              <a:t>usr/</a:t>
+            </a:r>
+            <a:r>
+              <a:rPr lang="en-US" sz="1600" b="1" dirty="0" smtClean="0">
+                <a:solidFill>
+                  <a:srgbClr val="FF0000"/>
+                </a:solidFill>
+                <a:latin typeface="Consolas" panose="020B0609020204030204" pitchFamily="49" charset="0"/>
+                <a:cs typeface="Consolas" panose="020B0609020204030204" pitchFamily="49" charset="0"/>
+              </a:rPr>
+              <a:t>local</a:t>
+            </a:r>
+            <a:r>
+              <a:rPr lang="en-US" sz="1600" b="1" dirty="0" smtClean="0">
+                <a:latin typeface="Consolas" panose="020B0609020204030204" pitchFamily="49" charset="0"/>
+                <a:cs typeface="Consolas" panose="020B0609020204030204" pitchFamily="49" charset="0"/>
+              </a:rPr>
+              <a:t>/include/tsduck/tsduck.mk</a:t>
+            </a:r>
+            <a:endParaRPr lang="en-US" sz="1600" b="1" dirty="0">
+              <a:latin typeface="Consolas" panose="020B0609020204030204" pitchFamily="49" charset="0"/>
+              <a:cs typeface="Consolas" panose="020B0609020204030204" pitchFamily="49" charset="0"/>
+            </a:endParaRPr>
+          </a:p>
+          <a:p>
+            <a:pPr lvl="2">
+              <a:buFont typeface="Wingdings" pitchFamily="2" charset="2"/>
+              <a:buNone/>
+            </a:pPr>
+            <a:r>
+              <a:rPr lang="en-US" sz="1600" b="1" i="1" dirty="0">
+                <a:latin typeface="Consolas" panose="020B0609020204030204" pitchFamily="49" charset="0"/>
+                <a:cs typeface="Consolas" panose="020B0609020204030204" pitchFamily="49" charset="0"/>
+              </a:rPr>
+              <a:t>... application-specific rules </a:t>
+            </a:r>
+            <a:r>
+              <a:rPr lang="en-US" sz="1600" b="1" i="1" dirty="0" smtClean="0">
+                <a:latin typeface="Consolas" panose="020B0609020204030204" pitchFamily="49" charset="0"/>
+                <a:cs typeface="Consolas" panose="020B0609020204030204" pitchFamily="49" charset="0"/>
+              </a:rPr>
+              <a:t>...</a:t>
+            </a:r>
+            <a:endParaRPr lang="en-US" sz="1600" b="1" i="1" dirty="0">
+              <a:latin typeface="Consolas" panose="020B0609020204030204" pitchFamily="49" charset="0"/>
+              <a:cs typeface="Consolas" panose="020B0609020204030204" pitchFamily="49" charset="0"/>
+            </a:endParaRPr>
+          </a:p>
+        </p:txBody>
+      </p:sp>
+      <p:sp>
+        <p:nvSpPr>
+          <p:cNvPr id="3" name="Titre 2"/>
+          <p:cNvSpPr>
+            <a:spLocks noGrp="1"/>
+          </p:cNvSpPr>
+          <p:nvPr>
+            <p:ph type="title"/>
+          </p:nvPr>
+        </p:nvSpPr>
+        <p:spPr/>
+        <p:txBody>
+          <a:bodyPr/>
+          <a:lstStyle/>
+          <a:p>
+            <a:r>
+              <a:rPr lang="en-US" dirty="0" smtClean="0"/>
+              <a:t>Building with TSDuck library on UNIX</a:t>
+            </a:r>
+            <a:endParaRPr lang="en-US" dirty="0"/>
+          </a:p>
+        </p:txBody>
+      </p:sp>
+    </p:spTree>
+    <p:extLst>
+      <p:ext uri="{BB962C8B-B14F-4D97-AF65-F5344CB8AC3E}">
+        <p14:creationId xmlns:p14="http://schemas.microsoft.com/office/powerpoint/2010/main" val="2242190018"/>
+      </p:ext>
+    </p:extLst>
+  </p:cSld>
+  <p:clrMapOvr>
+    <a:masterClrMapping/>
+  </p:clrMapOvr>
+  <mc:AlternateContent xmlns:mc="http://schemas.openxmlformats.org/markup-compatibility/2006" xmlns:p14="http://schemas.microsoft.com/office/powerpoint/2010/main">
+    <mc:Choice Requires="p14">
+      <p:transition spd="med" p14:dur="700">
+        <p:fade/>
+      </p:transition>
+    </mc:Choice>
+    <mc:Fallback xmlns="">
+      <p:transition spd="med">
+        <p:fade/>
+      </p:transition>
+    </mc:Fallback>
+  </mc:AlternateContent>
+  <p:timing>
+    <p:tnLst>
+      <p:par>
+        <p:cTn id="1" dur="indefinite" restart="never" nodeType="tmRoot"/>
+      </p:par>
+    </p:tnLst>
+  </p:timing>
+</p:sld>
+</file>
+
+<file path=ppt/slides/slide32.xml><?xml version="1.0" encoding="utf-8"?>
+<p:sld xmlns:a="http://schemas.openxmlformats.org/drawingml/2006/main" xmlns:r="http://schemas.openxmlformats.org/officeDocument/2006/relationships" xmlns:p="http://schemas.openxmlformats.org/presentationml/2006/main">
+  <p:cSld>
+    <p:spTree>
+      <p:nvGrpSpPr>
+        <p:cNvPr id="1" name=""/>
+        <p:cNvGrpSpPr/>
+        <p:nvPr/>
+      </p:nvGrpSpPr>
+      <p:grpSpPr>
+        <a:xfrm>
+          <a:off x="0" y="0"/>
+          <a:ext cx="0" cy="0"/>
+          <a:chOff x="0" y="0"/>
+          <a:chExt cx="0" cy="0"/>
+        </a:xfrm>
+      </p:grpSpPr>
+      <p:sp>
+        <p:nvSpPr>
+          <p:cNvPr id="2" name="Espace réservé du contenu 1"/>
+          <p:cNvSpPr>
+            <a:spLocks noGrp="1"/>
+          </p:cNvSpPr>
+          <p:nvPr>
+            <p:ph idx="1"/>
+          </p:nvPr>
+        </p:nvSpPr>
+        <p:spPr/>
+        <p:txBody>
+          <a:bodyPr>
+            <a:normAutofit/>
+          </a:bodyPr>
+          <a:lstStyle/>
+          <a:p>
+            <a:r>
+              <a:rPr lang="en-US" dirty="0" smtClean="0"/>
+              <a:t>Use Microsoft Visual Studio 2017</a:t>
+            </a:r>
+          </a:p>
+          <a:p>
+            <a:pPr lvl="1"/>
+            <a:r>
+              <a:rPr lang="en-US" dirty="0" smtClean="0"/>
+              <a:t>Community Edition is free</a:t>
+            </a:r>
+          </a:p>
+          <a:p>
+            <a:r>
+              <a:rPr lang="en-US" dirty="0" smtClean="0"/>
+              <a:t>Modify the application’s </a:t>
+            </a:r>
+            <a:r>
+              <a:rPr lang="en-US" dirty="0"/>
+              <a:t>project file (</a:t>
+            </a:r>
+            <a:r>
+              <a:rPr lang="en-US" i="1" dirty="0" err="1">
+                <a:latin typeface="Consolas" panose="020B0609020204030204" pitchFamily="49" charset="0"/>
+                <a:cs typeface="Consolas" panose="020B0609020204030204" pitchFamily="49" charset="0"/>
+              </a:rPr>
+              <a:t>app</a:t>
+            </a:r>
+            <a:r>
+              <a:rPr lang="en-US" dirty="0" err="1">
+                <a:latin typeface="Consolas" panose="020B0609020204030204" pitchFamily="49" charset="0"/>
+                <a:cs typeface="Consolas" panose="020B0609020204030204" pitchFamily="49" charset="0"/>
+              </a:rPr>
+              <a:t>.vcxproj</a:t>
+            </a:r>
+            <a:r>
+              <a:rPr lang="en-US" dirty="0"/>
+              <a:t>)</a:t>
+            </a:r>
+            <a:endParaRPr lang="en-US" dirty="0" smtClean="0"/>
+          </a:p>
+          <a:p>
+            <a:pPr lvl="1"/>
+            <a:r>
+              <a:rPr lang="en-US" dirty="0" smtClean="0"/>
+              <a:t>Add one reference to the TSDuck property file</a:t>
+            </a:r>
+          </a:p>
+          <a:p>
+            <a:pPr lvl="2">
+              <a:buNone/>
+            </a:pPr>
+            <a:r>
+              <a:rPr lang="en-US" sz="1600" b="1" dirty="0">
+                <a:latin typeface="Consolas" panose="020B0609020204030204" pitchFamily="49" charset="0"/>
+                <a:cs typeface="Consolas" panose="020B0609020204030204" pitchFamily="49" charset="0"/>
+              </a:rPr>
+              <a:t>&lt;Import Project="$(TSDUCK)\</a:t>
+            </a:r>
+            <a:r>
+              <a:rPr lang="en-US" sz="1600" b="1" dirty="0" err="1">
+                <a:latin typeface="Consolas" panose="020B0609020204030204" pitchFamily="49" charset="0"/>
+                <a:cs typeface="Consolas" panose="020B0609020204030204" pitchFamily="49" charset="0"/>
+              </a:rPr>
+              <a:t>tsduck.props</a:t>
+            </a:r>
+            <a:r>
+              <a:rPr lang="en-US" sz="1600" b="1" dirty="0">
+                <a:latin typeface="Consolas" panose="020B0609020204030204" pitchFamily="49" charset="0"/>
+                <a:cs typeface="Consolas" panose="020B0609020204030204" pitchFamily="49" charset="0"/>
+              </a:rPr>
+              <a:t>" /&gt;</a:t>
+            </a:r>
+            <a:endParaRPr lang="en-US" sz="1600" b="1" dirty="0">
+              <a:latin typeface="Consolas" panose="020B0609020204030204" pitchFamily="49" charset="0"/>
+              <a:cs typeface="Consolas" panose="020B0609020204030204" pitchFamily="49" charset="0"/>
+            </a:endParaRPr>
+          </a:p>
+          <a:p>
+            <a:pPr lvl="1"/>
+            <a:r>
+              <a:rPr lang="en-US" dirty="0" smtClean="0"/>
+              <a:t>Just befor</a:t>
+            </a:r>
+            <a:r>
+              <a:rPr lang="en-US" dirty="0" smtClean="0"/>
+              <a:t>e </a:t>
+            </a:r>
+            <a:r>
+              <a:rPr lang="en-US" dirty="0"/>
+              <a:t>the final </a:t>
+            </a:r>
+            <a:r>
+              <a:rPr lang="en-US" dirty="0">
+                <a:latin typeface="Consolas" panose="020B0609020204030204" pitchFamily="49" charset="0"/>
+                <a:cs typeface="Consolas" panose="020B0609020204030204" pitchFamily="49" charset="0"/>
+              </a:rPr>
+              <a:t>&lt;/Project</a:t>
+            </a:r>
+            <a:r>
+              <a:rPr lang="en-US" dirty="0" smtClean="0">
+                <a:latin typeface="Consolas" panose="020B0609020204030204" pitchFamily="49" charset="0"/>
+                <a:cs typeface="Consolas" panose="020B0609020204030204" pitchFamily="49" charset="0"/>
+              </a:rPr>
+              <a:t>&gt;</a:t>
+            </a:r>
+            <a:r>
+              <a:rPr lang="en-US" dirty="0" smtClean="0"/>
+              <a:t> closing tag</a:t>
+            </a:r>
+          </a:p>
+          <a:p>
+            <a:pPr lvl="1"/>
+            <a:r>
+              <a:rPr lang="en-US" dirty="0" smtClean="0"/>
+              <a:t>And build the application as usual</a:t>
+            </a:r>
+          </a:p>
+        </p:txBody>
+      </p:sp>
+      <p:sp>
+        <p:nvSpPr>
+          <p:cNvPr id="3" name="Titre 2"/>
+          <p:cNvSpPr>
+            <a:spLocks noGrp="1"/>
+          </p:cNvSpPr>
+          <p:nvPr>
+            <p:ph type="title"/>
+          </p:nvPr>
+        </p:nvSpPr>
+        <p:spPr/>
+        <p:txBody>
+          <a:bodyPr/>
+          <a:lstStyle/>
+          <a:p>
+            <a:r>
+              <a:rPr lang="en-US" dirty="0"/>
+              <a:t>Building with TSDuck library on </a:t>
+            </a:r>
+            <a:r>
+              <a:rPr lang="en-US" dirty="0" smtClean="0"/>
+              <a:t>Windows</a:t>
+            </a:r>
+            <a:endParaRPr lang="en-US" dirty="0"/>
+          </a:p>
+        </p:txBody>
+      </p:sp>
+    </p:spTree>
+    <p:extLst>
+      <p:ext uri="{BB962C8B-B14F-4D97-AF65-F5344CB8AC3E}">
+        <p14:creationId xmlns:p14="http://schemas.microsoft.com/office/powerpoint/2010/main" val="3091723395"/>
+      </p:ext>
+    </p:extLst>
+  </p:cSld>
+  <p:clrMapOvr>
+    <a:masterClrMapping/>
+  </p:clrMapOvr>
+  <mc:AlternateContent xmlns:mc="http://schemas.openxmlformats.org/markup-compatibility/2006" xmlns:p14="http://schemas.microsoft.com/office/powerpoint/2010/main">
+    <mc:Choice Requires="p14">
+      <p:transition spd="med" p14:dur="700">
+        <p:fade/>
+      </p:transition>
+    </mc:Choice>
+    <mc:Fallback xmlns="">
+      <p:transition spd="med">
+        <p:fade/>
+      </p:transition>
+    </mc:Fallback>
+  </mc:AlternateContent>
+  <p:timing>
+    <p:tnLst>
+      <p:par>
+        <p:cTn id="1" dur="indefinite" restart="never" nodeType="tmRoot"/>
+      </p:par>
+    </p:tnLst>
+  </p:timing>
+</p:sld>
+</file>
+
+<file path=ppt/slides/slide33.xml><?xml version="1.0" encoding="utf-8"?>
 <p:sld xmlns:a="http://schemas.openxmlformats.org/drawingml/2006/main" xmlns:r="http://schemas.openxmlformats.org/officeDocument/2006/relationships" xmlns:p="http://schemas.openxmlformats.org/presentationml/2006/main">
   <p:cSld>
     <p:spTree>
@@ -13464,7 +13992,45 @@
           <a:p>
             <a:r>
               <a:rPr lang="en-US" dirty="0" smtClean="0"/>
-              <a:t>Open source code</a:t>
+              <a:t>Web site</a:t>
+            </a:r>
+          </a:p>
+          <a:p>
+            <a:pPr lvl="1" indent="0">
+              <a:buNone/>
+            </a:pPr>
+            <a:r>
+              <a:rPr lang="en-US" sz="2000" dirty="0">
+                <a:latin typeface="Consolas" panose="020B0609020204030204" pitchFamily="49" charset="0"/>
+                <a:cs typeface="Consolas" panose="020B0609020204030204" pitchFamily="49" charset="0"/>
+                <a:hlinkClick r:id="rId3"/>
+              </a:rPr>
+              <a:t>https://tsduck.github.io</a:t>
+            </a:r>
+            <a:r>
+              <a:rPr lang="en-US" sz="2000" dirty="0">
+                <a:latin typeface="Consolas" panose="020B0609020204030204" pitchFamily="49" charset="0"/>
+                <a:cs typeface="Consolas" panose="020B0609020204030204" pitchFamily="49" charset="0"/>
+                <a:hlinkClick r:id="rId3"/>
+              </a:rPr>
+              <a:t>/</a:t>
+            </a:r>
+            <a:r>
+              <a:rPr lang="en-US" sz="2000" dirty="0">
+                <a:latin typeface="Consolas" panose="020B0609020204030204" pitchFamily="49" charset="0"/>
+                <a:cs typeface="Consolas" panose="020B0609020204030204" pitchFamily="49" charset="0"/>
+              </a:rPr>
+              <a:t> </a:t>
+            </a:r>
+          </a:p>
+          <a:p>
+            <a:r>
+              <a:rPr lang="en-US" dirty="0" smtClean="0"/>
+              <a:t>Open-source </a:t>
+            </a:r>
+            <a:r>
+              <a:rPr lang="en-US" dirty="0" smtClean="0"/>
+              <a:t>code</a:t>
             </a:r>
           </a:p>
           <a:p>
@@ -13475,7 +14041,7 @@
               <a:rPr lang="en-US" dirty="0">
                 <a:latin typeface="Consolas" panose="020B0609020204030204" pitchFamily="49" charset="0"/>
                 <a:cs typeface="Consolas" panose="020B0609020204030204" pitchFamily="49" charset="0"/>
-                <a:hlinkClick r:id="rId3"/>
+                <a:hlinkClick r:id="rId4"/>
               </a:rPr>
               <a:t>https://</a:t>
             </a:r>
@@ -13483,7 +14049,7 @@
               <a:rPr lang="en-US" dirty="0" smtClean="0">
                 <a:latin typeface="Consolas" panose="020B0609020204030204" pitchFamily="49" charset="0"/>
                 <a:cs typeface="Consolas" panose="020B0609020204030204" pitchFamily="49" charset="0"/>
-                <a:hlinkClick r:id="rId3"/>
+                <a:hlinkClick r:id="rId4"/>
               </a:rPr>
               <a:t>github.com/tsduck/tsduck</a:t>
             </a:r>
@@ -13688,7 +14254,7 @@
                 <a:cs typeface="Consolas" panose="020B0609020204030204" pitchFamily="49" charset="0"/>
                 <a:hlinkClick r:id="rId4"/>
               </a:rPr>
-              <a:t>https://tsduck.github.io</a:t>
+              <a:t>https://tsduck.github.io/doxy/html</a:t>
             </a:r>
             <a:r>
               <a:rPr lang="en-US" sz="1900" dirty="0" smtClean="0">

</xml_diff>

<commit_message>
Completed XML table compiler
</commit_message>
<xml_diff>
--- a/doc/tsduck-presentation.pptx
+++ b/doc/tsduck-presentation.pptx
@@ -5,10 +5,10 @@
     <p:sldMasterId id="2147483660" r:id="rId1"/>
   </p:sldMasterIdLst>
   <p:notesMasterIdLst>
-    <p:notesMasterId r:id="rId35"/>
+    <p:notesMasterId r:id="rId39"/>
   </p:notesMasterIdLst>
   <p:handoutMasterIdLst>
-    <p:handoutMasterId r:id="rId36"/>
+    <p:handoutMasterId r:id="rId40"/>
   </p:handoutMasterIdLst>
   <p:sldIdLst>
     <p:sldId id="256" r:id="rId2"/>
@@ -33,17 +33,21 @@
     <p:sldId id="276" r:id="rId21"/>
     <p:sldId id="277" r:id="rId22"/>
     <p:sldId id="278" r:id="rId23"/>
-    <p:sldId id="279" r:id="rId24"/>
-    <p:sldId id="280" r:id="rId25"/>
-    <p:sldId id="281" r:id="rId26"/>
-    <p:sldId id="282" r:id="rId27"/>
-    <p:sldId id="283" r:id="rId28"/>
-    <p:sldId id="284" r:id="rId29"/>
-    <p:sldId id="285" r:id="rId30"/>
-    <p:sldId id="286" r:id="rId31"/>
-    <p:sldId id="288" r:id="rId32"/>
-    <p:sldId id="287" r:id="rId33"/>
-    <p:sldId id="258" r:id="rId34"/>
+    <p:sldId id="289" r:id="rId24"/>
+    <p:sldId id="290" r:id="rId25"/>
+    <p:sldId id="291" r:id="rId26"/>
+    <p:sldId id="292" r:id="rId27"/>
+    <p:sldId id="279" r:id="rId28"/>
+    <p:sldId id="280" r:id="rId29"/>
+    <p:sldId id="281" r:id="rId30"/>
+    <p:sldId id="282" r:id="rId31"/>
+    <p:sldId id="283" r:id="rId32"/>
+    <p:sldId id="284" r:id="rId33"/>
+    <p:sldId id="285" r:id="rId34"/>
+    <p:sldId id="286" r:id="rId35"/>
+    <p:sldId id="288" r:id="rId36"/>
+    <p:sldId id="287" r:id="rId37"/>
+    <p:sldId id="258" r:id="rId38"/>
   </p:sldIdLst>
   <p:sldSz cx="9144000" cy="5143500" type="screen16x9"/>
   <p:notesSz cx="6858000" cy="9144000"/>
@@ -227,7 +231,7 @@
           <a:p>
             <a:fld id="{C55B0BA7-B0E2-4C07-8528-84B7AE1BAF72}" type="datetimeFigureOut">
               <a:rPr lang="en-US" smtClean="0"/>
-              <a:t>2017-07-25</a:t>
+              <a:t>2017-09-15</a:t>
             </a:fld>
             <a:endParaRPr lang="en-US"/>
           </a:p>
@@ -393,7 +397,7 @@
           <a:p>
             <a:fld id="{66F6DD61-880C-4F33-96A2-51E92479021F}" type="datetimeFigureOut">
               <a:rPr lang="en-US" smtClean="0"/>
-              <a:t>2017-07-25</a:t>
+              <a:t>2017-09-15</a:t>
             </a:fld>
             <a:endParaRPr lang="en-US" dirty="0"/>
           </a:p>
@@ -1987,7 +1991,7 @@
           <a:p>
             <a:fld id="{C9210C38-A4D4-4515-9CA7-8160947F5FEA}" type="slidenum">
               <a:rPr lang="en-US" smtClean="0"/>
-              <a:t>23</a:t>
+              <a:t>27</a:t>
             </a:fld>
             <a:endParaRPr lang="en-US" dirty="0"/>
           </a:p>
@@ -2071,7 +2075,7 @@
           <a:p>
             <a:fld id="{C9210C38-A4D4-4515-9CA7-8160947F5FEA}" type="slidenum">
               <a:rPr lang="en-US" smtClean="0"/>
-              <a:t>24</a:t>
+              <a:t>28</a:t>
             </a:fld>
             <a:endParaRPr lang="en-US" dirty="0"/>
           </a:p>
@@ -2155,7 +2159,7 @@
           <a:p>
             <a:fld id="{C9210C38-A4D4-4515-9CA7-8160947F5FEA}" type="slidenum">
               <a:rPr lang="en-US" smtClean="0"/>
-              <a:t>25</a:t>
+              <a:t>29</a:t>
             </a:fld>
             <a:endParaRPr lang="en-US" dirty="0"/>
           </a:p>
@@ -2239,7 +2243,7 @@
           <a:p>
             <a:fld id="{C9210C38-A4D4-4515-9CA7-8160947F5FEA}" type="slidenum">
               <a:rPr lang="en-US" smtClean="0"/>
-              <a:t>26</a:t>
+              <a:t>30</a:t>
             </a:fld>
             <a:endParaRPr lang="en-US" dirty="0"/>
           </a:p>
@@ -2323,7 +2327,7 @@
           <a:p>
             <a:fld id="{C9210C38-A4D4-4515-9CA7-8160947F5FEA}" type="slidenum">
               <a:rPr lang="en-US" smtClean="0"/>
-              <a:t>27</a:t>
+              <a:t>31</a:t>
             </a:fld>
             <a:endParaRPr lang="en-US" dirty="0"/>
           </a:p>
@@ -2407,7 +2411,7 @@
           <a:p>
             <a:fld id="{C9210C38-A4D4-4515-9CA7-8160947F5FEA}" type="slidenum">
               <a:rPr lang="en-US" smtClean="0"/>
-              <a:t>28</a:t>
+              <a:t>32</a:t>
             </a:fld>
             <a:endParaRPr lang="en-US" dirty="0"/>
           </a:p>
@@ -2491,7 +2495,7 @@
           <a:p>
             <a:fld id="{C9210C38-A4D4-4515-9CA7-8160947F5FEA}" type="slidenum">
               <a:rPr lang="en-US" smtClean="0"/>
-              <a:t>29</a:t>
+              <a:t>33</a:t>
             </a:fld>
             <a:endParaRPr lang="en-US" dirty="0"/>
           </a:p>
@@ -2659,7 +2663,7 @@
           <a:p>
             <a:fld id="{C9210C38-A4D4-4515-9CA7-8160947F5FEA}" type="slidenum">
               <a:rPr lang="en-US" smtClean="0"/>
-              <a:t>30</a:t>
+              <a:t>34</a:t>
             </a:fld>
             <a:endParaRPr lang="en-US" dirty="0"/>
           </a:p>
@@ -2743,7 +2747,7 @@
           <a:p>
             <a:fld id="{C9210C38-A4D4-4515-9CA7-8160947F5FEA}" type="slidenum">
               <a:rPr lang="en-US" smtClean="0"/>
-              <a:t>31</a:t>
+              <a:t>35</a:t>
             </a:fld>
             <a:endParaRPr lang="en-US" dirty="0"/>
           </a:p>
@@ -2827,7 +2831,7 @@
           <a:p>
             <a:fld id="{C9210C38-A4D4-4515-9CA7-8160947F5FEA}" type="slidenum">
               <a:rPr lang="en-US" smtClean="0"/>
-              <a:t>32</a:t>
+              <a:t>36</a:t>
             </a:fld>
             <a:endParaRPr lang="en-US" dirty="0"/>
           </a:p>
@@ -2911,7 +2915,7 @@
           <a:p>
             <a:fld id="{C9210C38-A4D4-4515-9CA7-8160947F5FEA}" type="slidenum">
               <a:rPr lang="en-US" smtClean="0"/>
-              <a:t>33</a:t>
+              <a:t>37</a:t>
             </a:fld>
             <a:endParaRPr lang="en-US" dirty="0"/>
           </a:p>
@@ -5383,7 +5387,7 @@
             </a:r>
             <a:r>
               <a:rPr lang="en-US" sz="1700" dirty="0" smtClean="0"/>
-              <a:t>3.2</a:t>
+              <a:t>3.3</a:t>
             </a:r>
             <a:endParaRPr lang="en-US" sz="1700" dirty="0"/>
           </a:p>
@@ -5487,29 +5491,39 @@
         </p:nvSpPr>
         <p:spPr/>
         <p:txBody>
-          <a:bodyPr/>
-          <a:lstStyle/>
-          <a:p>
-            <a:r>
-              <a:rPr lang="en-US" dirty="0" smtClean="0"/>
-              <a:t>Transport packet analysis</a:t>
+          <a:bodyPr>
+            <a:normAutofit/>
+          </a:bodyPr>
+          <a:lstStyle/>
+          <a:p>
+            <a:r>
+              <a:rPr lang="en-US" dirty="0" smtClean="0"/>
+              <a:t>Transport </a:t>
+            </a:r>
+            <a:r>
+              <a:rPr lang="en-US" dirty="0"/>
+              <a:t>packet analysis</a:t>
             </a:r>
           </a:p>
           <a:p>
             <a:pPr lvl="1"/>
             <a:r>
-              <a:rPr lang="en-US" b="1" i="1" dirty="0" err="1" smtClean="0"/>
+              <a:rPr lang="en-US" b="1" i="1" dirty="0" err="1"/>
               <a:t>tsdump</a:t>
             </a:r>
             <a:r>
-              <a:rPr lang="en-US" dirty="0" smtClean="0"/>
+              <a:rPr lang="en-US" dirty="0"/>
               <a:t> : dump and analyze transport packets</a:t>
             </a:r>
           </a:p>
           <a:p>
             <a:r>
               <a:rPr lang="en-US" dirty="0" smtClean="0"/>
-              <a:t>TS files recovery</a:t>
+              <a:t>TS </a:t>
+            </a:r>
+            <a:r>
+              <a:rPr lang="en-US" dirty="0" smtClean="0"/>
+              <a:t>files recovery</a:t>
             </a:r>
           </a:p>
           <a:p>
@@ -5690,28 +5704,44 @@
           <a:p>
             <a:pPr lvl="1"/>
             <a:r>
-              <a:rPr lang="en-US" b="1" i="1" dirty="0" err="1" smtClean="0"/>
+              <a:rPr lang="en-US" b="1" i="1" dirty="0"/>
+              <a:t>tstabcomp </a:t>
+            </a:r>
+            <a:r>
+              <a:rPr lang="en-US" dirty="0"/>
+              <a:t>: table compiler from XML source files</a:t>
+            </a:r>
+          </a:p>
+          <a:p>
+            <a:pPr lvl="1"/>
+            <a:r>
+              <a:rPr lang="en-US" b="1" i="1" dirty="0" smtClean="0"/>
               <a:t>tsgentab</a:t>
             </a:r>
             <a:r>
               <a:rPr lang="en-US" dirty="0" smtClean="0"/>
-              <a:t> : generate specific tables using plugins</a:t>
+              <a:t> </a:t>
+            </a:r>
+            <a:r>
+              <a:rPr lang="en-US" dirty="0" smtClean="0"/>
+              <a:t>: generate specific tables using plugins</a:t>
             </a:r>
           </a:p>
           <a:p>
             <a:pPr lvl="2"/>
             <a:r>
-              <a:rPr lang="en-US" dirty="0" smtClean="0"/>
-              <a:t>each plugin typically generates one table</a:t>
-            </a:r>
-          </a:p>
-          <a:p>
-            <a:pPr lvl="2"/>
-            <a:r>
-              <a:rPr lang="en-US" dirty="0" smtClean="0"/>
-              <a:t>add new plugins when new tables are needed</a:t>
-            </a:r>
-            <a:endParaRPr lang="en-US" dirty="0"/>
+              <a:rPr lang="en-US" dirty="0"/>
+              <a:t>n</a:t>
+            </a:r>
+            <a:r>
+              <a:rPr lang="en-US" dirty="0" smtClean="0"/>
+              <a:t>ow deprecated in favor of </a:t>
+            </a:r>
+            <a:r>
+              <a:rPr lang="en-US" i="1" dirty="0" smtClean="0"/>
+              <a:t>tstabcomp</a:t>
+            </a:r>
+            <a:endParaRPr lang="en-US" i="1" dirty="0"/>
           </a:p>
         </p:txBody>
       </p:sp>
@@ -8464,7 +8494,14 @@
                 <a:latin typeface="Consolas" panose="020B0609020204030204" pitchFamily="49" charset="0"/>
                 <a:cs typeface="Consolas" panose="020B0609020204030204" pitchFamily="49" charset="0"/>
               </a:rPr>
-              <a:t> --uhf 24 --convolution 2/3 --guard 1/32</a:t>
+              <a:t> --uhf 24 --</a:t>
+            </a:r>
+            <a:r>
+              <a:rPr lang="en-US" sz="1800" b="1" dirty="0" smtClean="0">
+                <a:latin typeface="Consolas" panose="020B0609020204030204" pitchFamily="49" charset="0"/>
+                <a:cs typeface="Consolas" panose="020B0609020204030204" pitchFamily="49" charset="0"/>
+              </a:rPr>
+              <a:t>convolution 2/3 --guard 1/32</a:t>
             </a:r>
             <a:endParaRPr lang="en-US" sz="1800" b="1" dirty="0">
               <a:latin typeface="Consolas" panose="020B0609020204030204" pitchFamily="49" charset="0"/>
@@ -10407,8 +10444,19 @@
           <a:p>
             <a:r>
               <a:rPr lang="en-US" dirty="0" smtClean="0"/>
-              <a:t>Transport stream processor</a:t>
-            </a:r>
+              <a:t>Transport stream </a:t>
+            </a:r>
+            <a:r>
+              <a:rPr lang="en-US" dirty="0" smtClean="0"/>
+              <a:t>processor</a:t>
+            </a:r>
+          </a:p>
+          <a:p>
+            <a:r>
+              <a:rPr lang="en-US" dirty="0" smtClean="0"/>
+              <a:t>XML table compiler</a:t>
+            </a:r>
+            <a:endParaRPr lang="en-US" dirty="0" smtClean="0"/>
           </a:p>
           <a:p>
             <a:r>
@@ -11651,7 +11699,7 @@
           <a:p>
             <a:r>
               <a:rPr lang="en-US" dirty="0" smtClean="0"/>
-              <a:t>C++ transport stream programming</a:t>
+              <a:t>the PSI / SI table compiler</a:t>
             </a:r>
             <a:endParaRPr lang="en-US" dirty="0"/>
           </a:p>
@@ -11674,7 +11722,7 @@
           <a:p>
             <a:r>
               <a:rPr lang="en-US" dirty="0" smtClean="0"/>
-              <a:t>Extending TSDuck</a:t>
+              <a:t>tstabcomp	</a:t>
             </a:r>
             <a:endParaRPr lang="en-US" dirty="0"/>
           </a:p>
@@ -11683,7 +11731,7 @@
     </p:spTree>
     <p:extLst>
       <p:ext uri="{BB962C8B-B14F-4D97-AF65-F5344CB8AC3E}">
-        <p14:creationId xmlns:p14="http://schemas.microsoft.com/office/powerpoint/2010/main" val="1702509614"/>
+        <p14:creationId xmlns:p14="http://schemas.microsoft.com/office/powerpoint/2010/main" val="2271901950"/>
       </p:ext>
     </p:extLst>
   </p:cSld>
@@ -11741,129 +11789,99 @@
         </p:nvSpPr>
         <p:spPr/>
         <p:txBody>
+          <a:bodyPr>
+            <a:normAutofit lnSpcReduction="10000"/>
+          </a:bodyPr>
+          <a:lstStyle/>
+          <a:p>
+            <a:r>
+              <a:rPr lang="en-US" dirty="0" smtClean="0"/>
+              <a:t>Input source files</a:t>
+            </a:r>
+          </a:p>
+          <a:p>
+            <a:pPr lvl="1"/>
+            <a:r>
+              <a:rPr lang="en-US" dirty="0" smtClean="0"/>
+              <a:t>describe PSI/SI tables in text files</a:t>
+            </a:r>
+          </a:p>
+          <a:p>
+            <a:pPr lvl="1"/>
+            <a:r>
+              <a:rPr lang="en-US" dirty="0" smtClean="0"/>
+              <a:t>XML format</a:t>
+            </a:r>
+          </a:p>
+          <a:p>
+            <a:r>
+              <a:rPr lang="en-US" dirty="0" smtClean="0"/>
+              <a:t>Output binary files</a:t>
+            </a:r>
+          </a:p>
+          <a:p>
+            <a:pPr lvl="1"/>
+            <a:r>
+              <a:rPr lang="en-US" dirty="0" smtClean="0"/>
+              <a:t>concatenated list of sections</a:t>
+            </a:r>
+          </a:p>
+          <a:p>
+            <a:pPr lvl="1"/>
+            <a:r>
+              <a:rPr lang="en-US" dirty="0" smtClean="0"/>
+              <a:t>same format as used by other tools and plugins</a:t>
+            </a:r>
+          </a:p>
+          <a:p>
+            <a:r>
+              <a:rPr lang="en-US" dirty="0" smtClean="0"/>
+              <a:t>Reverse operation (</a:t>
+            </a:r>
+            <a:r>
+              <a:rPr lang="en-US" dirty="0" err="1" smtClean="0"/>
+              <a:t>decompilation</a:t>
+            </a:r>
+            <a:r>
+              <a:rPr lang="en-US" dirty="0" smtClean="0"/>
+              <a:t>) also available</a:t>
+            </a:r>
+          </a:p>
+          <a:p>
+            <a:pPr lvl="1"/>
+            <a:r>
+              <a:rPr lang="en-US" dirty="0" smtClean="0"/>
+              <a:t>input: binary sections file</a:t>
+            </a:r>
+          </a:p>
+          <a:p>
+            <a:pPr lvl="1"/>
+            <a:r>
+              <a:rPr lang="en-US" dirty="0" smtClean="0"/>
+              <a:t>output: XML file</a:t>
+            </a:r>
+            <a:endParaRPr lang="en-US" dirty="0"/>
+          </a:p>
+        </p:txBody>
+      </p:sp>
+      <p:sp>
+        <p:nvSpPr>
+          <p:cNvPr id="3" name="Titre 2"/>
+          <p:cNvSpPr>
+            <a:spLocks noGrp="1"/>
+          </p:cNvSpPr>
+          <p:nvPr>
+            <p:ph type="title"/>
+          </p:nvPr>
+        </p:nvSpPr>
+        <p:spPr/>
+        <p:txBody>
           <a:bodyPr/>
           <a:lstStyle/>
           <a:p>
             <a:r>
               <a:rPr lang="en-US" dirty="0" smtClean="0"/>
-              <a:t>TSDuck is extensible</a:t>
-            </a:r>
-          </a:p>
-          <a:p>
-            <a:pPr lvl="1"/>
-            <a:r>
-              <a:rPr lang="en-US" dirty="0" smtClean="0"/>
-              <a:t>Source code provided</a:t>
-            </a:r>
-          </a:p>
-          <a:p>
-            <a:pPr marL="896937" lvl="3" indent="0">
-              <a:buNone/>
-            </a:pPr>
-            <a:r>
-              <a:rPr lang="en-US" dirty="0" smtClean="0">
-                <a:latin typeface="Consolas" panose="020B0609020204030204" pitchFamily="49" charset="0"/>
-                <a:cs typeface="Consolas" panose="020B0609020204030204" pitchFamily="49" charset="0"/>
-              </a:rPr>
-              <a:t>git clone https://github.com/tsduck/tsduck.git</a:t>
-            </a:r>
-          </a:p>
-          <a:p>
-            <a:pPr lvl="1"/>
-            <a:r>
-              <a:rPr lang="en-US" dirty="0" smtClean="0"/>
-              <a:t>Common API for Linux, Windows and </a:t>
-            </a:r>
-            <a:r>
-              <a:rPr lang="en-US" dirty="0" err="1" smtClean="0"/>
-              <a:t>macOS</a:t>
-            </a:r>
-            <a:endParaRPr lang="en-US" dirty="0" smtClean="0"/>
-          </a:p>
-          <a:p>
-            <a:pPr lvl="2"/>
-            <a:r>
-              <a:rPr lang="en-US" dirty="0" smtClean="0"/>
-              <a:t>DVB tuners and </a:t>
-            </a:r>
-            <a:r>
-              <a:rPr lang="en-US" dirty="0" err="1" smtClean="0"/>
-              <a:t>Dektec</a:t>
-            </a:r>
-            <a:r>
-              <a:rPr lang="en-US" dirty="0" smtClean="0"/>
-              <a:t> cards are not supported on </a:t>
-            </a:r>
-            <a:r>
-              <a:rPr lang="en-US" dirty="0" err="1" smtClean="0"/>
-              <a:t>macOS</a:t>
-            </a:r>
-            <a:endParaRPr lang="en-US" dirty="0" smtClean="0"/>
-          </a:p>
-          <a:p>
-            <a:pPr lvl="1"/>
-            <a:r>
-              <a:rPr lang="en-US" dirty="0" smtClean="0"/>
-              <a:t>Programmer’s guide</a:t>
-            </a:r>
-          </a:p>
-          <a:p>
-            <a:pPr lvl="2"/>
-            <a:r>
-              <a:rPr lang="en-US" dirty="0" smtClean="0"/>
-              <a:t>Doxygen-generated, see </a:t>
-            </a:r>
-            <a:r>
-              <a:rPr lang="en-US" dirty="0" smtClean="0">
-                <a:latin typeface="Consolas" panose="020B0609020204030204" pitchFamily="49" charset="0"/>
-                <a:cs typeface="Consolas" panose="020B0609020204030204" pitchFamily="49" charset="0"/>
-                <a:hlinkClick r:id="rId3"/>
-              </a:rPr>
-              <a:t>https</a:t>
-            </a:r>
-            <a:r>
-              <a:rPr lang="en-US" dirty="0" smtClean="0">
-                <a:latin typeface="Consolas" panose="020B0609020204030204" pitchFamily="49" charset="0"/>
-                <a:cs typeface="Consolas" panose="020B0609020204030204" pitchFamily="49" charset="0"/>
-                <a:hlinkClick r:id="rId3"/>
-              </a:rPr>
-              <a:t>://tsduck.github.io/</a:t>
-            </a:r>
-            <a:r>
-              <a:rPr lang="en-US" dirty="0" smtClean="0">
-                <a:latin typeface="Consolas" panose="020B0609020204030204" pitchFamily="49" charset="0"/>
-                <a:cs typeface="Consolas" panose="020B0609020204030204" pitchFamily="49" charset="0"/>
-              </a:rPr>
-              <a:t> </a:t>
-            </a:r>
-          </a:p>
-          <a:p>
-            <a:r>
-              <a:rPr lang="en-US" dirty="0" smtClean="0"/>
-              <a:t>You can modify it yourself !</a:t>
-            </a:r>
-            <a:endParaRPr lang="en-US" dirty="0"/>
-          </a:p>
-        </p:txBody>
-      </p:sp>
-      <p:sp>
-        <p:nvSpPr>
-          <p:cNvPr id="3" name="Titre 2"/>
-          <p:cNvSpPr>
-            <a:spLocks noGrp="1"/>
-          </p:cNvSpPr>
-          <p:nvPr>
-            <p:ph type="title"/>
-          </p:nvPr>
-        </p:nvSpPr>
-        <p:spPr/>
-        <p:txBody>
-          <a:bodyPr/>
-          <a:lstStyle/>
-          <a:p>
-            <a:r>
-              <a:rPr lang="en-US" dirty="0" smtClean="0"/>
-              <a:t>Extending TSDuck</a:t>
+              <a:t>Compiling PSI/SI tables</a:t>
             </a:r>
             <a:endParaRPr lang="en-US" dirty="0"/>
           </a:p>
@@ -11872,7 +11890,7 @@
     </p:spTree>
     <p:extLst>
       <p:ext uri="{BB962C8B-B14F-4D97-AF65-F5344CB8AC3E}">
-        <p14:creationId xmlns:p14="http://schemas.microsoft.com/office/powerpoint/2010/main" val="3195961649"/>
+        <p14:creationId xmlns:p14="http://schemas.microsoft.com/office/powerpoint/2010/main" val="3460309249"/>
       </p:ext>
     </p:extLst>
   </p:cSld>
@@ -11935,148 +11953,462 @@
           </a:bodyPr>
           <a:lstStyle/>
           <a:p>
-            <a:pPr>
-              <a:lnSpc>
-                <a:spcPct val="90000"/>
-              </a:lnSpc>
+            <a:pPr marL="0" indent="0">
+              <a:buNone/>
             </a:pPr>
             <a:r>
-              <a:rPr lang="en-US" dirty="0" smtClean="0"/>
-              <a:t>Identify your needs</a:t>
-            </a:r>
-          </a:p>
-          <a:p>
-            <a:pPr>
-              <a:lnSpc>
-                <a:spcPct val="90000"/>
-              </a:lnSpc>
+              <a:rPr lang="en-US" sz="1200" dirty="0">
+                <a:latin typeface="Consolas" panose="020B0609020204030204" pitchFamily="49" charset="0"/>
+                <a:cs typeface="Consolas" panose="020B0609020204030204" pitchFamily="49" charset="0"/>
+              </a:rPr>
+              <a:t>&lt;?xml version="1.0" encoding="UTF-8"?&gt;</a:t>
+            </a:r>
+          </a:p>
+          <a:p>
+            <a:pPr marL="0" indent="0">
+              <a:buNone/>
             </a:pPr>
             <a:r>
-              <a:rPr lang="en-US" dirty="0" smtClean="0"/>
-              <a:t>Try to find a solution using existing TSDuck</a:t>
-            </a:r>
-          </a:p>
-          <a:p>
-            <a:pPr lvl="1">
-              <a:lnSpc>
-                <a:spcPct val="90000"/>
-              </a:lnSpc>
+              <a:rPr lang="en-US" sz="1200" dirty="0">
+                <a:latin typeface="Consolas" panose="020B0609020204030204" pitchFamily="49" charset="0"/>
+                <a:cs typeface="Consolas" panose="020B0609020204030204" pitchFamily="49" charset="0"/>
+              </a:rPr>
+              <a:t>&lt;</a:t>
+            </a:r>
+            <a:r>
+              <a:rPr lang="en-US" sz="1200" dirty="0" err="1">
+                <a:latin typeface="Consolas" panose="020B0609020204030204" pitchFamily="49" charset="0"/>
+                <a:cs typeface="Consolas" panose="020B0609020204030204" pitchFamily="49" charset="0"/>
+              </a:rPr>
+              <a:t>tsduck</a:t>
+            </a:r>
+            <a:r>
+              <a:rPr lang="en-US" sz="1200" dirty="0">
+                <a:latin typeface="Consolas" panose="020B0609020204030204" pitchFamily="49" charset="0"/>
+                <a:cs typeface="Consolas" panose="020B0609020204030204" pitchFamily="49" charset="0"/>
+              </a:rPr>
+              <a:t>&gt;</a:t>
+            </a:r>
+          </a:p>
+          <a:p>
+            <a:pPr marL="0" indent="0">
+              <a:buNone/>
             </a:pPr>
             <a:r>
-              <a:rPr lang="en-US" dirty="0"/>
-              <a:t>r</a:t>
-            </a:r>
-            <a:r>
-              <a:rPr lang="en-US" dirty="0" smtClean="0"/>
-              <a:t>eview utilities and plugins</a:t>
-            </a:r>
-          </a:p>
-          <a:p>
-            <a:pPr>
-              <a:lnSpc>
-                <a:spcPct val="90000"/>
-              </a:lnSpc>
+              <a:rPr lang="en-US" sz="1200" dirty="0">
+                <a:latin typeface="Consolas" panose="020B0609020204030204" pitchFamily="49" charset="0"/>
+                <a:cs typeface="Consolas" panose="020B0609020204030204" pitchFamily="49" charset="0"/>
+              </a:rPr>
+              <a:t>  &lt;PAT version="8" </a:t>
+            </a:r>
+            <a:r>
+              <a:rPr lang="en-US" sz="1200" dirty="0" err="1" smtClean="0">
+                <a:latin typeface="Consolas" panose="020B0609020204030204" pitchFamily="49" charset="0"/>
+                <a:cs typeface="Consolas" panose="020B0609020204030204" pitchFamily="49" charset="0"/>
+              </a:rPr>
+              <a:t>transport_stream_id</a:t>
+            </a:r>
+            <a:r>
+              <a:rPr lang="en-US" sz="1200" dirty="0">
+                <a:latin typeface="Consolas" panose="020B0609020204030204" pitchFamily="49" charset="0"/>
+                <a:cs typeface="Consolas" panose="020B0609020204030204" pitchFamily="49" charset="0"/>
+              </a:rPr>
+              <a:t>="0x0012" </a:t>
+            </a:r>
+            <a:r>
+              <a:rPr lang="en-US" sz="1200" dirty="0" err="1">
+                <a:latin typeface="Consolas" panose="020B0609020204030204" pitchFamily="49" charset="0"/>
+                <a:cs typeface="Consolas" panose="020B0609020204030204" pitchFamily="49" charset="0"/>
+              </a:rPr>
+              <a:t>network_PID</a:t>
+            </a:r>
+            <a:r>
+              <a:rPr lang="en-US" sz="1200" dirty="0">
+                <a:latin typeface="Consolas" panose="020B0609020204030204" pitchFamily="49" charset="0"/>
+                <a:cs typeface="Consolas" panose="020B0609020204030204" pitchFamily="49" charset="0"/>
+              </a:rPr>
+              <a:t>="0x0010"&gt;</a:t>
+            </a:r>
+          </a:p>
+          <a:p>
+            <a:pPr marL="0" indent="0">
+              <a:buNone/>
             </a:pPr>
             <a:r>
-              <a:rPr lang="en-US" dirty="0" smtClean="0"/>
-              <a:t>Try to extend an existing utility or plugin</a:t>
-            </a:r>
-          </a:p>
-          <a:p>
-            <a:pPr lvl="1">
-              <a:lnSpc>
-                <a:spcPct val="90000"/>
-              </a:lnSpc>
+              <a:rPr lang="en-US" sz="1200" dirty="0">
+                <a:latin typeface="Consolas" panose="020B0609020204030204" pitchFamily="49" charset="0"/>
+                <a:cs typeface="Consolas" panose="020B0609020204030204" pitchFamily="49" charset="0"/>
+              </a:rPr>
+              <a:t>    &lt;service </a:t>
+            </a:r>
+            <a:r>
+              <a:rPr lang="en-US" sz="1200" dirty="0" err="1">
+                <a:latin typeface="Consolas" panose="020B0609020204030204" pitchFamily="49" charset="0"/>
+                <a:cs typeface="Consolas" panose="020B0609020204030204" pitchFamily="49" charset="0"/>
+              </a:rPr>
+              <a:t>service_id</a:t>
+            </a:r>
+            <a:r>
+              <a:rPr lang="en-US" sz="1200" dirty="0">
+                <a:latin typeface="Consolas" panose="020B0609020204030204" pitchFamily="49" charset="0"/>
+                <a:cs typeface="Consolas" panose="020B0609020204030204" pitchFamily="49" charset="0"/>
+              </a:rPr>
+              <a:t>="0x0001" </a:t>
+            </a:r>
+            <a:r>
+              <a:rPr lang="en-US" sz="1200" dirty="0" err="1">
+                <a:latin typeface="Consolas" panose="020B0609020204030204" pitchFamily="49" charset="0"/>
+                <a:cs typeface="Consolas" panose="020B0609020204030204" pitchFamily="49" charset="0"/>
+              </a:rPr>
+              <a:t>program_map_PID</a:t>
+            </a:r>
+            <a:r>
+              <a:rPr lang="en-US" sz="1200" dirty="0">
+                <a:latin typeface="Consolas" panose="020B0609020204030204" pitchFamily="49" charset="0"/>
+                <a:cs typeface="Consolas" panose="020B0609020204030204" pitchFamily="49" charset="0"/>
+              </a:rPr>
+              <a:t>="0x1234"/&gt;</a:t>
+            </a:r>
+          </a:p>
+          <a:p>
+            <a:pPr marL="0" indent="0">
+              <a:buNone/>
             </a:pPr>
             <a:r>
-              <a:rPr lang="en-US" dirty="0"/>
-              <a:t>a</a:t>
-            </a:r>
-            <a:r>
-              <a:rPr lang="en-US" dirty="0" smtClean="0"/>
-              <a:t>dd new options</a:t>
-            </a:r>
-          </a:p>
-          <a:p>
-            <a:pPr lvl="1">
-              <a:lnSpc>
-                <a:spcPct val="90000"/>
-              </a:lnSpc>
+              <a:rPr lang="en-US" sz="1200" dirty="0">
+                <a:latin typeface="Consolas" panose="020B0609020204030204" pitchFamily="49" charset="0"/>
+                <a:cs typeface="Consolas" panose="020B0609020204030204" pitchFamily="49" charset="0"/>
+              </a:rPr>
+              <a:t>    &lt;service </a:t>
+            </a:r>
+            <a:r>
+              <a:rPr lang="en-US" sz="1200" dirty="0" err="1">
+                <a:latin typeface="Consolas" panose="020B0609020204030204" pitchFamily="49" charset="0"/>
+                <a:cs typeface="Consolas" panose="020B0609020204030204" pitchFamily="49" charset="0"/>
+              </a:rPr>
+              <a:t>service_id</a:t>
+            </a:r>
+            <a:r>
+              <a:rPr lang="en-US" sz="1200" dirty="0">
+                <a:latin typeface="Consolas" panose="020B0609020204030204" pitchFamily="49" charset="0"/>
+                <a:cs typeface="Consolas" panose="020B0609020204030204" pitchFamily="49" charset="0"/>
+              </a:rPr>
+              <a:t>="0x0002" </a:t>
+            </a:r>
+            <a:r>
+              <a:rPr lang="en-US" sz="1200" dirty="0" err="1">
+                <a:latin typeface="Consolas" panose="020B0609020204030204" pitchFamily="49" charset="0"/>
+                <a:cs typeface="Consolas" panose="020B0609020204030204" pitchFamily="49" charset="0"/>
+              </a:rPr>
+              <a:t>program_map_PID</a:t>
+            </a:r>
+            <a:r>
+              <a:rPr lang="en-US" sz="1200" dirty="0">
+                <a:latin typeface="Consolas" panose="020B0609020204030204" pitchFamily="49" charset="0"/>
+                <a:cs typeface="Consolas" panose="020B0609020204030204" pitchFamily="49" charset="0"/>
+              </a:rPr>
+              <a:t>="0x0678"/&gt;</a:t>
+            </a:r>
+          </a:p>
+          <a:p>
+            <a:pPr marL="0" indent="0">
+              <a:buNone/>
             </a:pPr>
             <a:r>
-              <a:rPr lang="en-US" dirty="0"/>
-              <a:t>a</a:t>
-            </a:r>
-            <a:r>
-              <a:rPr lang="en-US" dirty="0" smtClean="0"/>
-              <a:t>dd features, don’t modify existing behavior</a:t>
-            </a:r>
-          </a:p>
-          <a:p>
-            <a:pPr lvl="1">
-              <a:lnSpc>
-                <a:spcPct val="90000"/>
-              </a:lnSpc>
+              <a:rPr lang="en-US" sz="1200" dirty="0">
+                <a:latin typeface="Consolas" panose="020B0609020204030204" pitchFamily="49" charset="0"/>
+                <a:cs typeface="Consolas" panose="020B0609020204030204" pitchFamily="49" charset="0"/>
+              </a:rPr>
+              <a:t>  &lt;/PAT</a:t>
+            </a:r>
+            <a:r>
+              <a:rPr lang="en-US" sz="1200" dirty="0" smtClean="0">
+                <a:latin typeface="Consolas" panose="020B0609020204030204" pitchFamily="49" charset="0"/>
+                <a:cs typeface="Consolas" panose="020B0609020204030204" pitchFamily="49" charset="0"/>
+              </a:rPr>
+              <a:t>&gt;</a:t>
+            </a:r>
+          </a:p>
+          <a:p>
+            <a:pPr marL="0" indent="0">
+              <a:buNone/>
             </a:pPr>
             <a:r>
-              <a:rPr lang="en-US" dirty="0"/>
-              <a:t>r</a:t>
-            </a:r>
-            <a:r>
-              <a:rPr lang="en-US" dirty="0" smtClean="0"/>
-              <a:t>emain upward compatible</a:t>
-            </a:r>
-          </a:p>
-          <a:p>
-            <a:pPr>
-              <a:lnSpc>
-                <a:spcPct val="90000"/>
-              </a:lnSpc>
+              <a:rPr lang="en-US" sz="1200" dirty="0">
+                <a:latin typeface="Consolas" panose="020B0609020204030204" pitchFamily="49" charset="0"/>
+                <a:cs typeface="Consolas" panose="020B0609020204030204" pitchFamily="49" charset="0"/>
+              </a:rPr>
+              <a:t> &lt;PMT version="4" </a:t>
+            </a:r>
+            <a:r>
+              <a:rPr lang="en-US" sz="1200" dirty="0" err="1" smtClean="0">
+                <a:latin typeface="Consolas" panose="020B0609020204030204" pitchFamily="49" charset="0"/>
+                <a:cs typeface="Consolas" panose="020B0609020204030204" pitchFamily="49" charset="0"/>
+              </a:rPr>
+              <a:t>service_id</a:t>
+            </a:r>
+            <a:r>
+              <a:rPr lang="en-US" sz="1200" dirty="0">
+                <a:latin typeface="Consolas" panose="020B0609020204030204" pitchFamily="49" charset="0"/>
+                <a:cs typeface="Consolas" panose="020B0609020204030204" pitchFamily="49" charset="0"/>
+              </a:rPr>
+              <a:t>="0x0456" PCR_PID="0x1234"&gt;</a:t>
+            </a:r>
+          </a:p>
+          <a:p>
+            <a:pPr marL="0" indent="0">
+              <a:buNone/>
             </a:pPr>
             <a:r>
-              <a:rPr lang="en-US" dirty="0" smtClean="0"/>
-              <a:t>Develop your own plugin</a:t>
-            </a:r>
-          </a:p>
-          <a:p>
-            <a:pPr lvl="1">
-              <a:lnSpc>
-                <a:spcPct val="90000"/>
-              </a:lnSpc>
+              <a:rPr lang="en-US" sz="1200" dirty="0">
+                <a:latin typeface="Consolas" panose="020B0609020204030204" pitchFamily="49" charset="0"/>
+                <a:cs typeface="Consolas" panose="020B0609020204030204" pitchFamily="49" charset="0"/>
+              </a:rPr>
+              <a:t>    &lt;</a:t>
+            </a:r>
+            <a:r>
+              <a:rPr lang="en-US" sz="1200" dirty="0" err="1">
+                <a:latin typeface="Consolas" panose="020B0609020204030204" pitchFamily="49" charset="0"/>
+                <a:cs typeface="Consolas" panose="020B0609020204030204" pitchFamily="49" charset="0"/>
+              </a:rPr>
+              <a:t>CA_descriptor</a:t>
+            </a:r>
+            <a:r>
+              <a:rPr lang="en-US" sz="1200" dirty="0">
+                <a:latin typeface="Consolas" panose="020B0609020204030204" pitchFamily="49" charset="0"/>
+                <a:cs typeface="Consolas" panose="020B0609020204030204" pitchFamily="49" charset="0"/>
+              </a:rPr>
+              <a:t> </a:t>
+            </a:r>
+            <a:r>
+              <a:rPr lang="en-US" sz="1200" dirty="0" err="1">
+                <a:latin typeface="Consolas" panose="020B0609020204030204" pitchFamily="49" charset="0"/>
+                <a:cs typeface="Consolas" panose="020B0609020204030204" pitchFamily="49" charset="0"/>
+              </a:rPr>
+              <a:t>CA_system_id</a:t>
+            </a:r>
+            <a:r>
+              <a:rPr lang="en-US" sz="1200" dirty="0">
+                <a:latin typeface="Consolas" panose="020B0609020204030204" pitchFamily="49" charset="0"/>
+                <a:cs typeface="Consolas" panose="020B0609020204030204" pitchFamily="49" charset="0"/>
+              </a:rPr>
+              <a:t>="0x0777" CA_PID="0x0251"/&gt;</a:t>
+            </a:r>
+          </a:p>
+          <a:p>
+            <a:pPr marL="0" indent="0">
+              <a:buNone/>
             </a:pPr>
             <a:r>
-              <a:rPr lang="en-US" dirty="0"/>
-              <a:t>i</a:t>
-            </a:r>
-            <a:r>
-              <a:rPr lang="en-US" dirty="0" smtClean="0"/>
-              <a:t>t is quite simple, really</a:t>
-            </a:r>
-          </a:p>
-          <a:p>
-            <a:pPr>
-              <a:lnSpc>
-                <a:spcPct val="90000"/>
-              </a:lnSpc>
+              <a:rPr lang="en-US" sz="1200" dirty="0">
+                <a:latin typeface="Consolas" panose="020B0609020204030204" pitchFamily="49" charset="0"/>
+                <a:cs typeface="Consolas" panose="020B0609020204030204" pitchFamily="49" charset="0"/>
+              </a:rPr>
+              <a:t>    &lt;component </a:t>
+            </a:r>
+            <a:r>
+              <a:rPr lang="en-US" sz="1200" dirty="0" err="1">
+                <a:latin typeface="Consolas" panose="020B0609020204030204" pitchFamily="49" charset="0"/>
+                <a:cs typeface="Consolas" panose="020B0609020204030204" pitchFamily="49" charset="0"/>
+              </a:rPr>
+              <a:t>elementary_PID</a:t>
+            </a:r>
+            <a:r>
+              <a:rPr lang="en-US" sz="1200" dirty="0">
+                <a:latin typeface="Consolas" panose="020B0609020204030204" pitchFamily="49" charset="0"/>
+                <a:cs typeface="Consolas" panose="020B0609020204030204" pitchFamily="49" charset="0"/>
+              </a:rPr>
+              <a:t>="0x0567" </a:t>
+            </a:r>
+            <a:r>
+              <a:rPr lang="en-US" sz="1200" dirty="0" err="1">
+                <a:latin typeface="Consolas" panose="020B0609020204030204" pitchFamily="49" charset="0"/>
+                <a:cs typeface="Consolas" panose="020B0609020204030204" pitchFamily="49" charset="0"/>
+              </a:rPr>
+              <a:t>stream_type</a:t>
+            </a:r>
+            <a:r>
+              <a:rPr lang="en-US" sz="1200" dirty="0">
+                <a:latin typeface="Consolas" panose="020B0609020204030204" pitchFamily="49" charset="0"/>
+                <a:cs typeface="Consolas" panose="020B0609020204030204" pitchFamily="49" charset="0"/>
+              </a:rPr>
+              <a:t>="0x12"&gt;</a:t>
+            </a:r>
+          </a:p>
+          <a:p>
+            <a:pPr marL="0" indent="0">
+              <a:buNone/>
             </a:pPr>
             <a:r>
-              <a:rPr lang="en-US" dirty="0" smtClean="0"/>
-              <a:t>Send your code back to TSDuck maintainer</a:t>
-            </a:r>
-          </a:p>
-          <a:p>
-            <a:pPr lvl="1">
-              <a:lnSpc>
-                <a:spcPct val="90000"/>
-              </a:lnSpc>
+              <a:rPr lang="en-US" sz="1200" dirty="0">
+                <a:latin typeface="Consolas" panose="020B0609020204030204" pitchFamily="49" charset="0"/>
+                <a:cs typeface="Consolas" panose="020B0609020204030204" pitchFamily="49" charset="0"/>
+              </a:rPr>
+              <a:t>      &lt;ISO_639_language_descriptor&gt;</a:t>
+            </a:r>
+          </a:p>
+          <a:p>
+            <a:pPr marL="0" indent="0">
+              <a:buNone/>
             </a:pPr>
             <a:r>
-              <a:rPr lang="en-US" dirty="0"/>
-              <a:t>s</a:t>
-            </a:r>
-            <a:r>
-              <a:rPr lang="en-US" dirty="0" smtClean="0"/>
-              <a:t>o that everyone can benefit from it</a:t>
+              <a:rPr lang="en-US" sz="1200" dirty="0">
+                <a:latin typeface="Consolas" panose="020B0609020204030204" pitchFamily="49" charset="0"/>
+                <a:cs typeface="Consolas" panose="020B0609020204030204" pitchFamily="49" charset="0"/>
+              </a:rPr>
+              <a:t>        &lt;language code="</a:t>
+            </a:r>
+            <a:r>
+              <a:rPr lang="en-US" sz="1200" dirty="0" err="1">
+                <a:latin typeface="Consolas" panose="020B0609020204030204" pitchFamily="49" charset="0"/>
+                <a:cs typeface="Consolas" panose="020B0609020204030204" pitchFamily="49" charset="0"/>
+              </a:rPr>
+              <a:t>fre</a:t>
+            </a:r>
+            <a:r>
+              <a:rPr lang="en-US" sz="1200" dirty="0">
+                <a:latin typeface="Consolas" panose="020B0609020204030204" pitchFamily="49" charset="0"/>
+                <a:cs typeface="Consolas" panose="020B0609020204030204" pitchFamily="49" charset="0"/>
+              </a:rPr>
+              <a:t>" </a:t>
+            </a:r>
+            <a:r>
+              <a:rPr lang="en-US" sz="1200" dirty="0" err="1">
+                <a:latin typeface="Consolas" panose="020B0609020204030204" pitchFamily="49" charset="0"/>
+                <a:cs typeface="Consolas" panose="020B0609020204030204" pitchFamily="49" charset="0"/>
+              </a:rPr>
+              <a:t>audio_type</a:t>
+            </a:r>
+            <a:r>
+              <a:rPr lang="en-US" sz="1200" dirty="0">
+                <a:latin typeface="Consolas" panose="020B0609020204030204" pitchFamily="49" charset="0"/>
+                <a:cs typeface="Consolas" panose="020B0609020204030204" pitchFamily="49" charset="0"/>
+              </a:rPr>
+              <a:t>="0x45"/&gt;</a:t>
+            </a:r>
+          </a:p>
+          <a:p>
+            <a:pPr marL="0" indent="0">
+              <a:buNone/>
+            </a:pPr>
+            <a:r>
+              <a:rPr lang="en-US" sz="1200" dirty="0">
+                <a:latin typeface="Consolas" panose="020B0609020204030204" pitchFamily="49" charset="0"/>
+                <a:cs typeface="Consolas" panose="020B0609020204030204" pitchFamily="49" charset="0"/>
+              </a:rPr>
+              <a:t>        &lt;language code="</a:t>
+            </a:r>
+            <a:r>
+              <a:rPr lang="en-US" sz="1200" dirty="0" err="1">
+                <a:latin typeface="Consolas" panose="020B0609020204030204" pitchFamily="49" charset="0"/>
+                <a:cs typeface="Consolas" panose="020B0609020204030204" pitchFamily="49" charset="0"/>
+              </a:rPr>
+              <a:t>deu</a:t>
+            </a:r>
+            <a:r>
+              <a:rPr lang="en-US" sz="1200" dirty="0">
+                <a:latin typeface="Consolas" panose="020B0609020204030204" pitchFamily="49" charset="0"/>
+                <a:cs typeface="Consolas" panose="020B0609020204030204" pitchFamily="49" charset="0"/>
+              </a:rPr>
+              <a:t>" </a:t>
+            </a:r>
+            <a:r>
+              <a:rPr lang="en-US" sz="1200" dirty="0" err="1">
+                <a:latin typeface="Consolas" panose="020B0609020204030204" pitchFamily="49" charset="0"/>
+                <a:cs typeface="Consolas" panose="020B0609020204030204" pitchFamily="49" charset="0"/>
+              </a:rPr>
+              <a:t>audio_type</a:t>
+            </a:r>
+            <a:r>
+              <a:rPr lang="en-US" sz="1200" dirty="0">
+                <a:latin typeface="Consolas" panose="020B0609020204030204" pitchFamily="49" charset="0"/>
+                <a:cs typeface="Consolas" panose="020B0609020204030204" pitchFamily="49" charset="0"/>
+              </a:rPr>
+              <a:t>="0x78"/&gt;</a:t>
+            </a:r>
+          </a:p>
+          <a:p>
+            <a:pPr marL="0" indent="0">
+              <a:buNone/>
+            </a:pPr>
+            <a:r>
+              <a:rPr lang="en-US" sz="1200" dirty="0">
+                <a:latin typeface="Consolas" panose="020B0609020204030204" pitchFamily="49" charset="0"/>
+                <a:cs typeface="Consolas" panose="020B0609020204030204" pitchFamily="49" charset="0"/>
+              </a:rPr>
+              <a:t>      &lt;/ISO_639_language_descriptor&gt;</a:t>
+            </a:r>
+          </a:p>
+          <a:p>
+            <a:pPr marL="0" indent="0">
+              <a:buNone/>
+            </a:pPr>
+            <a:r>
+              <a:rPr lang="en-US" sz="1200" dirty="0">
+                <a:latin typeface="Consolas" panose="020B0609020204030204" pitchFamily="49" charset="0"/>
+                <a:cs typeface="Consolas" panose="020B0609020204030204" pitchFamily="49" charset="0"/>
+              </a:rPr>
+              <a:t>    &lt;/component&gt;</a:t>
+            </a:r>
+          </a:p>
+          <a:p>
+            <a:pPr marL="0" indent="0">
+              <a:buNone/>
+            </a:pPr>
+            <a:r>
+              <a:rPr lang="en-US" sz="1200" dirty="0">
+                <a:latin typeface="Consolas" panose="020B0609020204030204" pitchFamily="49" charset="0"/>
+                <a:cs typeface="Consolas" panose="020B0609020204030204" pitchFamily="49" charset="0"/>
+              </a:rPr>
+              <a:t>  &lt;/PMT</a:t>
+            </a:r>
+            <a:r>
+              <a:rPr lang="en-US" sz="1200" dirty="0" smtClean="0">
+                <a:latin typeface="Consolas" panose="020B0609020204030204" pitchFamily="49" charset="0"/>
+                <a:cs typeface="Consolas" panose="020B0609020204030204" pitchFamily="49" charset="0"/>
+              </a:rPr>
+              <a:t>&gt;</a:t>
+            </a:r>
+          </a:p>
+          <a:p>
+            <a:pPr marL="0" indent="0">
+              <a:buNone/>
+            </a:pPr>
+            <a:r>
+              <a:rPr lang="en-US" sz="1200" dirty="0">
+                <a:latin typeface="Consolas" panose="020B0609020204030204" pitchFamily="49" charset="0"/>
+                <a:cs typeface="Consolas" panose="020B0609020204030204" pitchFamily="49" charset="0"/>
+              </a:rPr>
+              <a:t>&lt;/</a:t>
+            </a:r>
+            <a:r>
+              <a:rPr lang="en-US" sz="1200" dirty="0" err="1">
+                <a:latin typeface="Consolas" panose="020B0609020204030204" pitchFamily="49" charset="0"/>
+                <a:cs typeface="Consolas" panose="020B0609020204030204" pitchFamily="49" charset="0"/>
+              </a:rPr>
+              <a:t>tsduck</a:t>
+            </a:r>
+            <a:r>
+              <a:rPr lang="en-US" sz="1200" dirty="0" smtClean="0">
+                <a:latin typeface="Consolas" panose="020B0609020204030204" pitchFamily="49" charset="0"/>
+                <a:cs typeface="Consolas" panose="020B0609020204030204" pitchFamily="49" charset="0"/>
+              </a:rPr>
+              <a:t>&gt;</a:t>
+            </a:r>
+          </a:p>
+          <a:p>
+            <a:pPr marL="0" indent="0">
+              <a:buNone/>
+            </a:pPr>
+            <a:endParaRPr lang="en-US" sz="1200" dirty="0">
+              <a:latin typeface="Consolas" panose="020B0609020204030204" pitchFamily="49" charset="0"/>
+              <a:cs typeface="Consolas" panose="020B0609020204030204" pitchFamily="49" charset="0"/>
+            </a:endParaRPr>
+          </a:p>
+          <a:p>
+            <a:r>
+              <a:rPr lang="en-US" dirty="0" smtClean="0"/>
+              <a:t>Reference format in user’s guide</a:t>
             </a:r>
             <a:endParaRPr lang="en-US" dirty="0"/>
           </a:p>
@@ -12099,7 +12431,7 @@
           <a:p>
             <a:r>
               <a:rPr lang="en-US" dirty="0" smtClean="0"/>
-              <a:t>Why extending TSDuck ?</a:t>
+              <a:t>Sample XML source file</a:t>
             </a:r>
             <a:endParaRPr lang="en-US" dirty="0"/>
           </a:p>
@@ -12108,7 +12440,7 @@
     </p:spTree>
     <p:extLst>
       <p:ext uri="{BB962C8B-B14F-4D97-AF65-F5344CB8AC3E}">
-        <p14:creationId xmlns:p14="http://schemas.microsoft.com/office/powerpoint/2010/main" val="838391798"/>
+        <p14:creationId xmlns:p14="http://schemas.microsoft.com/office/powerpoint/2010/main" val="3506414220"/>
       </p:ext>
     </p:extLst>
   </p:cSld>
@@ -12156,170 +12488,338 @@
       </p:grpSpPr>
       <p:sp>
         <p:nvSpPr>
-          <p:cNvPr id="5" name="Rectangle à coins arrondis 4"/>
-          <p:cNvSpPr/>
-          <p:nvPr/>
-        </p:nvSpPr>
-        <p:spPr>
-          <a:xfrm>
-            <a:off x="907756" y="3995582"/>
-            <a:ext cx="1944216" cy="432048"/>
-          </a:xfrm>
-          <a:prstGeom prst="roundRect">
-            <a:avLst/>
-          </a:prstGeom>
-          <a:solidFill>
-            <a:srgbClr val="C5E0B4"/>
-          </a:solidFill>
-          <a:ln w="19050">
-            <a:solidFill>
-              <a:srgbClr val="00B050"/>
-            </a:solidFill>
-            <a:tailEnd type="stealth"/>
-          </a:ln>
-        </p:spPr>
-        <p:style>
-          <a:lnRef idx="2">
-            <a:schemeClr val="accent1">
-              <a:shade val="50000"/>
-            </a:schemeClr>
-          </a:lnRef>
-          <a:fillRef idx="1">
-            <a:schemeClr val="accent1"/>
-          </a:fillRef>
-          <a:effectRef idx="0">
-            <a:schemeClr val="accent1"/>
-          </a:effectRef>
-          <a:fontRef idx="minor">
-            <a:schemeClr val="lt1"/>
-          </a:fontRef>
-        </p:style>
-        <p:txBody>
-          <a:bodyPr rtlCol="0" anchor="ctr"/>
-          <a:lstStyle/>
-          <a:p>
-            <a:pPr algn="ctr"/>
-            <a:endParaRPr lang="en-US" sz="1600" dirty="0">
-              <a:solidFill>
-                <a:schemeClr val="tx1"/>
-              </a:solidFill>
+          <p:cNvPr id="2" name="Espace réservé du contenu 1"/>
+          <p:cNvSpPr>
+            <a:spLocks noGrp="1"/>
+          </p:cNvSpPr>
+          <p:nvPr>
+            <p:ph idx="1"/>
+          </p:nvPr>
+        </p:nvSpPr>
+        <p:spPr/>
+        <p:txBody>
+          <a:bodyPr>
+            <a:normAutofit lnSpcReduction="10000"/>
+          </a:bodyPr>
+          <a:lstStyle/>
+          <a:p>
+            <a:r>
+              <a:rPr lang="en-US" dirty="0" smtClean="0"/>
+              <a:t>Capture a table from a stream</a:t>
+            </a:r>
+          </a:p>
+          <a:p>
+            <a:pPr marL="628650" lvl="2" indent="0">
+              <a:buNone/>
+            </a:pPr>
+            <a:r>
+              <a:rPr lang="en-US" sz="1600" b="1" dirty="0">
+                <a:latin typeface="Consolas" panose="020B0609020204030204" pitchFamily="49" charset="0"/>
+                <a:cs typeface="Consolas" panose="020B0609020204030204" pitchFamily="49" charset="0"/>
+              </a:rPr>
+              <a:t>tsp -I </a:t>
+            </a:r>
+            <a:r>
+              <a:rPr lang="en-US" sz="1600" b="1" dirty="0" err="1">
+                <a:latin typeface="Consolas" panose="020B0609020204030204" pitchFamily="49" charset="0"/>
+                <a:cs typeface="Consolas" panose="020B0609020204030204" pitchFamily="49" charset="0"/>
+              </a:rPr>
+              <a:t>dvb</a:t>
+            </a:r>
+            <a:r>
+              <a:rPr lang="en-US" sz="1600" b="1" dirty="0">
+                <a:latin typeface="Consolas" panose="020B0609020204030204" pitchFamily="49" charset="0"/>
+                <a:cs typeface="Consolas" panose="020B0609020204030204" pitchFamily="49" charset="0"/>
+              </a:rPr>
+              <a:t> … </a:t>
+            </a:r>
+            <a:r>
+              <a:rPr lang="en-US" sz="1600" b="1" dirty="0">
+                <a:latin typeface="Consolas" panose="020B0609020204030204" pitchFamily="49" charset="0"/>
+                <a:cs typeface="Consolas" panose="020B0609020204030204" pitchFamily="49" charset="0"/>
+              </a:rPr>
+              <a:t>-</a:t>
+            </a:r>
+            <a:r>
+              <a:rPr lang="en-US" sz="1600" b="1" dirty="0">
+                <a:latin typeface="Consolas" panose="020B0609020204030204" pitchFamily="49" charset="0"/>
+                <a:cs typeface="Consolas" panose="020B0609020204030204" pitchFamily="49" charset="0"/>
+              </a:rPr>
+              <a:t>O </a:t>
+            </a:r>
+            <a:r>
+              <a:rPr lang="en-US" sz="1600" b="1" dirty="0">
+                <a:latin typeface="Consolas" panose="020B0609020204030204" pitchFamily="49" charset="0"/>
+                <a:cs typeface="Consolas" panose="020B0609020204030204" pitchFamily="49" charset="0"/>
+              </a:rPr>
+              <a:t>drop \</a:t>
+            </a:r>
+          </a:p>
+          <a:p>
+            <a:pPr marL="628650" lvl="2" indent="0">
+              <a:buNone/>
+            </a:pPr>
+            <a:r>
+              <a:rPr lang="en-US" sz="1600" b="1" dirty="0">
+                <a:latin typeface="Consolas" panose="020B0609020204030204" pitchFamily="49" charset="0"/>
+                <a:cs typeface="Consolas" panose="020B0609020204030204" pitchFamily="49" charset="0"/>
+              </a:rPr>
+              <a:t> </a:t>
+            </a:r>
+            <a:r>
+              <a:rPr lang="en-US" sz="1600" b="1" dirty="0">
+                <a:latin typeface="Consolas" panose="020B0609020204030204" pitchFamily="49" charset="0"/>
+                <a:cs typeface="Consolas" panose="020B0609020204030204" pitchFamily="49" charset="0"/>
+              </a:rPr>
+              <a:t>   -</a:t>
+            </a:r>
+            <a:r>
+              <a:rPr lang="en-US" sz="1600" b="1" dirty="0">
+                <a:latin typeface="Consolas" panose="020B0609020204030204" pitchFamily="49" charset="0"/>
+                <a:cs typeface="Consolas" panose="020B0609020204030204" pitchFamily="49" charset="0"/>
+              </a:rPr>
+              <a:t>P tables --</a:t>
+            </a:r>
+            <a:r>
+              <a:rPr lang="en-US" sz="1600" b="1" dirty="0" err="1">
+                <a:latin typeface="Consolas" panose="020B0609020204030204" pitchFamily="49" charset="0"/>
+                <a:cs typeface="Consolas" panose="020B0609020204030204" pitchFamily="49" charset="0"/>
+              </a:rPr>
+              <a:t>pid</a:t>
+            </a:r>
+            <a:r>
+              <a:rPr lang="en-US" sz="1600" b="1" dirty="0">
+                <a:latin typeface="Consolas" panose="020B0609020204030204" pitchFamily="49" charset="0"/>
+                <a:cs typeface="Consolas" panose="020B0609020204030204" pitchFamily="49" charset="0"/>
+              </a:rPr>
+              <a:t> 16 --</a:t>
+            </a:r>
+            <a:r>
+              <a:rPr lang="en-US" sz="1600" b="1" dirty="0" err="1">
+                <a:latin typeface="Consolas" panose="020B0609020204030204" pitchFamily="49" charset="0"/>
+                <a:cs typeface="Consolas" panose="020B0609020204030204" pitchFamily="49" charset="0"/>
+              </a:rPr>
+              <a:t>tid</a:t>
+            </a:r>
+            <a:r>
+              <a:rPr lang="en-US" sz="1600" b="1" dirty="0">
+                <a:latin typeface="Consolas" panose="020B0609020204030204" pitchFamily="49" charset="0"/>
+                <a:cs typeface="Consolas" panose="020B0609020204030204" pitchFamily="49" charset="0"/>
+              </a:rPr>
+              <a:t> 0x40 --max 1 --bin </a:t>
+            </a:r>
+            <a:r>
+              <a:rPr lang="en-US" sz="1600" b="1" dirty="0" err="1" smtClean="0">
+                <a:latin typeface="Consolas" panose="020B0609020204030204" pitchFamily="49" charset="0"/>
+                <a:cs typeface="Consolas" panose="020B0609020204030204" pitchFamily="49" charset="0"/>
+              </a:rPr>
+              <a:t>nit.bin</a:t>
+            </a:r>
+            <a:endParaRPr lang="en-US" sz="1600" b="1" dirty="0">
+              <a:latin typeface="Consolas" panose="020B0609020204030204" pitchFamily="49" charset="0"/>
+              <a:cs typeface="Consolas" panose="020B0609020204030204" pitchFamily="49" charset="0"/>
             </a:endParaRPr>
           </a:p>
-        </p:txBody>
-      </p:sp>
-      <p:sp>
-        <p:nvSpPr>
-          <p:cNvPr id="2" name="Espace réservé du contenu 1"/>
+          <a:p>
+            <a:r>
+              <a:rPr lang="en-US" dirty="0" smtClean="0"/>
+              <a:t>Decompile the binary table into an XML file</a:t>
+            </a:r>
+          </a:p>
+          <a:p>
+            <a:pPr marL="628650" lvl="2" indent="0">
+              <a:buNone/>
+            </a:pPr>
+            <a:r>
+              <a:rPr lang="en-US" sz="1600" b="1" dirty="0">
+                <a:latin typeface="Consolas" panose="020B0609020204030204" pitchFamily="49" charset="0"/>
+                <a:cs typeface="Consolas" panose="020B0609020204030204" pitchFamily="49" charset="0"/>
+              </a:rPr>
+              <a:t>tstabcomp </a:t>
+            </a:r>
+            <a:r>
+              <a:rPr lang="en-US" sz="1600" b="1" dirty="0" err="1">
+                <a:latin typeface="Consolas" panose="020B0609020204030204" pitchFamily="49" charset="0"/>
+                <a:cs typeface="Consolas" panose="020B0609020204030204" pitchFamily="49" charset="0"/>
+              </a:rPr>
+              <a:t>nit.bin</a:t>
+            </a:r>
+            <a:endParaRPr lang="en-US" sz="1600" b="1" dirty="0">
+              <a:latin typeface="Consolas" panose="020B0609020204030204" pitchFamily="49" charset="0"/>
+              <a:cs typeface="Consolas" panose="020B0609020204030204" pitchFamily="49" charset="0"/>
+            </a:endParaRPr>
+          </a:p>
+          <a:p>
+            <a:r>
+              <a:rPr lang="en-US" dirty="0" smtClean="0"/>
+              <a:t>Manually edit the XML file with a text editor</a:t>
+            </a:r>
+          </a:p>
+          <a:p>
+            <a:r>
+              <a:rPr lang="en-US" dirty="0" smtClean="0"/>
+              <a:t>Recompile the XML file into a binary table</a:t>
+            </a:r>
+          </a:p>
+          <a:p>
+            <a:pPr marL="628650" lvl="2" indent="0">
+              <a:buNone/>
+            </a:pPr>
+            <a:r>
+              <a:rPr lang="en-US" sz="1600" b="1" dirty="0">
+                <a:latin typeface="Consolas" panose="020B0609020204030204" pitchFamily="49" charset="0"/>
+                <a:cs typeface="Consolas" panose="020B0609020204030204" pitchFamily="49" charset="0"/>
+              </a:rPr>
+              <a:t>tstabcomp </a:t>
+            </a:r>
+            <a:r>
+              <a:rPr lang="en-US" sz="1600" b="1" dirty="0" smtClean="0">
+                <a:latin typeface="Consolas" panose="020B0609020204030204" pitchFamily="49" charset="0"/>
+                <a:cs typeface="Consolas" panose="020B0609020204030204" pitchFamily="49" charset="0"/>
+              </a:rPr>
+              <a:t>nit.xml</a:t>
+            </a:r>
+            <a:endParaRPr lang="en-US" sz="1600" b="1" dirty="0">
+              <a:latin typeface="Consolas" panose="020B0609020204030204" pitchFamily="49" charset="0"/>
+              <a:cs typeface="Consolas" panose="020B0609020204030204" pitchFamily="49" charset="0"/>
+            </a:endParaRPr>
+          </a:p>
+          <a:p>
+            <a:r>
+              <a:rPr lang="en-US" dirty="0" smtClean="0"/>
+              <a:t>Inject the new table in the stream</a:t>
+            </a:r>
+          </a:p>
+          <a:p>
+            <a:pPr marL="628650" lvl="2" indent="0">
+              <a:buNone/>
+            </a:pPr>
+            <a:r>
+              <a:rPr lang="en-US" sz="1600" b="1" dirty="0" smtClean="0">
+                <a:latin typeface="Consolas" panose="020B0609020204030204" pitchFamily="49" charset="0"/>
+                <a:cs typeface="Consolas" panose="020B0609020204030204" pitchFamily="49" charset="0"/>
+              </a:rPr>
+              <a:t>tsp </a:t>
+            </a:r>
+            <a:r>
+              <a:rPr lang="en-US" sz="1600" b="1" dirty="0">
+                <a:latin typeface="Consolas" panose="020B0609020204030204" pitchFamily="49" charset="0"/>
+                <a:cs typeface="Consolas" panose="020B0609020204030204" pitchFamily="49" charset="0"/>
+              </a:rPr>
+              <a:t>-I </a:t>
+            </a:r>
+            <a:r>
+              <a:rPr lang="en-US" sz="1600" b="1" dirty="0" err="1">
+                <a:latin typeface="Consolas" panose="020B0609020204030204" pitchFamily="49" charset="0"/>
+                <a:cs typeface="Consolas" panose="020B0609020204030204" pitchFamily="49" charset="0"/>
+              </a:rPr>
+              <a:t>dvb</a:t>
+            </a:r>
+            <a:r>
+              <a:rPr lang="en-US" sz="1600" b="1" dirty="0">
+                <a:latin typeface="Consolas" panose="020B0609020204030204" pitchFamily="49" charset="0"/>
+                <a:cs typeface="Consolas" panose="020B0609020204030204" pitchFamily="49" charset="0"/>
+              </a:rPr>
+              <a:t> </a:t>
+            </a:r>
+            <a:r>
+              <a:rPr lang="en-US" sz="1600" b="1" dirty="0">
+                <a:latin typeface="Consolas" panose="020B0609020204030204" pitchFamily="49" charset="0"/>
+                <a:cs typeface="Consolas" panose="020B0609020204030204" pitchFamily="49" charset="0"/>
+              </a:rPr>
+              <a:t>… -P </a:t>
+            </a:r>
+            <a:r>
+              <a:rPr lang="en-US" sz="1600" b="1" dirty="0">
+                <a:latin typeface="Consolas" panose="020B0609020204030204" pitchFamily="49" charset="0"/>
+                <a:cs typeface="Consolas" panose="020B0609020204030204" pitchFamily="49" charset="0"/>
+              </a:rPr>
+              <a:t>inject </a:t>
+            </a:r>
+            <a:r>
+              <a:rPr lang="en-US" sz="1600" b="1" dirty="0" err="1">
+                <a:latin typeface="Consolas" panose="020B0609020204030204" pitchFamily="49" charset="0"/>
+                <a:cs typeface="Consolas" panose="020B0609020204030204" pitchFamily="49" charset="0"/>
+              </a:rPr>
+              <a:t>nit.bin</a:t>
+            </a:r>
+            <a:r>
+              <a:rPr lang="en-US" sz="1600" b="1" dirty="0">
+                <a:latin typeface="Consolas" panose="020B0609020204030204" pitchFamily="49" charset="0"/>
+                <a:cs typeface="Consolas" panose="020B0609020204030204" pitchFamily="49" charset="0"/>
+              </a:rPr>
+              <a:t> --</a:t>
+            </a:r>
+            <a:r>
+              <a:rPr lang="en-US" sz="1600" b="1" dirty="0" err="1">
+                <a:latin typeface="Consolas" panose="020B0609020204030204" pitchFamily="49" charset="0"/>
+                <a:cs typeface="Consolas" panose="020B0609020204030204" pitchFamily="49" charset="0"/>
+              </a:rPr>
+              <a:t>pid</a:t>
+            </a:r>
+            <a:r>
+              <a:rPr lang="en-US" sz="1600" b="1" dirty="0">
+                <a:latin typeface="Consolas" panose="020B0609020204030204" pitchFamily="49" charset="0"/>
+                <a:cs typeface="Consolas" panose="020B0609020204030204" pitchFamily="49" charset="0"/>
+              </a:rPr>
+              <a:t> 16 </a:t>
+            </a:r>
+            <a:r>
+              <a:rPr lang="en-US" sz="1600" b="1" dirty="0">
+                <a:latin typeface="Consolas" panose="020B0609020204030204" pitchFamily="49" charset="0"/>
+                <a:cs typeface="Consolas" panose="020B0609020204030204" pitchFamily="49" charset="0"/>
+              </a:rPr>
+              <a:t>… -</a:t>
+            </a:r>
+            <a:r>
+              <a:rPr lang="en-US" sz="1600" b="1" dirty="0">
+                <a:latin typeface="Consolas" panose="020B0609020204030204" pitchFamily="49" charset="0"/>
+                <a:cs typeface="Consolas" panose="020B0609020204030204" pitchFamily="49" charset="0"/>
+              </a:rPr>
+              <a:t>O </a:t>
+            </a:r>
+            <a:r>
+              <a:rPr lang="en-US" sz="1600" b="1" dirty="0" err="1">
+                <a:latin typeface="Consolas" panose="020B0609020204030204" pitchFamily="49" charset="0"/>
+                <a:cs typeface="Consolas" panose="020B0609020204030204" pitchFamily="49" charset="0"/>
+              </a:rPr>
+              <a:t>dektec</a:t>
+            </a:r>
+            <a:r>
+              <a:rPr lang="en-US" sz="1600" b="1" dirty="0">
+                <a:latin typeface="Consolas" panose="020B0609020204030204" pitchFamily="49" charset="0"/>
+                <a:cs typeface="Consolas" panose="020B0609020204030204" pitchFamily="49" charset="0"/>
+              </a:rPr>
+              <a:t> </a:t>
+            </a:r>
+            <a:r>
+              <a:rPr lang="en-US" sz="1600" b="1" dirty="0">
+                <a:latin typeface="Consolas" panose="020B0609020204030204" pitchFamily="49" charset="0"/>
+                <a:cs typeface="Consolas" panose="020B0609020204030204" pitchFamily="49" charset="0"/>
+              </a:rPr>
+              <a:t>…</a:t>
+            </a:r>
+          </a:p>
+        </p:txBody>
+      </p:sp>
+      <p:sp>
+        <p:nvSpPr>
+          <p:cNvPr id="3" name="Titre 2"/>
           <p:cNvSpPr>
             <a:spLocks noGrp="1"/>
           </p:cNvSpPr>
           <p:nvPr>
-            <p:ph idx="1"/>
+            <p:ph type="title"/>
           </p:nvPr>
         </p:nvSpPr>
         <p:spPr/>
         <p:txBody>
-          <a:bodyPr>
-            <a:normAutofit fontScale="92500" lnSpcReduction="10000"/>
-          </a:bodyPr>
-          <a:lstStyle/>
-          <a:p>
-            <a:r>
-              <a:rPr lang="en-US" dirty="0" smtClean="0"/>
-              <a:t>Don’t write a plugin from scratch</a:t>
-            </a:r>
-          </a:p>
-          <a:p>
-            <a:pPr lvl="1"/>
-            <a:r>
-              <a:rPr lang="en-US" dirty="0"/>
-              <a:t>u</a:t>
-            </a:r>
-            <a:r>
-              <a:rPr lang="en-US" dirty="0" smtClean="0"/>
-              <a:t>se an existing one as code base</a:t>
-            </a:r>
-          </a:p>
-          <a:p>
-            <a:pPr lvl="1"/>
-            <a:r>
-              <a:rPr lang="en-US" dirty="0"/>
-              <a:t>c</a:t>
-            </a:r>
-            <a:r>
-              <a:rPr lang="en-US" dirty="0" smtClean="0"/>
-              <a:t>hoose one which is technically similar</a:t>
-            </a:r>
-          </a:p>
-          <a:p>
-            <a:pPr lvl="2"/>
-            <a:r>
-              <a:rPr lang="en-US" dirty="0" smtClean="0"/>
-              <a:t>input?  output?  PSI/SI transformation?  packet filtering?</a:t>
-            </a:r>
-          </a:p>
-          <a:p>
-            <a:r>
-              <a:rPr lang="en-US" dirty="0" smtClean="0"/>
-              <a:t>Implement simple &amp; elementary features</a:t>
-            </a:r>
-          </a:p>
-          <a:p>
-            <a:pPr lvl="1"/>
-            <a:r>
-              <a:rPr lang="en-US" dirty="0"/>
-              <a:t>p</a:t>
-            </a:r>
-            <a:r>
-              <a:rPr lang="en-US" dirty="0" smtClean="0"/>
-              <a:t>reserve TSDuck philosophy</a:t>
-            </a:r>
-          </a:p>
-          <a:p>
-            <a:pPr lvl="2"/>
-            <a:r>
-              <a:rPr lang="en-US" dirty="0" smtClean="0"/>
-              <a:t>develop several elementary plugins if necessary</a:t>
-            </a:r>
-          </a:p>
-          <a:p>
-            <a:pPr lvl="2"/>
-            <a:r>
-              <a:rPr lang="en-US" dirty="0" smtClean="0"/>
-              <a:t>not a single big plugin implementing several features</a:t>
-            </a:r>
-          </a:p>
-          <a:p>
-            <a:pPr lvl="2"/>
-            <a:endParaRPr lang="en-US" dirty="0" smtClean="0"/>
-          </a:p>
-          <a:p>
-            <a:r>
-              <a:rPr lang="en-US" dirty="0" smtClean="0"/>
-              <a:t>RTFM as usual !</a:t>
-            </a:r>
-            <a:endParaRPr lang="en-US" dirty="0"/>
-          </a:p>
-        </p:txBody>
-      </p:sp>
-      <p:sp>
-        <p:nvSpPr>
-          <p:cNvPr id="3" name="Titre 2"/>
-          <p:cNvSpPr>
-            <a:spLocks noGrp="1"/>
-          </p:cNvSpPr>
-          <p:nvPr>
-            <p:ph type="title"/>
-          </p:nvPr>
-        </p:nvSpPr>
-        <p:spPr/>
-        <p:txBody>
           <a:bodyPr/>
           <a:lstStyle/>
           <a:p>
             <a:r>
               <a:rPr lang="en-US" dirty="0" smtClean="0"/>
-              <a:t>Coding hints</a:t>
+              <a:t>Typical application: manual table modification</a:t>
             </a:r>
             <a:endParaRPr lang="en-US" dirty="0"/>
           </a:p>
@@ -12328,7 +12828,7 @@
     </p:spTree>
     <p:extLst>
       <p:ext uri="{BB962C8B-B14F-4D97-AF65-F5344CB8AC3E}">
-        <p14:creationId xmlns:p14="http://schemas.microsoft.com/office/powerpoint/2010/main" val="383851265"/>
+        <p14:creationId xmlns:p14="http://schemas.microsoft.com/office/powerpoint/2010/main" val="4108048524"/>
       </p:ext>
     </p:extLst>
   </p:cSld>
@@ -12376,132 +12876,22 @@
       </p:grpSpPr>
       <p:sp>
         <p:nvSpPr>
-          <p:cNvPr id="2" name="Espace réservé du contenu 1"/>
+          <p:cNvPr id="2" name="Titre 1"/>
           <p:cNvSpPr>
             <a:spLocks noGrp="1"/>
           </p:cNvSpPr>
           <p:nvPr>
-            <p:ph idx="1"/>
+            <p:ph type="title"/>
           </p:nvPr>
         </p:nvSpPr>
         <p:spPr/>
         <p:txBody>
-          <a:bodyPr>
-            <a:normAutofit fontScale="85000" lnSpcReduction="20000"/>
-          </a:bodyPr>
-          <a:lstStyle/>
-          <a:p>
-            <a:r>
-              <a:rPr lang="en-US" dirty="0" smtClean="0"/>
-              <a:t>Linux</a:t>
-            </a:r>
-          </a:p>
-          <a:p>
-            <a:pPr lvl="1"/>
-            <a:r>
-              <a:rPr lang="en-US" dirty="0"/>
-              <a:t>t</a:t>
-            </a:r>
-            <a:r>
-              <a:rPr lang="en-US" dirty="0" smtClean="0"/>
-              <a:t>ested on Intel 32 &amp; 64 bits, Fedora and Ubuntu</a:t>
-            </a:r>
-          </a:p>
-          <a:p>
-            <a:r>
-              <a:rPr lang="en-US" dirty="0" err="1" smtClean="0"/>
-              <a:t>macOS</a:t>
-            </a:r>
-            <a:endParaRPr lang="en-US" dirty="0" smtClean="0"/>
-          </a:p>
-          <a:p>
-            <a:pPr lvl="1"/>
-            <a:r>
-              <a:rPr lang="en-US" dirty="0"/>
-              <a:t>t</a:t>
-            </a:r>
-            <a:r>
-              <a:rPr lang="en-US" dirty="0" smtClean="0"/>
-              <a:t>ested on </a:t>
-            </a:r>
-            <a:r>
-              <a:rPr lang="en-US" dirty="0" err="1" smtClean="0"/>
-              <a:t>macOS</a:t>
-            </a:r>
-            <a:r>
-              <a:rPr lang="en-US" dirty="0" smtClean="0"/>
-              <a:t> Sierra 10.12</a:t>
-            </a:r>
-          </a:p>
-          <a:p>
-            <a:r>
-              <a:rPr lang="en-US" dirty="0" smtClean="0"/>
-              <a:t>Windows</a:t>
-            </a:r>
-          </a:p>
-          <a:p>
-            <a:pPr lvl="1"/>
-            <a:r>
-              <a:rPr lang="en-US" dirty="0"/>
-              <a:t>t</a:t>
-            </a:r>
-            <a:r>
-              <a:rPr lang="en-US" dirty="0" smtClean="0"/>
-              <a:t>ested on Intel 32 &amp; 64 bits, Windows 7 &amp; 10</a:t>
-            </a:r>
-          </a:p>
-          <a:p>
-            <a:pPr lvl="2"/>
-            <a:r>
-              <a:rPr lang="en-US" dirty="0"/>
-              <a:t>on </a:t>
-            </a:r>
-            <a:r>
-              <a:rPr lang="en-US" dirty="0" smtClean="0"/>
-              <a:t>64-bit Windows, use 32-bit TSDuck if your DVB tuner driver is 32-bit only</a:t>
-            </a:r>
-          </a:p>
-          <a:p>
-            <a:pPr lvl="1"/>
-            <a:r>
-              <a:rPr lang="en-US" dirty="0" smtClean="0"/>
-              <a:t>Microsoft Visual Studio 2017 Community Edition</a:t>
-            </a:r>
-          </a:p>
-          <a:p>
-            <a:pPr lvl="2"/>
-            <a:r>
-              <a:rPr lang="en-US" dirty="0" smtClean="0"/>
-              <a:t>free download from microsoft.com, no license fee</a:t>
-            </a:r>
-          </a:p>
-          <a:p>
-            <a:pPr lvl="1"/>
-            <a:r>
-              <a:rPr lang="en-US" dirty="0" smtClean="0"/>
-              <a:t>NSIS (</a:t>
-            </a:r>
-            <a:r>
-              <a:rPr lang="en-US" dirty="0" err="1" smtClean="0"/>
-              <a:t>Nullsoft</a:t>
-            </a:r>
-            <a:r>
-              <a:rPr lang="en-US" dirty="0" smtClean="0"/>
-              <a:t> Scriptable Install System)</a:t>
-            </a:r>
-          </a:p>
-          <a:p>
-            <a:pPr lvl="2"/>
-            <a:r>
-              <a:rPr lang="en-US" dirty="0" smtClean="0"/>
-              <a:t>free software</a:t>
-            </a:r>
-          </a:p>
-          <a:p>
-            <a:pPr lvl="2"/>
-            <a:r>
-              <a:rPr lang="en-US" dirty="0" smtClean="0"/>
-              <a:t>used to create TSDuck installer with precompiled binaries</a:t>
+          <a:bodyPr/>
+          <a:lstStyle/>
+          <a:p>
+            <a:r>
+              <a:rPr lang="en-US" dirty="0" smtClean="0"/>
+              <a:t>C++ transport stream programming</a:t>
             </a:r>
             <a:endParaRPr lang="en-US" dirty="0"/>
           </a:p>
@@ -12509,12 +12899,12 @@
       </p:sp>
       <p:sp>
         <p:nvSpPr>
-          <p:cNvPr id="3" name="Titre 2"/>
+          <p:cNvPr id="3" name="Espace réservé du texte 2"/>
           <p:cNvSpPr>
             <a:spLocks noGrp="1"/>
           </p:cNvSpPr>
           <p:nvPr>
-            <p:ph type="title"/>
+            <p:ph type="body" idx="1"/>
           </p:nvPr>
         </p:nvSpPr>
         <p:spPr/>
@@ -12524,7 +12914,7 @@
           <a:p>
             <a:r>
               <a:rPr lang="en-US" dirty="0" smtClean="0"/>
-              <a:t>Supported environments</a:t>
+              <a:t>Extending TSDuck</a:t>
             </a:r>
             <a:endParaRPr lang="en-US" dirty="0"/>
           </a:p>
@@ -12533,7 +12923,7 @@
     </p:spTree>
     <p:extLst>
       <p:ext uri="{BB962C8B-B14F-4D97-AF65-F5344CB8AC3E}">
-        <p14:creationId xmlns:p14="http://schemas.microsoft.com/office/powerpoint/2010/main" val="2351714695"/>
+        <p14:creationId xmlns:p14="http://schemas.microsoft.com/office/powerpoint/2010/main" val="1702509614"/>
       </p:ext>
     </p:extLst>
   </p:cSld>
@@ -12542,12 +12932,12 @@
   </p:clrMapOvr>
   <mc:AlternateContent xmlns:mc="http://schemas.openxmlformats.org/markup-compatibility/2006" xmlns:p14="http://schemas.microsoft.com/office/powerpoint/2010/main">
     <mc:Choice Requires="p14">
-      <p:transition spd="med" p14:dur="700">
-        <p:fade/>
+      <p:transition spd="slow" p14:dur="1400">
+        <p14:doors dir="vert"/>
       </p:transition>
     </mc:Choice>
     <mc:Fallback xmlns="">
-      <p:transition spd="med">
+      <p:transition spd="slow">
         <p:fade/>
       </p:transition>
     </mc:Fallback>
@@ -12581,11 +12971,120 @@
       </p:grpSpPr>
       <p:sp>
         <p:nvSpPr>
-          <p:cNvPr id="2" name="Titre 1"/>
+          <p:cNvPr id="2" name="Espace réservé du contenu 1"/>
           <p:cNvSpPr>
             <a:spLocks noGrp="1"/>
           </p:cNvSpPr>
           <p:nvPr>
+            <p:ph idx="1"/>
+          </p:nvPr>
+        </p:nvSpPr>
+        <p:spPr/>
+        <p:txBody>
+          <a:bodyPr/>
+          <a:lstStyle/>
+          <a:p>
+            <a:r>
+              <a:rPr lang="en-US" dirty="0" smtClean="0"/>
+              <a:t>TSDuck is extensible</a:t>
+            </a:r>
+          </a:p>
+          <a:p>
+            <a:pPr lvl="1"/>
+            <a:r>
+              <a:rPr lang="en-US" dirty="0" smtClean="0"/>
+              <a:t>Source code provided</a:t>
+            </a:r>
+          </a:p>
+          <a:p>
+            <a:pPr marL="896937" lvl="3" indent="0">
+              <a:buNone/>
+            </a:pPr>
+            <a:r>
+              <a:rPr lang="en-US" dirty="0" smtClean="0">
+                <a:latin typeface="Consolas" panose="020B0609020204030204" pitchFamily="49" charset="0"/>
+                <a:cs typeface="Consolas" panose="020B0609020204030204" pitchFamily="49" charset="0"/>
+              </a:rPr>
+              <a:t>git clone https://github.com/tsduck/tsduck.git</a:t>
+            </a:r>
+          </a:p>
+          <a:p>
+            <a:pPr lvl="1"/>
+            <a:r>
+              <a:rPr lang="en-US" dirty="0" smtClean="0"/>
+              <a:t>Common API for Linux, Windows and </a:t>
+            </a:r>
+            <a:r>
+              <a:rPr lang="en-US" dirty="0" err="1" smtClean="0"/>
+              <a:t>macOS</a:t>
+            </a:r>
+            <a:endParaRPr lang="en-US" dirty="0" smtClean="0"/>
+          </a:p>
+          <a:p>
+            <a:pPr lvl="2"/>
+            <a:r>
+              <a:rPr lang="en-US" dirty="0" smtClean="0"/>
+              <a:t>DVB tuners and </a:t>
+            </a:r>
+            <a:r>
+              <a:rPr lang="en-US" dirty="0" err="1" smtClean="0"/>
+              <a:t>Dektec</a:t>
+            </a:r>
+            <a:r>
+              <a:rPr lang="en-US" dirty="0" smtClean="0"/>
+              <a:t> cards are not supported on </a:t>
+            </a:r>
+            <a:r>
+              <a:rPr lang="en-US" dirty="0" err="1" smtClean="0"/>
+              <a:t>macOS</a:t>
+            </a:r>
+            <a:endParaRPr lang="en-US" dirty="0" smtClean="0"/>
+          </a:p>
+          <a:p>
+            <a:pPr lvl="1"/>
+            <a:r>
+              <a:rPr lang="en-US" dirty="0" smtClean="0"/>
+              <a:t>Programmer’s guide</a:t>
+            </a:r>
+          </a:p>
+          <a:p>
+            <a:pPr lvl="2"/>
+            <a:r>
+              <a:rPr lang="en-US" dirty="0" smtClean="0"/>
+              <a:t>Doxygen-generated, see </a:t>
+            </a:r>
+            <a:r>
+              <a:rPr lang="en-US" dirty="0" smtClean="0">
+                <a:latin typeface="Consolas" panose="020B0609020204030204" pitchFamily="49" charset="0"/>
+                <a:cs typeface="Consolas" panose="020B0609020204030204" pitchFamily="49" charset="0"/>
+                <a:hlinkClick r:id="rId3"/>
+              </a:rPr>
+              <a:t>https://tsduck.github.io/</a:t>
+            </a:r>
+            <a:r>
+              <a:rPr lang="en-US" dirty="0" smtClean="0">
+                <a:latin typeface="Consolas" panose="020B0609020204030204" pitchFamily="49" charset="0"/>
+                <a:cs typeface="Consolas" panose="020B0609020204030204" pitchFamily="49" charset="0"/>
+              </a:rPr>
+              <a:t> </a:t>
+            </a:r>
+          </a:p>
+          <a:p>
+            <a:r>
+              <a:rPr lang="en-US" dirty="0" smtClean="0"/>
+              <a:t>You can modify it yourself !</a:t>
+            </a:r>
+            <a:endParaRPr lang="en-US" dirty="0"/>
+          </a:p>
+        </p:txBody>
+      </p:sp>
+      <p:sp>
+        <p:nvSpPr>
+          <p:cNvPr id="3" name="Titre 2"/>
+          <p:cNvSpPr>
+            <a:spLocks noGrp="1"/>
+          </p:cNvSpPr>
+          <p:nvPr>
             <p:ph type="title"/>
           </p:nvPr>
         </p:nvSpPr>
@@ -12596,30 +13095,7 @@
           <a:p>
             <a:r>
               <a:rPr lang="en-US" dirty="0" smtClean="0"/>
-              <a:t>to develop third-party applications</a:t>
-            </a:r>
-            <a:endParaRPr lang="en-US" dirty="0"/>
-          </a:p>
-        </p:txBody>
-      </p:sp>
-      <p:sp>
-        <p:nvSpPr>
-          <p:cNvPr id="3" name="Espace réservé du texte 2"/>
-          <p:cNvSpPr>
-            <a:spLocks noGrp="1"/>
-          </p:cNvSpPr>
-          <p:nvPr>
-            <p:ph type="body" idx="1"/>
-          </p:nvPr>
-        </p:nvSpPr>
-        <p:spPr/>
-        <p:txBody>
-          <a:bodyPr/>
-          <a:lstStyle/>
-          <a:p>
-            <a:r>
-              <a:rPr lang="en-US" dirty="0" smtClean="0"/>
-              <a:t>Using TSDuck Library</a:t>
+              <a:t>Extending TSDuck</a:t>
             </a:r>
             <a:endParaRPr lang="en-US" dirty="0"/>
           </a:p>
@@ -12628,7 +13104,7 @@
     </p:spTree>
     <p:extLst>
       <p:ext uri="{BB962C8B-B14F-4D97-AF65-F5344CB8AC3E}">
-        <p14:creationId xmlns:p14="http://schemas.microsoft.com/office/powerpoint/2010/main" val="1437066081"/>
+        <p14:creationId xmlns:p14="http://schemas.microsoft.com/office/powerpoint/2010/main" val="3195961649"/>
       </p:ext>
     </p:extLst>
   </p:cSld>
@@ -12637,12 +13113,12 @@
   </p:clrMapOvr>
   <mc:AlternateContent xmlns:mc="http://schemas.openxmlformats.org/markup-compatibility/2006" xmlns:p14="http://schemas.microsoft.com/office/powerpoint/2010/main">
     <mc:Choice Requires="p14">
-      <p:transition spd="slow" p14:dur="1400">
-        <p14:doors dir="vert"/>
+      <p:transition spd="med" p14:dur="700">
+        <p:fade/>
       </p:transition>
     </mc:Choice>
     <mc:Fallback xmlns="">
-      <p:transition spd="slow">
+      <p:transition spd="med">
         <p:fade/>
       </p:transition>
     </mc:Fallback>
@@ -12691,87 +13167,148 @@
           </a:bodyPr>
           <a:lstStyle/>
           <a:p>
-            <a:r>
-              <a:rPr lang="en-US" dirty="0" smtClean="0"/>
-              <a:t>All TSDuck common code is in one large library</a:t>
-            </a:r>
-          </a:p>
-          <a:p>
-            <a:pPr lvl="1"/>
-            <a:r>
-              <a:rPr lang="en-US" dirty="0" smtClean="0"/>
-              <a:t>tsduck.so / tsduck.dll</a:t>
-            </a:r>
-          </a:p>
-          <a:p>
-            <a:r>
-              <a:rPr lang="en-US" dirty="0" smtClean="0"/>
-              <a:t>Contains generic and reusable C++ code</a:t>
-            </a:r>
-          </a:p>
-          <a:p>
-            <a:pPr lvl="1"/>
-            <a:r>
-              <a:rPr lang="en-US" dirty="0" smtClean="0"/>
-              <a:t>basic operating system independent features</a:t>
-            </a:r>
-          </a:p>
-          <a:p>
-            <a:pPr lvl="2"/>
-            <a:r>
-              <a:rPr lang="en-US" dirty="0" smtClean="0"/>
-              <a:t>system, multi-treading, synchronization, networking, cryptography, etc.</a:t>
-            </a:r>
-          </a:p>
-          <a:p>
-            <a:pPr lvl="1"/>
-            <a:r>
-              <a:rPr lang="en-US" dirty="0" smtClean="0"/>
-              <a:t>MPEG / DVB features</a:t>
-            </a:r>
-          </a:p>
-          <a:p>
-            <a:pPr lvl="2"/>
-            <a:r>
-              <a:rPr lang="en-US" dirty="0" smtClean="0"/>
-              <a:t>TS packets, PSI/SI tables, sections and descriptors, </a:t>
-            </a:r>
-            <a:r>
-              <a:rPr lang="en-US" dirty="0" err="1" smtClean="0"/>
-              <a:t>demultiplexing</a:t>
-            </a:r>
-            <a:r>
-              <a:rPr lang="en-US" dirty="0" smtClean="0"/>
-              <a:t>, </a:t>
-            </a:r>
-            <a:r>
-              <a:rPr lang="en-US" dirty="0" err="1" smtClean="0"/>
-              <a:t>packetization</a:t>
-            </a:r>
-            <a:r>
-              <a:rPr lang="en-US" dirty="0" smtClean="0"/>
-              <a:t>, DVB tuners, etc.</a:t>
-            </a:r>
-          </a:p>
-          <a:p>
-            <a:r>
-              <a:rPr lang="en-US" dirty="0" smtClean="0"/>
-              <a:t>Can be used in your application</a:t>
-            </a:r>
-          </a:p>
-          <a:p>
-            <a:pPr lvl="1"/>
+            <a:pPr>
+              <a:lnSpc>
+                <a:spcPct val="90000"/>
+              </a:lnSpc>
+            </a:pPr>
+            <a:r>
+              <a:rPr lang="en-US" dirty="0" smtClean="0"/>
+              <a:t>Identify your needs</a:t>
+            </a:r>
+          </a:p>
+          <a:p>
+            <a:pPr>
+              <a:lnSpc>
+                <a:spcPct val="90000"/>
+              </a:lnSpc>
+            </a:pPr>
+            <a:r>
+              <a:rPr lang="en-US" dirty="0" smtClean="0"/>
+              <a:t>Try to find a solution using existing TSDuck</a:t>
+            </a:r>
+          </a:p>
+          <a:p>
+            <a:pPr lvl="1">
+              <a:lnSpc>
+                <a:spcPct val="90000"/>
+              </a:lnSpc>
+            </a:pPr>
             <a:r>
               <a:rPr lang="en-US" dirty="0"/>
-              <a:t>e</a:t>
-            </a:r>
-            <a:r>
-              <a:rPr lang="en-US" smtClean="0"/>
-              <a:t>ven </a:t>
-            </a:r>
-            <a:r>
-              <a:rPr lang="en-US" dirty="0" smtClean="0"/>
-              <a:t>if not part of TSDuck</a:t>
+              <a:t>r</a:t>
+            </a:r>
+            <a:r>
+              <a:rPr lang="en-US" dirty="0" smtClean="0"/>
+              <a:t>eview utilities and plugins</a:t>
+            </a:r>
+          </a:p>
+          <a:p>
+            <a:pPr>
+              <a:lnSpc>
+                <a:spcPct val="90000"/>
+              </a:lnSpc>
+            </a:pPr>
+            <a:r>
+              <a:rPr lang="en-US" dirty="0" smtClean="0"/>
+              <a:t>Try to extend an existing utility or plugin</a:t>
+            </a:r>
+          </a:p>
+          <a:p>
+            <a:pPr lvl="1">
+              <a:lnSpc>
+                <a:spcPct val="90000"/>
+              </a:lnSpc>
+            </a:pPr>
+            <a:r>
+              <a:rPr lang="en-US" dirty="0"/>
+              <a:t>a</a:t>
+            </a:r>
+            <a:r>
+              <a:rPr lang="en-US" dirty="0" smtClean="0"/>
+              <a:t>dd new options</a:t>
+            </a:r>
+          </a:p>
+          <a:p>
+            <a:pPr lvl="1">
+              <a:lnSpc>
+                <a:spcPct val="90000"/>
+              </a:lnSpc>
+            </a:pPr>
+            <a:r>
+              <a:rPr lang="en-US" dirty="0"/>
+              <a:t>a</a:t>
+            </a:r>
+            <a:r>
+              <a:rPr lang="en-US" dirty="0" smtClean="0"/>
+              <a:t>dd features, don’t modify existing behavior</a:t>
+            </a:r>
+          </a:p>
+          <a:p>
+            <a:pPr lvl="1">
+              <a:lnSpc>
+                <a:spcPct val="90000"/>
+              </a:lnSpc>
+            </a:pPr>
+            <a:r>
+              <a:rPr lang="en-US" dirty="0"/>
+              <a:t>r</a:t>
+            </a:r>
+            <a:r>
+              <a:rPr lang="en-US" dirty="0" smtClean="0"/>
+              <a:t>emain upward compatible</a:t>
+            </a:r>
+          </a:p>
+          <a:p>
+            <a:pPr>
+              <a:lnSpc>
+                <a:spcPct val="90000"/>
+              </a:lnSpc>
+            </a:pPr>
+            <a:r>
+              <a:rPr lang="en-US" dirty="0" smtClean="0"/>
+              <a:t>Develop your own plugin</a:t>
+            </a:r>
+          </a:p>
+          <a:p>
+            <a:pPr lvl="1">
+              <a:lnSpc>
+                <a:spcPct val="90000"/>
+              </a:lnSpc>
+            </a:pPr>
+            <a:r>
+              <a:rPr lang="en-US" dirty="0"/>
+              <a:t>i</a:t>
+            </a:r>
+            <a:r>
+              <a:rPr lang="en-US" dirty="0" smtClean="0"/>
+              <a:t>t is quite simple, really</a:t>
+            </a:r>
+          </a:p>
+          <a:p>
+            <a:pPr>
+              <a:lnSpc>
+                <a:spcPct val="90000"/>
+              </a:lnSpc>
+            </a:pPr>
+            <a:r>
+              <a:rPr lang="en-US" dirty="0" smtClean="0"/>
+              <a:t>Send your code back to TSDuck maintainer</a:t>
+            </a:r>
+          </a:p>
+          <a:p>
+            <a:pPr lvl="1">
+              <a:lnSpc>
+                <a:spcPct val="90000"/>
+              </a:lnSpc>
+            </a:pPr>
+            <a:r>
+              <a:rPr lang="en-US" dirty="0"/>
+              <a:t>s</a:t>
+            </a:r>
+            <a:r>
+              <a:rPr lang="en-US" dirty="0" smtClean="0"/>
+              <a:t>o that everyone can benefit from it</a:t>
             </a:r>
             <a:endParaRPr lang="en-US" dirty="0"/>
           </a:p>
@@ -12794,7 +13331,7 @@
           <a:p>
             <a:r>
               <a:rPr lang="en-US" dirty="0" smtClean="0"/>
-              <a:t>The TSDuck library</a:t>
+              <a:t>Why extending TSDuck ?</a:t>
             </a:r>
             <a:endParaRPr lang="en-US" dirty="0"/>
           </a:p>
@@ -12803,7 +13340,7 @@
     </p:spTree>
     <p:extLst>
       <p:ext uri="{BB962C8B-B14F-4D97-AF65-F5344CB8AC3E}">
-        <p14:creationId xmlns:p14="http://schemas.microsoft.com/office/powerpoint/2010/main" val="1814597134"/>
+        <p14:creationId xmlns:p14="http://schemas.microsoft.com/office/powerpoint/2010/main" val="838391798"/>
       </p:ext>
     </p:extLst>
   </p:cSld>
@@ -13011,6 +13548,59 @@
       </p:grpSpPr>
       <p:sp>
         <p:nvSpPr>
+          <p:cNvPr id="5" name="Rectangle à coins arrondis 4"/>
+          <p:cNvSpPr/>
+          <p:nvPr/>
+        </p:nvSpPr>
+        <p:spPr>
+          <a:xfrm>
+            <a:off x="907756" y="3995582"/>
+            <a:ext cx="1944216" cy="432048"/>
+          </a:xfrm>
+          <a:prstGeom prst="roundRect">
+            <a:avLst/>
+          </a:prstGeom>
+          <a:solidFill>
+            <a:srgbClr val="C5E0B4"/>
+          </a:solidFill>
+          <a:ln w="19050">
+            <a:solidFill>
+              <a:srgbClr val="00B050"/>
+            </a:solidFill>
+            <a:tailEnd type="stealth"/>
+          </a:ln>
+        </p:spPr>
+        <p:style>
+          <a:lnRef idx="2">
+            <a:schemeClr val="accent1">
+              <a:shade val="50000"/>
+            </a:schemeClr>
+          </a:lnRef>
+          <a:fillRef idx="1">
+            <a:schemeClr val="accent1"/>
+          </a:fillRef>
+          <a:effectRef idx="0">
+            <a:schemeClr val="accent1"/>
+          </a:effectRef>
+          <a:fontRef idx="minor">
+            <a:schemeClr val="lt1"/>
+          </a:fontRef>
+        </p:style>
+        <p:txBody>
+          <a:bodyPr rtlCol="0" anchor="ctr"/>
+          <a:lstStyle/>
+          <a:p>
+            <a:pPr algn="ctr"/>
+            <a:endParaRPr lang="en-US" sz="1600" dirty="0">
+              <a:solidFill>
+                <a:schemeClr val="tx1"/>
+              </a:solidFill>
+            </a:endParaRPr>
+          </a:p>
+        </p:txBody>
+      </p:sp>
+      <p:sp>
+        <p:nvSpPr>
           <p:cNvPr id="2" name="Espace réservé du contenu 1"/>
           <p:cNvSpPr>
             <a:spLocks noGrp="1"/>
@@ -13022,131 +13612,85 @@
         <p:spPr/>
         <p:txBody>
           <a:bodyPr>
-            <a:normAutofit/>
+            <a:normAutofit fontScale="92500" lnSpcReduction="10000"/>
           </a:bodyPr>
           <a:lstStyle/>
           <a:p>
             <a:r>
               <a:rPr lang="en-US" dirty="0" smtClean="0"/>
-              <a:t>Used in an application outside </a:t>
-            </a:r>
-            <a:r>
-              <a:rPr lang="en-US" dirty="0" smtClean="0"/>
-              <a:t>TSDuck</a:t>
-            </a:r>
-          </a:p>
-          <a:p>
-            <a:r>
-              <a:rPr lang="en-US" dirty="0" smtClean="0"/>
-              <a:t>Install the TSDuck development environment</a:t>
+              <a:t>Don’t write a plugin from scratch</a:t>
             </a:r>
           </a:p>
           <a:p>
             <a:pPr lvl="1"/>
             <a:r>
-              <a:rPr lang="en-US" dirty="0" smtClean="0"/>
-              <a:t>Windows: “Development” option in installer</a:t>
+              <a:rPr lang="en-US" dirty="0"/>
+              <a:t>u</a:t>
+            </a:r>
+            <a:r>
+              <a:rPr lang="en-US" dirty="0" smtClean="0"/>
+              <a:t>se an existing one as code base</a:t>
             </a:r>
           </a:p>
           <a:p>
             <a:pPr lvl="1"/>
             <a:r>
-              <a:rPr lang="en-US" dirty="0" smtClean="0"/>
-              <a:t>Ubuntu: package </a:t>
-            </a:r>
-            <a:r>
-              <a:rPr lang="en-US" dirty="0" err="1" smtClean="0">
-                <a:latin typeface="Consolas" panose="020B0609020204030204" pitchFamily="49" charset="0"/>
-                <a:cs typeface="Consolas" panose="020B0609020204030204" pitchFamily="49" charset="0"/>
-              </a:rPr>
-              <a:t>tsduck</a:t>
-            </a:r>
-            <a:r>
-              <a:rPr lang="en-US" dirty="0" smtClean="0">
-                <a:latin typeface="Consolas" panose="020B0609020204030204" pitchFamily="49" charset="0"/>
-                <a:cs typeface="Consolas" panose="020B0609020204030204" pitchFamily="49" charset="0"/>
-              </a:rPr>
-              <a:t>-dev</a:t>
+              <a:rPr lang="en-US" dirty="0"/>
+              <a:t>c</a:t>
+            </a:r>
+            <a:r>
+              <a:rPr lang="en-US" dirty="0" smtClean="0"/>
+              <a:t>hoose one which is technically similar</a:t>
+            </a:r>
+          </a:p>
+          <a:p>
+            <a:pPr lvl="2"/>
+            <a:r>
+              <a:rPr lang="en-US" dirty="0" smtClean="0"/>
+              <a:t>input?  output?  PSI/SI transformation?  packet filtering?</a:t>
+            </a:r>
+          </a:p>
+          <a:p>
+            <a:r>
+              <a:rPr lang="en-US" dirty="0" smtClean="0"/>
+              <a:t>Implement simple &amp; elementary features</a:t>
             </a:r>
           </a:p>
           <a:p>
             <a:pPr lvl="1"/>
             <a:r>
-              <a:rPr lang="en-US" dirty="0" smtClean="0"/>
-              <a:t>Fedora, Red Hat, CentOS: </a:t>
-            </a:r>
-            <a:r>
               <a:rPr lang="en-US" dirty="0"/>
-              <a:t>package </a:t>
-            </a:r>
-            <a:r>
-              <a:rPr lang="en-US" dirty="0" err="1" smtClean="0">
-                <a:latin typeface="Consolas" panose="020B0609020204030204" pitchFamily="49" charset="0"/>
-                <a:cs typeface="Consolas" panose="020B0609020204030204" pitchFamily="49" charset="0"/>
-              </a:rPr>
-              <a:t>tsduck-devel</a:t>
-            </a:r>
-            <a:endParaRPr lang="en-US" dirty="0" smtClean="0">
-              <a:latin typeface="Consolas" panose="020B0609020204030204" pitchFamily="49" charset="0"/>
-              <a:cs typeface="Consolas" panose="020B0609020204030204" pitchFamily="49" charset="0"/>
-            </a:endParaRPr>
-          </a:p>
-          <a:p>
-            <a:r>
-              <a:rPr lang="en-US" dirty="0"/>
-              <a:t>Typical application source file</a:t>
-            </a:r>
-          </a:p>
-          <a:p>
-            <a:pPr lvl="2">
-              <a:buFont typeface="Wingdings" pitchFamily="2" charset="2"/>
-              <a:buNone/>
-            </a:pPr>
-            <a:r>
-              <a:rPr lang="en-US" sz="1600" b="1" dirty="0">
-                <a:latin typeface="Consolas" panose="020B0609020204030204" pitchFamily="49" charset="0"/>
-                <a:cs typeface="Consolas" panose="020B0609020204030204" pitchFamily="49" charset="0"/>
-              </a:rPr>
-              <a:t>#include "</a:t>
-            </a:r>
-            <a:r>
-              <a:rPr lang="en-US" sz="1600" b="1" dirty="0" err="1">
-                <a:latin typeface="Consolas" panose="020B0609020204030204" pitchFamily="49" charset="0"/>
-                <a:cs typeface="Consolas" panose="020B0609020204030204" pitchFamily="49" charset="0"/>
-              </a:rPr>
-              <a:t>tsduck.h</a:t>
-            </a:r>
-            <a:r>
-              <a:rPr lang="en-US" sz="1600" b="1" dirty="0">
-                <a:latin typeface="Consolas" panose="020B0609020204030204" pitchFamily="49" charset="0"/>
-                <a:cs typeface="Consolas" panose="020B0609020204030204" pitchFamily="49" charset="0"/>
-              </a:rPr>
-              <a:t>"</a:t>
-            </a:r>
-          </a:p>
-          <a:p>
-            <a:pPr lvl="2">
-              <a:buFont typeface="Wingdings" pitchFamily="2" charset="2"/>
-              <a:buNone/>
-            </a:pPr>
-            <a:r>
-              <a:rPr lang="en-US" sz="1600" b="1" dirty="0">
-                <a:latin typeface="Consolas" panose="020B0609020204030204" pitchFamily="49" charset="0"/>
-                <a:cs typeface="Consolas" panose="020B0609020204030204" pitchFamily="49" charset="0"/>
-              </a:rPr>
-              <a:t>... application code </a:t>
-            </a:r>
-            <a:r>
-              <a:rPr lang="en-US" sz="1600" b="1" dirty="0" smtClean="0">
-                <a:latin typeface="Consolas" panose="020B0609020204030204" pitchFamily="49" charset="0"/>
-                <a:cs typeface="Consolas" panose="020B0609020204030204" pitchFamily="49" charset="0"/>
-              </a:rPr>
-              <a:t>...</a:t>
-            </a:r>
-            <a:endParaRPr lang="en-US" sz="1600" b="1" dirty="0">
-              <a:latin typeface="Consolas" panose="020B0609020204030204" pitchFamily="49" charset="0"/>
-              <a:cs typeface="Consolas" panose="020B0609020204030204" pitchFamily="49" charset="0"/>
-            </a:endParaRPr>
+              <a:t>p</a:t>
+            </a:r>
+            <a:r>
+              <a:rPr lang="en-US" dirty="0" smtClean="0"/>
+              <a:t>reserve TSDuck philosophy</a:t>
+            </a:r>
+          </a:p>
+          <a:p>
+            <a:pPr lvl="2"/>
+            <a:r>
+              <a:rPr lang="en-US" dirty="0" smtClean="0"/>
+              <a:t>develop several elementary plugins if necessary</a:t>
+            </a:r>
+          </a:p>
+          <a:p>
+            <a:pPr lvl="2"/>
+            <a:r>
+              <a:rPr lang="en-US" dirty="0" smtClean="0"/>
+              <a:t>not a single big plugin implementing several features</a:t>
+            </a:r>
+          </a:p>
+          <a:p>
+            <a:pPr lvl="2"/>
+            <a:endParaRPr lang="en-US" dirty="0" smtClean="0"/>
+          </a:p>
+          <a:p>
+            <a:r>
+              <a:rPr lang="en-US" dirty="0" smtClean="0"/>
+              <a:t>RTFM as usual !</a:t>
+            </a:r>
+            <a:endParaRPr lang="en-US" dirty="0"/>
           </a:p>
         </p:txBody>
       </p:sp>
@@ -13167,11 +13711,7 @@
           <a:p>
             <a:r>
               <a:rPr lang="en-US" dirty="0" smtClean="0"/>
-              <a:t>Using TSDuck as a </a:t>
-            </a:r>
-            <a:r>
-              <a:rPr lang="en-US" dirty="0" smtClean="0"/>
-              <a:t>library</a:t>
+              <a:t>Coding hints</a:t>
             </a:r>
             <a:endParaRPr lang="en-US" dirty="0"/>
           </a:p>
@@ -13180,7 +13720,7 @@
     </p:spTree>
     <p:extLst>
       <p:ext uri="{BB962C8B-B14F-4D97-AF65-F5344CB8AC3E}">
-        <p14:creationId xmlns:p14="http://schemas.microsoft.com/office/powerpoint/2010/main" val="3719695563"/>
+        <p14:creationId xmlns:p14="http://schemas.microsoft.com/office/powerpoint/2010/main" val="383851265"/>
       </p:ext>
     </p:extLst>
   </p:cSld>
@@ -13239,132 +13779,124 @@
         <p:spPr/>
         <p:txBody>
           <a:bodyPr>
-            <a:normAutofit/>
+            <a:normAutofit fontScale="85000" lnSpcReduction="20000"/>
           </a:bodyPr>
           <a:lstStyle/>
           <a:p>
             <a:r>
               <a:rPr lang="en-US" dirty="0" smtClean="0"/>
-              <a:t>Typical Linux Makefile</a:t>
+              <a:t>Linux</a:t>
+            </a:r>
+          </a:p>
+          <a:p>
+            <a:pPr lvl="1"/>
+            <a:r>
+              <a:rPr lang="en-US" dirty="0"/>
+              <a:t>t</a:t>
+            </a:r>
+            <a:r>
+              <a:rPr lang="en-US" dirty="0" smtClean="0"/>
+              <a:t>ested on Intel 32 &amp; 64 bits, Fedora and Ubuntu</a:t>
+            </a:r>
+          </a:p>
+          <a:p>
+            <a:r>
+              <a:rPr lang="en-US" dirty="0" err="1" smtClean="0"/>
+              <a:t>macOS</a:t>
             </a:r>
             <a:endParaRPr lang="en-US" dirty="0" smtClean="0"/>
           </a:p>
           <a:p>
-            <a:pPr lvl="2">
-              <a:buFont typeface="Wingdings" pitchFamily="2" charset="2"/>
-              <a:buNone/>
-            </a:pPr>
-            <a:r>
-              <a:rPr lang="en-US" sz="1600" b="1" dirty="0">
-                <a:latin typeface="Consolas" panose="020B0609020204030204" pitchFamily="49" charset="0"/>
-                <a:cs typeface="Consolas" panose="020B0609020204030204" pitchFamily="49" charset="0"/>
-              </a:rPr>
-              <a:t>include /</a:t>
-            </a:r>
-            <a:r>
-              <a:rPr lang="en-US" sz="1600" b="1" dirty="0" smtClean="0">
-                <a:latin typeface="Consolas" panose="020B0609020204030204" pitchFamily="49" charset="0"/>
-                <a:cs typeface="Consolas" panose="020B0609020204030204" pitchFamily="49" charset="0"/>
-              </a:rPr>
-              <a:t>usr/include/tsduck/tsduck.mk</a:t>
-            </a:r>
-          </a:p>
-          <a:p>
-            <a:pPr lvl="2">
-              <a:buFont typeface="Wingdings" pitchFamily="2" charset="2"/>
-              <a:buNone/>
-            </a:pPr>
-            <a:r>
-              <a:rPr lang="en-US" sz="1600" b="1" i="1" dirty="0" smtClean="0">
-                <a:latin typeface="Consolas" panose="020B0609020204030204" pitchFamily="49" charset="0"/>
-                <a:cs typeface="Consolas" panose="020B0609020204030204" pitchFamily="49" charset="0"/>
-              </a:rPr>
-              <a:t>... </a:t>
-            </a:r>
-            <a:r>
-              <a:rPr lang="en-US" sz="1600" b="1" i="1" dirty="0" smtClean="0">
-                <a:latin typeface="Consolas" panose="020B0609020204030204" pitchFamily="49" charset="0"/>
-                <a:cs typeface="Consolas" panose="020B0609020204030204" pitchFamily="49" charset="0"/>
-              </a:rPr>
-              <a:t>application-specific rules ...</a:t>
-            </a:r>
-          </a:p>
-          <a:p>
+            <a:pPr lvl="1"/>
             <a:r>
               <a:rPr lang="en-US" dirty="0"/>
-              <a:t>Typical </a:t>
-            </a:r>
-            <a:r>
-              <a:rPr lang="en-US" dirty="0" smtClean="0"/>
-              <a:t>macOS Makefile</a:t>
+              <a:t>t</a:t>
+            </a:r>
+            <a:r>
+              <a:rPr lang="en-US" dirty="0" smtClean="0"/>
+              <a:t>ested on </a:t>
+            </a:r>
+            <a:r>
+              <a:rPr lang="en-US" dirty="0" err="1" smtClean="0"/>
+              <a:t>macOS</a:t>
+            </a:r>
+            <a:r>
+              <a:rPr lang="en-US" dirty="0" smtClean="0"/>
+              <a:t> Sierra 10.12</a:t>
+            </a:r>
+          </a:p>
+          <a:p>
+            <a:r>
+              <a:rPr lang="en-US" dirty="0" smtClean="0"/>
+              <a:t>Windows</a:t>
+            </a:r>
+          </a:p>
+          <a:p>
+            <a:pPr lvl="1"/>
+            <a:r>
+              <a:rPr lang="en-US" dirty="0"/>
+              <a:t>t</a:t>
+            </a:r>
+            <a:r>
+              <a:rPr lang="en-US" dirty="0" smtClean="0"/>
+              <a:t>ested on Intel 32 &amp; 64 bits, Windows 7 &amp; 10</a:t>
+            </a:r>
+          </a:p>
+          <a:p>
+            <a:pPr lvl="2"/>
+            <a:r>
+              <a:rPr lang="en-US" dirty="0"/>
+              <a:t>on </a:t>
+            </a:r>
+            <a:r>
+              <a:rPr lang="en-US" dirty="0" smtClean="0"/>
+              <a:t>64-bit Windows, use 32-bit TSDuck if your DVB tuner driver is 32-bit only</a:t>
+            </a:r>
+          </a:p>
+          <a:p>
+            <a:pPr lvl="1"/>
+            <a:r>
+              <a:rPr lang="en-US" dirty="0" smtClean="0"/>
+              <a:t>Microsoft Visual Studio 2017 Community Edition</a:t>
+            </a:r>
+          </a:p>
+          <a:p>
+            <a:pPr lvl="2"/>
+            <a:r>
+              <a:rPr lang="en-US" dirty="0" smtClean="0"/>
+              <a:t>free download from microsoft.com, no license fee</a:t>
+            </a:r>
+          </a:p>
+          <a:p>
+            <a:pPr lvl="1"/>
+            <a:r>
+              <a:rPr lang="en-US" dirty="0" smtClean="0"/>
+              <a:t>NSIS (</a:t>
+            </a:r>
+            <a:r>
+              <a:rPr lang="en-US" dirty="0" err="1" smtClean="0"/>
+              <a:t>Nullsoft</a:t>
+            </a:r>
+            <a:r>
+              <a:rPr lang="en-US" dirty="0" smtClean="0"/>
+              <a:t> Scriptable Install System)</a:t>
+            </a:r>
+          </a:p>
+          <a:p>
+            <a:pPr lvl="2"/>
+            <a:r>
+              <a:rPr lang="en-US" dirty="0" smtClean="0"/>
+              <a:t>free software</a:t>
+            </a:r>
+          </a:p>
+          <a:p>
+            <a:pPr lvl="2"/>
+            <a:r>
+              <a:rPr lang="en-US" dirty="0" smtClean="0"/>
+              <a:t>used to create TSDuck installer with precompiled binaries</a:t>
             </a:r>
             <a:endParaRPr lang="en-US" dirty="0"/>
           </a:p>
-          <a:p>
-            <a:pPr lvl="2">
-              <a:buFont typeface="Wingdings" pitchFamily="2" charset="2"/>
-              <a:buNone/>
-            </a:pPr>
-            <a:r>
-              <a:rPr lang="en-US" sz="1600" b="1" dirty="0">
-                <a:latin typeface="Consolas" panose="020B0609020204030204" pitchFamily="49" charset="0"/>
-                <a:cs typeface="Consolas" panose="020B0609020204030204" pitchFamily="49" charset="0"/>
-              </a:rPr>
-              <a:t>include /</a:t>
-            </a:r>
-            <a:r>
-              <a:rPr lang="en-US" sz="1600" b="1" dirty="0" smtClean="0">
-                <a:latin typeface="Consolas" panose="020B0609020204030204" pitchFamily="49" charset="0"/>
-                <a:cs typeface="Consolas" panose="020B0609020204030204" pitchFamily="49" charset="0"/>
-              </a:rPr>
-              <a:t>usr/</a:t>
-            </a:r>
-            <a:r>
-              <a:rPr lang="en-US" sz="1600" b="1" dirty="0" smtClean="0">
-                <a:solidFill>
-                  <a:srgbClr val="FF0000"/>
-                </a:solidFill>
-                <a:latin typeface="Consolas" panose="020B0609020204030204" pitchFamily="49" charset="0"/>
-                <a:cs typeface="Consolas" panose="020B0609020204030204" pitchFamily="49" charset="0"/>
-              </a:rPr>
-              <a:t>local</a:t>
-            </a:r>
-            <a:r>
-              <a:rPr lang="en-US" sz="1600" b="1" dirty="0" smtClean="0">
-                <a:latin typeface="Consolas" panose="020B0609020204030204" pitchFamily="49" charset="0"/>
-                <a:cs typeface="Consolas" panose="020B0609020204030204" pitchFamily="49" charset="0"/>
-              </a:rPr>
-              <a:t>/include/tsduck/tsduck.mk</a:t>
-            </a:r>
-            <a:endParaRPr lang="en-US" sz="1600" b="1" dirty="0">
-              <a:latin typeface="Consolas" panose="020B0609020204030204" pitchFamily="49" charset="0"/>
-              <a:cs typeface="Consolas" panose="020B0609020204030204" pitchFamily="49" charset="0"/>
-            </a:endParaRPr>
-          </a:p>
-          <a:p>
-            <a:pPr lvl="2">
-              <a:buFont typeface="Wingdings" pitchFamily="2" charset="2"/>
-              <a:buNone/>
-            </a:pPr>
-            <a:r>
-              <a:rPr lang="en-US" sz="1600" b="1" i="1" dirty="0">
-                <a:latin typeface="Consolas" panose="020B0609020204030204" pitchFamily="49" charset="0"/>
-                <a:cs typeface="Consolas" panose="020B0609020204030204" pitchFamily="49" charset="0"/>
-              </a:rPr>
-              <a:t>... application-specific rules </a:t>
-            </a:r>
-            <a:r>
-              <a:rPr lang="en-US" sz="1600" b="1" i="1" dirty="0" smtClean="0">
-                <a:latin typeface="Consolas" panose="020B0609020204030204" pitchFamily="49" charset="0"/>
-                <a:cs typeface="Consolas" panose="020B0609020204030204" pitchFamily="49" charset="0"/>
-              </a:rPr>
-              <a:t>...</a:t>
-            </a:r>
-            <a:endParaRPr lang="en-US" sz="1600" b="1" i="1" dirty="0">
-              <a:latin typeface="Consolas" panose="020B0609020204030204" pitchFamily="49" charset="0"/>
-              <a:cs typeface="Consolas" panose="020B0609020204030204" pitchFamily="49" charset="0"/>
-            </a:endParaRPr>
-          </a:p>
         </p:txBody>
       </p:sp>
       <p:sp>
@@ -13384,7 +13916,7 @@
           <a:p>
             <a:r>
               <a:rPr lang="en-US" dirty="0" smtClean="0"/>
-              <a:t>Building with TSDuck library on UNIX</a:t>
+              <a:t>Supported environments</a:t>
             </a:r>
             <a:endParaRPr lang="en-US" dirty="0"/>
           </a:p>
@@ -13393,7 +13925,7 @@
     </p:spTree>
     <p:extLst>
       <p:ext uri="{BB962C8B-B14F-4D97-AF65-F5344CB8AC3E}">
-        <p14:creationId xmlns:p14="http://schemas.microsoft.com/office/powerpoint/2010/main" val="2242190018"/>
+        <p14:creationId xmlns:p14="http://schemas.microsoft.com/office/powerpoint/2010/main" val="2351714695"/>
       </p:ext>
     </p:extLst>
   </p:cSld>
@@ -13441,6 +13973,276 @@
       </p:grpSpPr>
       <p:sp>
         <p:nvSpPr>
+          <p:cNvPr id="2" name="Titre 1"/>
+          <p:cNvSpPr>
+            <a:spLocks noGrp="1"/>
+          </p:cNvSpPr>
+          <p:nvPr>
+            <p:ph type="title"/>
+          </p:nvPr>
+        </p:nvSpPr>
+        <p:spPr/>
+        <p:txBody>
+          <a:bodyPr/>
+          <a:lstStyle/>
+          <a:p>
+            <a:r>
+              <a:rPr lang="en-US" dirty="0" smtClean="0"/>
+              <a:t>to develop third-party applications</a:t>
+            </a:r>
+            <a:endParaRPr lang="en-US" dirty="0"/>
+          </a:p>
+        </p:txBody>
+      </p:sp>
+      <p:sp>
+        <p:nvSpPr>
+          <p:cNvPr id="3" name="Espace réservé du texte 2"/>
+          <p:cNvSpPr>
+            <a:spLocks noGrp="1"/>
+          </p:cNvSpPr>
+          <p:nvPr>
+            <p:ph type="body" idx="1"/>
+          </p:nvPr>
+        </p:nvSpPr>
+        <p:spPr/>
+        <p:txBody>
+          <a:bodyPr/>
+          <a:lstStyle/>
+          <a:p>
+            <a:r>
+              <a:rPr lang="en-US" dirty="0" smtClean="0"/>
+              <a:t>Using TSDuck Library</a:t>
+            </a:r>
+            <a:endParaRPr lang="en-US" dirty="0"/>
+          </a:p>
+        </p:txBody>
+      </p:sp>
+    </p:spTree>
+    <p:extLst>
+      <p:ext uri="{BB962C8B-B14F-4D97-AF65-F5344CB8AC3E}">
+        <p14:creationId xmlns:p14="http://schemas.microsoft.com/office/powerpoint/2010/main" val="1437066081"/>
+      </p:ext>
+    </p:extLst>
+  </p:cSld>
+  <p:clrMapOvr>
+    <a:masterClrMapping/>
+  </p:clrMapOvr>
+  <mc:AlternateContent xmlns:mc="http://schemas.openxmlformats.org/markup-compatibility/2006" xmlns:p14="http://schemas.microsoft.com/office/powerpoint/2010/main">
+    <mc:Choice Requires="p14">
+      <p:transition spd="slow" p14:dur="1400">
+        <p14:doors dir="vert"/>
+      </p:transition>
+    </mc:Choice>
+    <mc:Fallback xmlns="">
+      <p:transition spd="slow">
+        <p:fade/>
+      </p:transition>
+    </mc:Fallback>
+  </mc:AlternateContent>
+  <p:timing>
+    <p:tnLst>
+      <p:par>
+        <p:cTn id="1" dur="indefinite" restart="never" nodeType="tmRoot"/>
+      </p:par>
+    </p:tnLst>
+  </p:timing>
+</p:sld>
+</file>
+
+<file path=ppt/slides/slide33.xml><?xml version="1.0" encoding="utf-8"?>
+<p:sld xmlns:a="http://schemas.openxmlformats.org/drawingml/2006/main" xmlns:r="http://schemas.openxmlformats.org/officeDocument/2006/relationships" xmlns:p="http://schemas.openxmlformats.org/presentationml/2006/main">
+  <p:cSld>
+    <p:spTree>
+      <p:nvGrpSpPr>
+        <p:cNvPr id="1" name=""/>
+        <p:cNvGrpSpPr/>
+        <p:nvPr/>
+      </p:nvGrpSpPr>
+      <p:grpSpPr>
+        <a:xfrm>
+          <a:off x="0" y="0"/>
+          <a:ext cx="0" cy="0"/>
+          <a:chOff x="0" y="0"/>
+          <a:chExt cx="0" cy="0"/>
+        </a:xfrm>
+      </p:grpSpPr>
+      <p:sp>
+        <p:nvSpPr>
+          <p:cNvPr id="2" name="Espace réservé du contenu 1"/>
+          <p:cNvSpPr>
+            <a:spLocks noGrp="1"/>
+          </p:cNvSpPr>
+          <p:nvPr>
+            <p:ph idx="1"/>
+          </p:nvPr>
+        </p:nvSpPr>
+        <p:spPr/>
+        <p:txBody>
+          <a:bodyPr>
+            <a:normAutofit fontScale="92500" lnSpcReduction="10000"/>
+          </a:bodyPr>
+          <a:lstStyle/>
+          <a:p>
+            <a:r>
+              <a:rPr lang="en-US" dirty="0" smtClean="0"/>
+              <a:t>All TSDuck common code is in one large library</a:t>
+            </a:r>
+          </a:p>
+          <a:p>
+            <a:pPr lvl="1"/>
+            <a:r>
+              <a:rPr lang="en-US" dirty="0" smtClean="0"/>
+              <a:t>tsduck.so / tsduck.dll</a:t>
+            </a:r>
+          </a:p>
+          <a:p>
+            <a:r>
+              <a:rPr lang="en-US" dirty="0" smtClean="0"/>
+              <a:t>Contains generic and reusable C++ code</a:t>
+            </a:r>
+          </a:p>
+          <a:p>
+            <a:pPr lvl="1"/>
+            <a:r>
+              <a:rPr lang="en-US" dirty="0" smtClean="0"/>
+              <a:t>basic operating system independent features</a:t>
+            </a:r>
+          </a:p>
+          <a:p>
+            <a:pPr lvl="2"/>
+            <a:r>
+              <a:rPr lang="en-US" dirty="0" smtClean="0"/>
+              <a:t>system, multi-treading, synchronization, networking, cryptography, etc.</a:t>
+            </a:r>
+          </a:p>
+          <a:p>
+            <a:pPr lvl="1"/>
+            <a:r>
+              <a:rPr lang="en-US" dirty="0" smtClean="0"/>
+              <a:t>MPEG / DVB features</a:t>
+            </a:r>
+          </a:p>
+          <a:p>
+            <a:pPr lvl="2"/>
+            <a:r>
+              <a:rPr lang="en-US" dirty="0" smtClean="0"/>
+              <a:t>TS packets, PSI/SI tables, sections and descriptors, </a:t>
+            </a:r>
+            <a:r>
+              <a:rPr lang="en-US" dirty="0" err="1" smtClean="0"/>
+              <a:t>demultiplexing</a:t>
+            </a:r>
+            <a:r>
+              <a:rPr lang="en-US" dirty="0" smtClean="0"/>
+              <a:t>, </a:t>
+            </a:r>
+            <a:r>
+              <a:rPr lang="en-US" dirty="0" err="1" smtClean="0"/>
+              <a:t>packetization</a:t>
+            </a:r>
+            <a:r>
+              <a:rPr lang="en-US" dirty="0" smtClean="0"/>
+              <a:t>, DVB tuners, etc.</a:t>
+            </a:r>
+          </a:p>
+          <a:p>
+            <a:r>
+              <a:rPr lang="en-US" dirty="0" smtClean="0"/>
+              <a:t>Can be used in your application</a:t>
+            </a:r>
+          </a:p>
+          <a:p>
+            <a:pPr lvl="1"/>
+            <a:r>
+              <a:rPr lang="en-US" dirty="0"/>
+              <a:t>e</a:t>
+            </a:r>
+            <a:r>
+              <a:rPr lang="en-US" smtClean="0"/>
+              <a:t>ven </a:t>
+            </a:r>
+            <a:r>
+              <a:rPr lang="en-US" dirty="0" smtClean="0"/>
+              <a:t>if not part of TSDuck</a:t>
+            </a:r>
+            <a:endParaRPr lang="en-US" dirty="0"/>
+          </a:p>
+        </p:txBody>
+      </p:sp>
+      <p:sp>
+        <p:nvSpPr>
+          <p:cNvPr id="3" name="Titre 2"/>
+          <p:cNvSpPr>
+            <a:spLocks noGrp="1"/>
+          </p:cNvSpPr>
+          <p:nvPr>
+            <p:ph type="title"/>
+          </p:nvPr>
+        </p:nvSpPr>
+        <p:spPr/>
+        <p:txBody>
+          <a:bodyPr/>
+          <a:lstStyle/>
+          <a:p>
+            <a:r>
+              <a:rPr lang="en-US" dirty="0" smtClean="0"/>
+              <a:t>The TSDuck library</a:t>
+            </a:r>
+            <a:endParaRPr lang="en-US" dirty="0"/>
+          </a:p>
+        </p:txBody>
+      </p:sp>
+    </p:spTree>
+    <p:extLst>
+      <p:ext uri="{BB962C8B-B14F-4D97-AF65-F5344CB8AC3E}">
+        <p14:creationId xmlns:p14="http://schemas.microsoft.com/office/powerpoint/2010/main" val="1814597134"/>
+      </p:ext>
+    </p:extLst>
+  </p:cSld>
+  <p:clrMapOvr>
+    <a:masterClrMapping/>
+  </p:clrMapOvr>
+  <mc:AlternateContent xmlns:mc="http://schemas.openxmlformats.org/markup-compatibility/2006" xmlns:p14="http://schemas.microsoft.com/office/powerpoint/2010/main">
+    <mc:Choice Requires="p14">
+      <p:transition spd="med" p14:dur="700">
+        <p:fade/>
+      </p:transition>
+    </mc:Choice>
+    <mc:Fallback xmlns="">
+      <p:transition spd="med">
+        <p:fade/>
+      </p:transition>
+    </mc:Fallback>
+  </mc:AlternateContent>
+  <p:timing>
+    <p:tnLst>
+      <p:par>
+        <p:cTn id="1" dur="indefinite" restart="never" nodeType="tmRoot"/>
+      </p:par>
+    </p:tnLst>
+  </p:timing>
+</p:sld>
+</file>
+
+<file path=ppt/slides/slide34.xml><?xml version="1.0" encoding="utf-8"?>
+<p:sld xmlns:a="http://schemas.openxmlformats.org/drawingml/2006/main" xmlns:r="http://schemas.openxmlformats.org/officeDocument/2006/relationships" xmlns:p="http://schemas.openxmlformats.org/presentationml/2006/main">
+  <p:cSld>
+    <p:spTree>
+      <p:nvGrpSpPr>
+        <p:cNvPr id="1" name=""/>
+        <p:cNvGrpSpPr/>
+        <p:nvPr/>
+      </p:nvGrpSpPr>
+      <p:grpSpPr>
+        <a:xfrm>
+          <a:off x="0" y="0"/>
+          <a:ext cx="0" cy="0"/>
+          <a:chOff x="0" y="0"/>
+          <a:chExt cx="0" cy="0"/>
+        </a:xfrm>
+      </p:grpSpPr>
+      <p:sp>
+        <p:nvSpPr>
           <p:cNvPr id="2" name="Espace réservé du contenu 1"/>
           <p:cNvSpPr>
             <a:spLocks noGrp="1"/>
@@ -13458,54 +14260,74 @@
           <a:p>
             <a:r>
               <a:rPr lang="en-US" dirty="0" smtClean="0"/>
-              <a:t>Use Microsoft Visual Studio 2017</a:t>
+              <a:t>Used in an application outside TSDuck</a:t>
+            </a:r>
+          </a:p>
+          <a:p>
+            <a:r>
+              <a:rPr lang="en-US" dirty="0" smtClean="0"/>
+              <a:t>Install the TSDuck development environment</a:t>
             </a:r>
           </a:p>
           <a:p>
             <a:pPr lvl="1"/>
             <a:r>
               <a:rPr lang="en-US" dirty="0" smtClean="0"/>
-              <a:t>Community Edition is free</a:t>
-            </a:r>
-          </a:p>
-          <a:p>
-            <a:r>
-              <a:rPr lang="en-US" dirty="0" smtClean="0"/>
-              <a:t>Modify the application’s </a:t>
+              <a:t>Windows: “Development” option in installer</a:t>
+            </a:r>
+          </a:p>
+          <a:p>
+            <a:pPr lvl="1"/>
+            <a:r>
+              <a:rPr lang="en-US" dirty="0" smtClean="0"/>
+              <a:t>Ubuntu: package </a:t>
+            </a:r>
+            <a:r>
+              <a:rPr lang="en-US" dirty="0" err="1" smtClean="0">
+                <a:latin typeface="Consolas" panose="020B0609020204030204" pitchFamily="49" charset="0"/>
+                <a:cs typeface="Consolas" panose="020B0609020204030204" pitchFamily="49" charset="0"/>
+              </a:rPr>
+              <a:t>tsduck</a:t>
+            </a:r>
+            <a:r>
+              <a:rPr lang="en-US" dirty="0" smtClean="0">
+                <a:latin typeface="Consolas" panose="020B0609020204030204" pitchFamily="49" charset="0"/>
+                <a:cs typeface="Consolas" panose="020B0609020204030204" pitchFamily="49" charset="0"/>
+              </a:rPr>
+              <a:t>-dev</a:t>
+            </a:r>
+          </a:p>
+          <a:p>
+            <a:pPr lvl="1"/>
+            <a:r>
+              <a:rPr lang="en-US" dirty="0" smtClean="0"/>
+              <a:t>Fedora, Red Hat, CentOS: </a:t>
             </a:r>
             <a:r>
               <a:rPr lang="en-US" dirty="0"/>
-              <a:t>project file (</a:t>
-            </a:r>
-            <a:r>
-              <a:rPr lang="en-US" i="1" dirty="0" err="1">
-                <a:latin typeface="Consolas" panose="020B0609020204030204" pitchFamily="49" charset="0"/>
-                <a:cs typeface="Consolas" panose="020B0609020204030204" pitchFamily="49" charset="0"/>
-              </a:rPr>
-              <a:t>app</a:t>
-            </a:r>
-            <a:r>
-              <a:rPr lang="en-US" dirty="0" err="1">
-                <a:latin typeface="Consolas" panose="020B0609020204030204" pitchFamily="49" charset="0"/>
-                <a:cs typeface="Consolas" panose="020B0609020204030204" pitchFamily="49" charset="0"/>
-              </a:rPr>
-              <a:t>.vcxproj</a:t>
-            </a:r>
+              <a:t>package </a:t>
+            </a:r>
+            <a:r>
+              <a:rPr lang="en-US" dirty="0" err="1" smtClean="0">
+                <a:latin typeface="Consolas" panose="020B0609020204030204" pitchFamily="49" charset="0"/>
+                <a:cs typeface="Consolas" panose="020B0609020204030204" pitchFamily="49" charset="0"/>
+              </a:rPr>
+              <a:t>tsduck-devel</a:t>
+            </a:r>
+            <a:endParaRPr lang="en-US" dirty="0" smtClean="0">
+              <a:latin typeface="Consolas" panose="020B0609020204030204" pitchFamily="49" charset="0"/>
+              <a:cs typeface="Consolas" panose="020B0609020204030204" pitchFamily="49" charset="0"/>
+            </a:endParaRPr>
+          </a:p>
+          <a:p>
             <a:r>
               <a:rPr lang="en-US" dirty="0"/>
-              <a:t>)</a:t>
-            </a:r>
-            <a:endParaRPr lang="en-US" dirty="0" smtClean="0"/>
-          </a:p>
-          <a:p>
-            <a:pPr lvl="1"/>
-            <a:r>
-              <a:rPr lang="en-US" dirty="0" smtClean="0"/>
-              <a:t>Add one reference to the TSDuck property file</a:t>
+              <a:t>Typical application source file</a:t>
             </a:r>
           </a:p>
           <a:p>
             <a:pPr lvl="2">
+              <a:buFont typeface="Wingdings" pitchFamily="2" charset="2"/>
               <a:buNone/>
             </a:pPr>
             <a:r>
@@ -13513,36 +14335,422 @@
                 <a:latin typeface="Consolas" panose="020B0609020204030204" pitchFamily="49" charset="0"/>
                 <a:cs typeface="Consolas" panose="020B0609020204030204" pitchFamily="49" charset="0"/>
               </a:rPr>
-              <a:t>&lt;Import Project="$(TSDUCK)\</a:t>
+              <a:t>#include "</a:t>
             </a:r>
             <a:r>
               <a:rPr lang="en-US" sz="1600" b="1" dirty="0" err="1">
                 <a:latin typeface="Consolas" panose="020B0609020204030204" pitchFamily="49" charset="0"/>
                 <a:cs typeface="Consolas" panose="020B0609020204030204" pitchFamily="49" charset="0"/>
               </a:rPr>
-              <a:t>tsduck.props</a:t>
+              <a:t>tsduck.h</a:t>
             </a:r>
             <a:r>
               <a:rPr lang="en-US" sz="1600" b="1" dirty="0">
                 <a:latin typeface="Consolas" panose="020B0609020204030204" pitchFamily="49" charset="0"/>
                 <a:cs typeface="Consolas" panose="020B0609020204030204" pitchFamily="49" charset="0"/>
               </a:rPr>
-              <a:t>" /&gt;</a:t>
+              <a:t>"</a:t>
+            </a:r>
+          </a:p>
+          <a:p>
+            <a:pPr lvl="2">
+              <a:buFont typeface="Wingdings" pitchFamily="2" charset="2"/>
+              <a:buNone/>
+            </a:pPr>
+            <a:r>
+              <a:rPr lang="en-US" sz="1600" b="1" dirty="0">
+                <a:latin typeface="Consolas" panose="020B0609020204030204" pitchFamily="49" charset="0"/>
+                <a:cs typeface="Consolas" panose="020B0609020204030204" pitchFamily="49" charset="0"/>
+              </a:rPr>
+              <a:t>... application code </a:t>
+            </a:r>
+            <a:r>
+              <a:rPr lang="en-US" sz="1600" b="1" dirty="0" smtClean="0">
+                <a:latin typeface="Consolas" panose="020B0609020204030204" pitchFamily="49" charset="0"/>
+                <a:cs typeface="Consolas" panose="020B0609020204030204" pitchFamily="49" charset="0"/>
+              </a:rPr>
+              <a:t>...</a:t>
             </a:r>
             <a:endParaRPr lang="en-US" sz="1600" b="1" dirty="0">
               <a:latin typeface="Consolas" panose="020B0609020204030204" pitchFamily="49" charset="0"/>
               <a:cs typeface="Consolas" panose="020B0609020204030204" pitchFamily="49" charset="0"/>
             </a:endParaRPr>
           </a:p>
+        </p:txBody>
+      </p:sp>
+      <p:sp>
+        <p:nvSpPr>
+          <p:cNvPr id="3" name="Titre 2"/>
+          <p:cNvSpPr>
+            <a:spLocks noGrp="1"/>
+          </p:cNvSpPr>
+          <p:nvPr>
+            <p:ph type="title"/>
+          </p:nvPr>
+        </p:nvSpPr>
+        <p:spPr/>
+        <p:txBody>
+          <a:bodyPr/>
+          <a:lstStyle/>
+          <a:p>
+            <a:r>
+              <a:rPr lang="en-US" dirty="0" smtClean="0"/>
+              <a:t>Using TSDuck as a library</a:t>
+            </a:r>
+            <a:endParaRPr lang="en-US" dirty="0"/>
+          </a:p>
+        </p:txBody>
+      </p:sp>
+    </p:spTree>
+    <p:extLst>
+      <p:ext uri="{BB962C8B-B14F-4D97-AF65-F5344CB8AC3E}">
+        <p14:creationId xmlns:p14="http://schemas.microsoft.com/office/powerpoint/2010/main" val="3719695563"/>
+      </p:ext>
+    </p:extLst>
+  </p:cSld>
+  <p:clrMapOvr>
+    <a:masterClrMapping/>
+  </p:clrMapOvr>
+  <mc:AlternateContent xmlns:mc="http://schemas.openxmlformats.org/markup-compatibility/2006" xmlns:p14="http://schemas.microsoft.com/office/powerpoint/2010/main">
+    <mc:Choice Requires="p14">
+      <p:transition spd="med" p14:dur="700">
+        <p:fade/>
+      </p:transition>
+    </mc:Choice>
+    <mc:Fallback xmlns="">
+      <p:transition spd="med">
+        <p:fade/>
+      </p:transition>
+    </mc:Fallback>
+  </mc:AlternateContent>
+  <p:timing>
+    <p:tnLst>
+      <p:par>
+        <p:cTn id="1" dur="indefinite" restart="never" nodeType="tmRoot"/>
+      </p:par>
+    </p:tnLst>
+  </p:timing>
+</p:sld>
+</file>
+
+<file path=ppt/slides/slide35.xml><?xml version="1.0" encoding="utf-8"?>
+<p:sld xmlns:a="http://schemas.openxmlformats.org/drawingml/2006/main" xmlns:r="http://schemas.openxmlformats.org/officeDocument/2006/relationships" xmlns:p="http://schemas.openxmlformats.org/presentationml/2006/main">
+  <p:cSld>
+    <p:spTree>
+      <p:nvGrpSpPr>
+        <p:cNvPr id="1" name=""/>
+        <p:cNvGrpSpPr/>
+        <p:nvPr/>
+      </p:nvGrpSpPr>
+      <p:grpSpPr>
+        <a:xfrm>
+          <a:off x="0" y="0"/>
+          <a:ext cx="0" cy="0"/>
+          <a:chOff x="0" y="0"/>
+          <a:chExt cx="0" cy="0"/>
+        </a:xfrm>
+      </p:grpSpPr>
+      <p:sp>
+        <p:nvSpPr>
+          <p:cNvPr id="2" name="Espace réservé du contenu 1"/>
+          <p:cNvSpPr>
+            <a:spLocks noGrp="1"/>
+          </p:cNvSpPr>
+          <p:nvPr>
+            <p:ph idx="1"/>
+          </p:nvPr>
+        </p:nvSpPr>
+        <p:spPr/>
+        <p:txBody>
+          <a:bodyPr>
+            <a:normAutofit/>
+          </a:bodyPr>
+          <a:lstStyle/>
+          <a:p>
+            <a:r>
+              <a:rPr lang="en-US" dirty="0" smtClean="0"/>
+              <a:t>Typical Linux Makefile</a:t>
+            </a:r>
+          </a:p>
+          <a:p>
+            <a:pPr lvl="2">
+              <a:buFont typeface="Wingdings" pitchFamily="2" charset="2"/>
+              <a:buNone/>
+            </a:pPr>
+            <a:r>
+              <a:rPr lang="en-US" sz="1600" b="1" dirty="0">
+                <a:latin typeface="Consolas" panose="020B0609020204030204" pitchFamily="49" charset="0"/>
+                <a:cs typeface="Consolas" panose="020B0609020204030204" pitchFamily="49" charset="0"/>
+              </a:rPr>
+              <a:t>include /</a:t>
+            </a:r>
+            <a:r>
+              <a:rPr lang="en-US" sz="1600" b="1" dirty="0" smtClean="0">
+                <a:latin typeface="Consolas" panose="020B0609020204030204" pitchFamily="49" charset="0"/>
+                <a:cs typeface="Consolas" panose="020B0609020204030204" pitchFamily="49" charset="0"/>
+              </a:rPr>
+              <a:t>usr/include/tsduck/tsduck.mk</a:t>
+            </a:r>
+          </a:p>
+          <a:p>
+            <a:pPr lvl="2">
+              <a:buFont typeface="Wingdings" pitchFamily="2" charset="2"/>
+              <a:buNone/>
+            </a:pPr>
+            <a:r>
+              <a:rPr lang="en-US" sz="1600" b="1" i="1" dirty="0" smtClean="0">
+                <a:latin typeface="Consolas" panose="020B0609020204030204" pitchFamily="49" charset="0"/>
+                <a:cs typeface="Consolas" panose="020B0609020204030204" pitchFamily="49" charset="0"/>
+              </a:rPr>
+              <a:t>... application-specific rules ...</a:t>
+            </a:r>
+          </a:p>
+          <a:p>
+            <a:r>
+              <a:rPr lang="en-US" dirty="0"/>
+              <a:t>Typical </a:t>
+            </a:r>
+            <a:r>
+              <a:rPr lang="en-US" dirty="0" smtClean="0"/>
+              <a:t>macOS Makefile</a:t>
+            </a:r>
+            <a:endParaRPr lang="en-US" dirty="0"/>
+          </a:p>
+          <a:p>
+            <a:pPr lvl="2">
+              <a:buFont typeface="Wingdings" pitchFamily="2" charset="2"/>
+              <a:buNone/>
+            </a:pPr>
+            <a:r>
+              <a:rPr lang="en-US" sz="1600" b="1" dirty="0">
+                <a:latin typeface="Consolas" panose="020B0609020204030204" pitchFamily="49" charset="0"/>
+                <a:cs typeface="Consolas" panose="020B0609020204030204" pitchFamily="49" charset="0"/>
+              </a:rPr>
+              <a:t>include /</a:t>
+            </a:r>
+            <a:r>
+              <a:rPr lang="en-US" sz="1600" b="1" dirty="0" smtClean="0">
+                <a:latin typeface="Consolas" panose="020B0609020204030204" pitchFamily="49" charset="0"/>
+                <a:cs typeface="Consolas" panose="020B0609020204030204" pitchFamily="49" charset="0"/>
+              </a:rPr>
+              <a:t>usr/</a:t>
+            </a:r>
+            <a:r>
+              <a:rPr lang="en-US" sz="1600" b="1" dirty="0" smtClean="0">
+                <a:solidFill>
+                  <a:srgbClr val="FF0000"/>
+                </a:solidFill>
+                <a:latin typeface="Consolas" panose="020B0609020204030204" pitchFamily="49" charset="0"/>
+                <a:cs typeface="Consolas" panose="020B0609020204030204" pitchFamily="49" charset="0"/>
+              </a:rPr>
+              <a:t>local</a:t>
+            </a:r>
+            <a:r>
+              <a:rPr lang="en-US" sz="1600" b="1" dirty="0" smtClean="0">
+                <a:latin typeface="Consolas" panose="020B0609020204030204" pitchFamily="49" charset="0"/>
+                <a:cs typeface="Consolas" panose="020B0609020204030204" pitchFamily="49" charset="0"/>
+              </a:rPr>
+              <a:t>/include/tsduck/tsduck.mk</a:t>
+            </a:r>
+            <a:endParaRPr lang="en-US" sz="1600" b="1" dirty="0">
+              <a:latin typeface="Consolas" panose="020B0609020204030204" pitchFamily="49" charset="0"/>
+              <a:cs typeface="Consolas" panose="020B0609020204030204" pitchFamily="49" charset="0"/>
+            </a:endParaRPr>
+          </a:p>
+          <a:p>
+            <a:pPr lvl="2">
+              <a:buFont typeface="Wingdings" pitchFamily="2" charset="2"/>
+              <a:buNone/>
+            </a:pPr>
+            <a:r>
+              <a:rPr lang="en-US" sz="1600" b="1" i="1" dirty="0">
+                <a:latin typeface="Consolas" panose="020B0609020204030204" pitchFamily="49" charset="0"/>
+                <a:cs typeface="Consolas" panose="020B0609020204030204" pitchFamily="49" charset="0"/>
+              </a:rPr>
+              <a:t>... application-specific rules </a:t>
+            </a:r>
+            <a:r>
+              <a:rPr lang="en-US" sz="1600" b="1" i="1" dirty="0" smtClean="0">
+                <a:latin typeface="Consolas" panose="020B0609020204030204" pitchFamily="49" charset="0"/>
+                <a:cs typeface="Consolas" panose="020B0609020204030204" pitchFamily="49" charset="0"/>
+              </a:rPr>
+              <a:t>...</a:t>
+            </a:r>
+            <a:endParaRPr lang="en-US" sz="1600" b="1" i="1" dirty="0">
+              <a:latin typeface="Consolas" panose="020B0609020204030204" pitchFamily="49" charset="0"/>
+              <a:cs typeface="Consolas" panose="020B0609020204030204" pitchFamily="49" charset="0"/>
+            </a:endParaRPr>
+          </a:p>
+        </p:txBody>
+      </p:sp>
+      <p:sp>
+        <p:nvSpPr>
+          <p:cNvPr id="3" name="Titre 2"/>
+          <p:cNvSpPr>
+            <a:spLocks noGrp="1"/>
+          </p:cNvSpPr>
+          <p:nvPr>
+            <p:ph type="title"/>
+          </p:nvPr>
+        </p:nvSpPr>
+        <p:spPr/>
+        <p:txBody>
+          <a:bodyPr/>
+          <a:lstStyle/>
+          <a:p>
+            <a:r>
+              <a:rPr lang="en-US" dirty="0" smtClean="0"/>
+              <a:t>Building with TSDuck library on UNIX</a:t>
+            </a:r>
+            <a:endParaRPr lang="en-US" dirty="0"/>
+          </a:p>
+        </p:txBody>
+      </p:sp>
+    </p:spTree>
+    <p:extLst>
+      <p:ext uri="{BB962C8B-B14F-4D97-AF65-F5344CB8AC3E}">
+        <p14:creationId xmlns:p14="http://schemas.microsoft.com/office/powerpoint/2010/main" val="2242190018"/>
+      </p:ext>
+    </p:extLst>
+  </p:cSld>
+  <p:clrMapOvr>
+    <a:masterClrMapping/>
+  </p:clrMapOvr>
+  <mc:AlternateContent xmlns:mc="http://schemas.openxmlformats.org/markup-compatibility/2006" xmlns:p14="http://schemas.microsoft.com/office/powerpoint/2010/main">
+    <mc:Choice Requires="p14">
+      <p:transition spd="med" p14:dur="700">
+        <p:fade/>
+      </p:transition>
+    </mc:Choice>
+    <mc:Fallback xmlns="">
+      <p:transition spd="med">
+        <p:fade/>
+      </p:transition>
+    </mc:Fallback>
+  </mc:AlternateContent>
+  <p:timing>
+    <p:tnLst>
+      <p:par>
+        <p:cTn id="1" dur="indefinite" restart="never" nodeType="tmRoot"/>
+      </p:par>
+    </p:tnLst>
+  </p:timing>
+</p:sld>
+</file>
+
+<file path=ppt/slides/slide36.xml><?xml version="1.0" encoding="utf-8"?>
+<p:sld xmlns:a="http://schemas.openxmlformats.org/drawingml/2006/main" xmlns:r="http://schemas.openxmlformats.org/officeDocument/2006/relationships" xmlns:p="http://schemas.openxmlformats.org/presentationml/2006/main">
+  <p:cSld>
+    <p:spTree>
+      <p:nvGrpSpPr>
+        <p:cNvPr id="1" name=""/>
+        <p:cNvGrpSpPr/>
+        <p:nvPr/>
+      </p:nvGrpSpPr>
+      <p:grpSpPr>
+        <a:xfrm>
+          <a:off x="0" y="0"/>
+          <a:ext cx="0" cy="0"/>
+          <a:chOff x="0" y="0"/>
+          <a:chExt cx="0" cy="0"/>
+        </a:xfrm>
+      </p:grpSpPr>
+      <p:sp>
+        <p:nvSpPr>
+          <p:cNvPr id="2" name="Espace réservé du contenu 1"/>
+          <p:cNvSpPr>
+            <a:spLocks noGrp="1"/>
+          </p:cNvSpPr>
+          <p:nvPr>
+            <p:ph idx="1"/>
+          </p:nvPr>
+        </p:nvSpPr>
+        <p:spPr/>
+        <p:txBody>
+          <a:bodyPr>
+            <a:normAutofit/>
+          </a:bodyPr>
+          <a:lstStyle/>
+          <a:p>
+            <a:r>
+              <a:rPr lang="en-US" dirty="0" smtClean="0"/>
+              <a:t>Use Microsoft Visual Studio 2017</a:t>
+            </a:r>
+          </a:p>
           <a:p>
             <a:pPr lvl="1"/>
             <a:r>
               <a:rPr lang="en-US" dirty="0" smtClean="0"/>
-              <a:t>Just befor</a:t>
-            </a:r>
-            <a:r>
-              <a:rPr lang="en-US" dirty="0" smtClean="0"/>
-              <a:t>e </a:t>
+              <a:t>Community Edition is free</a:t>
+            </a:r>
+          </a:p>
+          <a:p>
+            <a:r>
+              <a:rPr lang="en-US" dirty="0" smtClean="0"/>
+              <a:t>Modify the application’s </a:t>
+            </a:r>
+            <a:r>
+              <a:rPr lang="en-US" dirty="0"/>
+              <a:t>project file (</a:t>
+            </a:r>
+            <a:r>
+              <a:rPr lang="en-US" i="1" dirty="0" err="1">
+                <a:latin typeface="Consolas" panose="020B0609020204030204" pitchFamily="49" charset="0"/>
+                <a:cs typeface="Consolas" panose="020B0609020204030204" pitchFamily="49" charset="0"/>
+              </a:rPr>
+              <a:t>app</a:t>
+            </a:r>
+            <a:r>
+              <a:rPr lang="en-US" dirty="0" err="1">
+                <a:latin typeface="Consolas" panose="020B0609020204030204" pitchFamily="49" charset="0"/>
+                <a:cs typeface="Consolas" panose="020B0609020204030204" pitchFamily="49" charset="0"/>
+              </a:rPr>
+              <a:t>.vcxproj</a:t>
+            </a:r>
+            <a:r>
+              <a:rPr lang="en-US" dirty="0"/>
+              <a:t>)</a:t>
+            </a:r>
+            <a:endParaRPr lang="en-US" dirty="0" smtClean="0"/>
+          </a:p>
+          <a:p>
+            <a:pPr lvl="1"/>
+            <a:r>
+              <a:rPr lang="en-US" dirty="0" smtClean="0"/>
+              <a:t>Add one reference to the TSDuck property file</a:t>
+            </a:r>
+          </a:p>
+          <a:p>
+            <a:pPr lvl="2">
+              <a:buNone/>
+            </a:pPr>
+            <a:r>
+              <a:rPr lang="en-US" sz="1600" b="1" dirty="0">
+                <a:latin typeface="Consolas" panose="020B0609020204030204" pitchFamily="49" charset="0"/>
+                <a:cs typeface="Consolas" panose="020B0609020204030204" pitchFamily="49" charset="0"/>
+              </a:rPr>
+              <a:t>&lt;Import Project="$(TSDUCK)\</a:t>
+            </a:r>
+            <a:r>
+              <a:rPr lang="en-US" sz="1600" b="1" dirty="0" err="1">
+                <a:latin typeface="Consolas" panose="020B0609020204030204" pitchFamily="49" charset="0"/>
+                <a:cs typeface="Consolas" panose="020B0609020204030204" pitchFamily="49" charset="0"/>
+              </a:rPr>
+              <a:t>tsduck.props</a:t>
+            </a:r>
+            <a:r>
+              <a:rPr lang="en-US" sz="1600" b="1" dirty="0">
+                <a:latin typeface="Consolas" panose="020B0609020204030204" pitchFamily="49" charset="0"/>
+                <a:cs typeface="Consolas" panose="020B0609020204030204" pitchFamily="49" charset="0"/>
+              </a:rPr>
+              <a:t>" /&gt;</a:t>
+            </a:r>
+          </a:p>
+          <a:p>
+            <a:pPr lvl="1"/>
+            <a:r>
+              <a:rPr lang="en-US" dirty="0" smtClean="0"/>
+              <a:t>Just before </a:t>
             </a:r>
             <a:r>
               <a:rPr lang="en-US" dirty="0"/>
@@ -13635,7 +14843,7 @@
 </p:sld>
 </file>
 
-<file path=ppt/slides/slide33.xml><?xml version="1.0" encoding="utf-8"?>
+<file path=ppt/slides/slide37.xml><?xml version="1.0" encoding="utf-8"?>
 <p:sld xmlns:a="http://schemas.openxmlformats.org/drawingml/2006/main" xmlns:r="http://schemas.openxmlformats.org/officeDocument/2006/relationships" xmlns:p="http://schemas.openxmlformats.org/presentationml/2006/main">
   <p:cSld>
     <p:spTree>
@@ -14005,20 +15213,12 @@
                 <a:cs typeface="Consolas" panose="020B0609020204030204" pitchFamily="49" charset="0"/>
                 <a:hlinkClick r:id="rId3"/>
               </a:rPr>
-              <a:t>https://tsduck.github.io</a:t>
+              <a:t>https://tsduck.github.io/</a:t>
             </a:r>
             <a:r>
               <a:rPr lang="en-US" sz="2000" dirty="0">
                 <a:latin typeface="Consolas" panose="020B0609020204030204" pitchFamily="49" charset="0"/>
                 <a:cs typeface="Consolas" panose="020B0609020204030204" pitchFamily="49" charset="0"/>
-                <a:hlinkClick r:id="rId3"/>
-              </a:rPr>
-              <a:t>/</a:t>
-            </a:r>
-            <a:r>
-              <a:rPr lang="en-US" sz="2000" dirty="0">
-                <a:latin typeface="Consolas" panose="020B0609020204030204" pitchFamily="49" charset="0"/>
-                <a:cs typeface="Consolas" panose="020B0609020204030204" pitchFamily="49" charset="0"/>
               </a:rPr>
               <a:t> </a:t>
             </a:r>
@@ -14026,11 +15226,7 @@
           <a:p>
             <a:r>
               <a:rPr lang="en-US" dirty="0" smtClean="0"/>
-              <a:t>Open-source </a:t>
-            </a:r>
-            <a:r>
-              <a:rPr lang="en-US" dirty="0" smtClean="0"/>
-              <a:t>code</a:t>
+              <a:t>Open-source code</a:t>
             </a:r>
           </a:p>
           <a:p>

</xml_diff>

<commit_message>
Removed tsgentab from documentation
</commit_message>
<xml_diff>
--- a/doc/tsduck-presentation.pptx
+++ b/doc/tsduck-presentation.pptx
@@ -231,7 +231,7 @@
           <a:p>
             <a:fld id="{C55B0BA7-B0E2-4C07-8528-84B7AE1BAF72}" type="datetimeFigureOut">
               <a:rPr lang="en-US" smtClean="0"/>
-              <a:t>2017-09-15</a:t>
+              <a:t>2017-09-25</a:t>
             </a:fld>
             <a:endParaRPr lang="en-US"/>
           </a:p>
@@ -397,7 +397,7 @@
           <a:p>
             <a:fld id="{66F6DD61-880C-4F33-96A2-51E92479021F}" type="datetimeFigureOut">
               <a:rPr lang="en-US" smtClean="0"/>
-              <a:t>2017-09-15</a:t>
+              <a:t>2017-09-25</a:t>
             </a:fld>
             <a:endParaRPr lang="en-US" dirty="0"/>
           </a:p>
@@ -5383,11 +5383,7 @@
           <a:p>
             <a:r>
               <a:rPr lang="en-US" sz="1700" dirty="0" smtClean="0"/>
-              <a:t>TSDuck Version </a:t>
-            </a:r>
-            <a:r>
-              <a:rPr lang="en-US" sz="1700" dirty="0" smtClean="0"/>
-              <a:t>3.3</a:t>
+              <a:t>TSDuck Version 3.3</a:t>
             </a:r>
             <a:endParaRPr lang="en-US" sz="1700" dirty="0"/>
           </a:p>
@@ -5519,11 +5515,7 @@
           <a:p>
             <a:r>
               <a:rPr lang="en-US" dirty="0" smtClean="0"/>
-              <a:t>TS </a:t>
-            </a:r>
-            <a:r>
-              <a:rPr lang="en-US" dirty="0" smtClean="0"/>
-              <a:t>files recovery</a:t>
+              <a:t>TS files recovery</a:t>
             </a:r>
           </a:p>
           <a:p>
@@ -5709,39 +5701,20 @@
             </a:r>
             <a:r>
               <a:rPr lang="en-US" dirty="0"/>
-              <a:t>: table compiler from XML source files</a:t>
-            </a:r>
-          </a:p>
-          <a:p>
-            <a:pPr lvl="1"/>
-            <a:r>
-              <a:rPr lang="en-US" b="1" i="1" dirty="0" smtClean="0"/>
-              <a:t>tsgentab</a:t>
-            </a:r>
-            <a:r>
-              <a:rPr lang="en-US" dirty="0" smtClean="0"/>
-              <a:t> </a:t>
-            </a:r>
-            <a:r>
-              <a:rPr lang="en-US" dirty="0" smtClean="0"/>
-              <a:t>: generate specific tables using plugins</a:t>
+              <a:t>: table compiler from XML source </a:t>
+            </a:r>
+            <a:r>
+              <a:rPr lang="en-US" dirty="0" smtClean="0"/>
+              <a:t>files</a:t>
             </a:r>
           </a:p>
           <a:p>
             <a:pPr lvl="2"/>
             <a:r>
-              <a:rPr lang="en-US" dirty="0"/>
-              <a:t>n</a:t>
-            </a:r>
-            <a:r>
-              <a:rPr lang="en-US" dirty="0" smtClean="0"/>
-              <a:t>ow deprecated in favor of </a:t>
-            </a:r>
-            <a:r>
-              <a:rPr lang="en-US" i="1" dirty="0" smtClean="0"/>
-              <a:t>tstabcomp</a:t>
-            </a:r>
-            <a:endParaRPr lang="en-US" i="1" dirty="0"/>
+              <a:rPr lang="en-US" dirty="0" smtClean="0"/>
+              <a:t>also a decompiler which generates XML from captured binary tables</a:t>
+            </a:r>
+            <a:endParaRPr lang="en-US" dirty="0"/>
           </a:p>
         </p:txBody>
       </p:sp>
@@ -8494,14 +8467,7 @@
                 <a:latin typeface="Consolas" panose="020B0609020204030204" pitchFamily="49" charset="0"/>
                 <a:cs typeface="Consolas" panose="020B0609020204030204" pitchFamily="49" charset="0"/>
               </a:rPr>
-              <a:t> --uhf 24 --</a:t>
-            </a:r>
-            <a:r>
-              <a:rPr lang="en-US" sz="1800" b="1" dirty="0" smtClean="0">
-                <a:latin typeface="Consolas" panose="020B0609020204030204" pitchFamily="49" charset="0"/>
-                <a:cs typeface="Consolas" panose="020B0609020204030204" pitchFamily="49" charset="0"/>
-              </a:rPr>
-              <a:t>convolution 2/3 --guard 1/32</a:t>
+              <a:t> --uhf 24 --convolution 2/3 --guard 1/32</a:t>
             </a:r>
             <a:endParaRPr lang="en-US" sz="1800" b="1" dirty="0">
               <a:latin typeface="Consolas" panose="020B0609020204030204" pitchFamily="49" charset="0"/>
@@ -10444,11 +10410,7 @@
           <a:p>
             <a:r>
               <a:rPr lang="en-US" dirty="0" smtClean="0"/>
-              <a:t>Transport stream </a:t>
-            </a:r>
-            <a:r>
-              <a:rPr lang="en-US" dirty="0" smtClean="0"/>
-              <a:t>processor</a:t>
+              <a:t>Transport stream processor</a:t>
             </a:r>
           </a:p>
           <a:p>
@@ -10456,7 +10418,6 @@
               <a:rPr lang="en-US" dirty="0" smtClean="0"/>
               <a:t>XML table compiler</a:t>
             </a:r>
-            <a:endParaRPr lang="en-US" dirty="0" smtClean="0"/>
           </a:p>
           <a:p>
             <a:r>
@@ -12531,28 +12492,7 @@
                 <a:latin typeface="Consolas" panose="020B0609020204030204" pitchFamily="49" charset="0"/>
                 <a:cs typeface="Consolas" panose="020B0609020204030204" pitchFamily="49" charset="0"/>
               </a:rPr>
-              <a:t> … </a:t>
-            </a:r>
-            <a:r>
-              <a:rPr lang="en-US" sz="1600" b="1" dirty="0">
-                <a:latin typeface="Consolas" panose="020B0609020204030204" pitchFamily="49" charset="0"/>
-                <a:cs typeface="Consolas" panose="020B0609020204030204" pitchFamily="49" charset="0"/>
-              </a:rPr>
-              <a:t>-</a:t>
-            </a:r>
-            <a:r>
-              <a:rPr lang="en-US" sz="1600" b="1" dirty="0">
-                <a:latin typeface="Consolas" panose="020B0609020204030204" pitchFamily="49" charset="0"/>
-                <a:cs typeface="Consolas" panose="020B0609020204030204" pitchFamily="49" charset="0"/>
-              </a:rPr>
-              <a:t>O </a:t>
-            </a:r>
-            <a:r>
-              <a:rPr lang="en-US" sz="1600" b="1" dirty="0">
-                <a:latin typeface="Consolas" panose="020B0609020204030204" pitchFamily="49" charset="0"/>
-                <a:cs typeface="Consolas" panose="020B0609020204030204" pitchFamily="49" charset="0"/>
-              </a:rPr>
-              <a:t>drop \</a:t>
+              <a:t> … -O drop \</a:t>
             </a:r>
           </a:p>
           <a:p>
@@ -12564,21 +12504,7 @@
                 <a:latin typeface="Consolas" panose="020B0609020204030204" pitchFamily="49" charset="0"/>
                 <a:cs typeface="Consolas" panose="020B0609020204030204" pitchFamily="49" charset="0"/>
               </a:rPr>
-              <a:t> </a:t>
-            </a:r>
-            <a:r>
-              <a:rPr lang="en-US" sz="1600" b="1" dirty="0">
-                <a:latin typeface="Consolas" panose="020B0609020204030204" pitchFamily="49" charset="0"/>
-                <a:cs typeface="Consolas" panose="020B0609020204030204" pitchFamily="49" charset="0"/>
-              </a:rPr>
-              <a:t>   -</a:t>
-            </a:r>
-            <a:r>
-              <a:rPr lang="en-US" sz="1600" b="1" dirty="0">
-                <a:latin typeface="Consolas" panose="020B0609020204030204" pitchFamily="49" charset="0"/>
-                <a:cs typeface="Consolas" panose="020B0609020204030204" pitchFamily="49" charset="0"/>
-              </a:rPr>
-              <a:t>P tables --</a:t>
+              <a:t>    -P tables --</a:t>
             </a:r>
             <a:r>
               <a:rPr lang="en-US" sz="1600" b="1" dirty="0" err="1">
@@ -12720,84 +12646,49 @@
                 <a:latin typeface="Consolas" panose="020B0609020204030204" pitchFamily="49" charset="0"/>
                 <a:cs typeface="Consolas" panose="020B0609020204030204" pitchFamily="49" charset="0"/>
               </a:rPr>
-              <a:t> </a:t>
+              <a:t> … -P inject </a:t>
+            </a:r>
+            <a:r>
+              <a:rPr lang="en-US" sz="1600" b="1" dirty="0" err="1">
+                <a:latin typeface="Consolas" panose="020B0609020204030204" pitchFamily="49" charset="0"/>
+                <a:cs typeface="Consolas" panose="020B0609020204030204" pitchFamily="49" charset="0"/>
+              </a:rPr>
+              <a:t>nit.bin</a:t>
             </a:r>
             <a:r>
               <a:rPr lang="en-US" sz="1600" b="1" dirty="0">
                 <a:latin typeface="Consolas" panose="020B0609020204030204" pitchFamily="49" charset="0"/>
                 <a:cs typeface="Consolas" panose="020B0609020204030204" pitchFamily="49" charset="0"/>
               </a:rPr>
-              <a:t>… -P </a:t>
+              <a:t> --</a:t>
+            </a:r>
+            <a:r>
+              <a:rPr lang="en-US" sz="1600" b="1" dirty="0" err="1">
+                <a:latin typeface="Consolas" panose="020B0609020204030204" pitchFamily="49" charset="0"/>
+                <a:cs typeface="Consolas" panose="020B0609020204030204" pitchFamily="49" charset="0"/>
+              </a:rPr>
+              <a:t>pid</a:t>
             </a:r>
             <a:r>
               <a:rPr lang="en-US" sz="1600" b="1" dirty="0">
                 <a:latin typeface="Consolas" panose="020B0609020204030204" pitchFamily="49" charset="0"/>
                 <a:cs typeface="Consolas" panose="020B0609020204030204" pitchFamily="49" charset="0"/>
               </a:rPr>
-              <a:t>inject </a:t>
+              <a:t> 16 … -O </a:t>
             </a:r>
             <a:r>
               <a:rPr lang="en-US" sz="1600" b="1" dirty="0" err="1">
                 <a:latin typeface="Consolas" panose="020B0609020204030204" pitchFamily="49" charset="0"/>
                 <a:cs typeface="Consolas" panose="020B0609020204030204" pitchFamily="49" charset="0"/>
               </a:rPr>
-              <a:t>nit.bin</a:t>
+              <a:t>dektec</a:t>
             </a:r>
             <a:r>
               <a:rPr lang="en-US" sz="1600" b="1" dirty="0">
                 <a:latin typeface="Consolas" panose="020B0609020204030204" pitchFamily="49" charset="0"/>
                 <a:cs typeface="Consolas" panose="020B0609020204030204" pitchFamily="49" charset="0"/>
               </a:rPr>
-              <a:t> --</a:t>
-            </a:r>
-            <a:r>
-              <a:rPr lang="en-US" sz="1600" b="1" dirty="0" err="1">
-                <a:latin typeface="Consolas" panose="020B0609020204030204" pitchFamily="49" charset="0"/>
-                <a:cs typeface="Consolas" panose="020B0609020204030204" pitchFamily="49" charset="0"/>
-              </a:rPr>
-              <a:t>pid</a:t>
-            </a:r>
-            <a:r>
-              <a:rPr lang="en-US" sz="1600" b="1" dirty="0">
-                <a:latin typeface="Consolas" panose="020B0609020204030204" pitchFamily="49" charset="0"/>
-                <a:cs typeface="Consolas" panose="020B0609020204030204" pitchFamily="49" charset="0"/>
-              </a:rPr>
-              <a:t> 16 </a:t>
-            </a:r>
-            <a:r>
-              <a:rPr lang="en-US" sz="1600" b="1" dirty="0">
-                <a:latin typeface="Consolas" panose="020B0609020204030204" pitchFamily="49" charset="0"/>
-                <a:cs typeface="Consolas" panose="020B0609020204030204" pitchFamily="49" charset="0"/>
-              </a:rPr>
-              <a:t>… -</a:t>
-            </a:r>
-            <a:r>
-              <a:rPr lang="en-US" sz="1600" b="1" dirty="0">
-                <a:latin typeface="Consolas" panose="020B0609020204030204" pitchFamily="49" charset="0"/>
-                <a:cs typeface="Consolas" panose="020B0609020204030204" pitchFamily="49" charset="0"/>
-              </a:rPr>
-              <a:t>O </a:t>
-            </a:r>
-            <a:r>
-              <a:rPr lang="en-US" sz="1600" b="1" dirty="0" err="1">
-                <a:latin typeface="Consolas" panose="020B0609020204030204" pitchFamily="49" charset="0"/>
-                <a:cs typeface="Consolas" panose="020B0609020204030204" pitchFamily="49" charset="0"/>
-              </a:rPr>
-              <a:t>dektec</a:t>
-            </a:r>
-            <a:r>
-              <a:rPr lang="en-US" sz="1600" b="1" dirty="0">
-                <a:latin typeface="Consolas" panose="020B0609020204030204" pitchFamily="49" charset="0"/>
-                <a:cs typeface="Consolas" panose="020B0609020204030204" pitchFamily="49" charset="0"/>
-              </a:rPr>
-              <a:t> </a:t>
-            </a:r>
-            <a:r>
-              <a:rPr lang="en-US" sz="1600" b="1" dirty="0">
-                <a:latin typeface="Consolas" panose="020B0609020204030204" pitchFamily="49" charset="0"/>
-                <a:cs typeface="Consolas" panose="020B0609020204030204" pitchFamily="49" charset="0"/>
-              </a:rPr>
-              <a:t>…</a:t>
+              <a:t> …</a:t>
             </a:r>
           </a:p>
         </p:txBody>
@@ -15195,7 +15086,9 @@
         </p:nvSpPr>
         <p:spPr/>
         <p:txBody>
-          <a:bodyPr/>
+          <a:bodyPr>
+            <a:normAutofit lnSpcReduction="10000"/>
+          </a:bodyPr>
           <a:lstStyle/>
           <a:p>
             <a:r>
@@ -15273,14 +15166,34 @@
           <a:p>
             <a:r>
               <a:rPr lang="en-US" dirty="0" smtClean="0"/>
-              <a:t>Binary installers</a:t>
-            </a:r>
+              <a:t>Installation</a:t>
+            </a:r>
+            <a:endParaRPr lang="en-US" dirty="0" smtClean="0"/>
           </a:p>
           <a:p>
             <a:pPr lvl="1"/>
             <a:r>
-              <a:rPr lang="en-US" dirty="0" smtClean="0"/>
-              <a:t>for Windows, Fedora, Ubuntu</a:t>
+              <a:rPr lang="en-US" dirty="0"/>
+              <a:t>p</a:t>
+            </a:r>
+            <a:r>
+              <a:rPr lang="en-US" dirty="0" smtClean="0"/>
+              <a:t>re-built binary installers for </a:t>
+            </a:r>
+            <a:r>
+              <a:rPr lang="en-US" dirty="0" smtClean="0"/>
+              <a:t>Windows, Fedora, </a:t>
+            </a:r>
+            <a:r>
+              <a:rPr lang="en-US" dirty="0" smtClean="0"/>
+              <a:t>Ubuntu</a:t>
+            </a:r>
+          </a:p>
+          <a:p>
+            <a:pPr lvl="1"/>
+            <a:r>
+              <a:rPr lang="en-US" dirty="0" smtClean="0"/>
+              <a:t>using Homebrew on macOS</a:t>
             </a:r>
             <a:endParaRPr lang="en-US" dirty="0"/>
           </a:p>

</xml_diff>

<commit_message>
Added a presentation of MPEG-TS
</commit_message>
<xml_diff>
--- a/doc/tsduck-presentation.pptx
+++ b/doc/tsduck-presentation.pptx
@@ -233,7 +233,7 @@
           <a:p>
             <a:fld id="{C55B0BA7-B0E2-4C07-8528-84B7AE1BAF72}" type="datetimeFigureOut">
               <a:rPr lang="en-US" smtClean="0"/>
-              <a:t>2018-03-14</a:t>
+              <a:t>2018-03-22</a:t>
             </a:fld>
             <a:endParaRPr lang="en-US"/>
           </a:p>
@@ -399,7 +399,7 @@
           <a:p>
             <a:fld id="{66F6DD61-880C-4F33-96A2-51E92479021F}" type="datetimeFigureOut">
               <a:rPr lang="en-US" smtClean="0"/>
-              <a:t>2018-03-14</a:t>
+              <a:t>2018-03-22</a:t>
             </a:fld>
             <a:endParaRPr lang="en-US" dirty="0"/>
           </a:p>
@@ -4998,49 +4998,6 @@
           </a:p>
         </p:txBody>
       </p:sp>
-      <p:sp>
-        <p:nvSpPr>
-          <p:cNvPr id="4" name="Slide Number Placeholder 3"/>
-          <p:cNvSpPr>
-            <a:spLocks noGrp="1"/>
-          </p:cNvSpPr>
-          <p:nvPr>
-            <p:ph type="sldNum" sz="quarter" idx="4"/>
-          </p:nvPr>
-        </p:nvSpPr>
-        <p:spPr>
-          <a:xfrm>
-            <a:off x="6569529" y="4755357"/>
-            <a:ext cx="2133600" cy="273844"/>
-          </a:xfrm>
-          <a:prstGeom prst="rect">
-            <a:avLst/>
-          </a:prstGeom>
-        </p:spPr>
-        <p:txBody>
-          <a:bodyPr vert="horz" lIns="91440" tIns="45720" rIns="91440" bIns="45720" rtlCol="0" anchor="ctr"/>
-          <a:lstStyle>
-            <a:lvl1pPr algn="r">
-              <a:defRPr sz="1400" b="0">
-                <a:solidFill>
-                  <a:schemeClr val="tx1">
-                    <a:lumMod val="50000"/>
-                    <a:lumOff val="50000"/>
-                  </a:schemeClr>
-                </a:solidFill>
-              </a:defRPr>
-            </a:lvl1pPr>
-          </a:lstStyle>
-          <a:p>
-            <a:fld id="{86017E7D-AD11-436F-AC23-AEE677ED1018}" type="slidenum">
-              <a:rPr lang="en-US" smtClean="0"/>
-              <a:pPr/>
-              <a:t>‹N°›</a:t>
-            </a:fld>
-            <a:endParaRPr lang="en-US" dirty="0"/>
-          </a:p>
-        </p:txBody>
-      </p:sp>
       <p:pic>
         <p:nvPicPr>
           <p:cNvPr id="5" name="Picture 3" descr="D:\Devel\tsduck\images\tsduck-256.png"/>
@@ -5146,6 +5103,141 @@
           <a:p>
             <a:pPr algn="ctr"/>
             <a:endParaRPr lang="en-US" dirty="0"/>
+          </a:p>
+        </p:txBody>
+      </p:sp>
+      <p:sp>
+        <p:nvSpPr>
+          <p:cNvPr id="7" name="Slide Number Placeholder 3"/>
+          <p:cNvSpPr txBox="1">
+            <a:spLocks/>
+          </p:cNvSpPr>
+          <p:nvPr userDrawn="1"/>
+        </p:nvSpPr>
+        <p:spPr>
+          <a:xfrm>
+            <a:off x="7836242" y="4868166"/>
+            <a:ext cx="1304165" cy="273844"/>
+          </a:xfrm>
+          <a:prstGeom prst="rect">
+            <a:avLst/>
+          </a:prstGeom>
+        </p:spPr>
+        <p:txBody>
+          <a:bodyPr vert="horz" lIns="91440" tIns="45720" rIns="91440" bIns="45720" rtlCol="0" anchor="ctr"/>
+          <a:lstStyle>
+            <a:defPPr>
+              <a:defRPr lang="en-US"/>
+            </a:defPPr>
+            <a:lvl1pPr marL="0" algn="r" defTabSz="914400" rtl="0" eaLnBrk="1" latinLnBrk="0" hangingPunct="1">
+              <a:defRPr sz="1400" b="0" kern="1200">
+                <a:solidFill>
+                  <a:schemeClr val="tx1">
+                    <a:lumMod val="50000"/>
+                    <a:lumOff val="50000"/>
+                  </a:schemeClr>
+                </a:solidFill>
+                <a:latin typeface="+mn-lt"/>
+                <a:ea typeface="+mn-ea"/>
+                <a:cs typeface="+mn-cs"/>
+              </a:defRPr>
+            </a:lvl1pPr>
+            <a:lvl2pPr marL="457200" algn="l" defTabSz="914400" rtl="0" eaLnBrk="1" latinLnBrk="0" hangingPunct="1">
+              <a:defRPr sz="1800" kern="1200">
+                <a:solidFill>
+                  <a:schemeClr val="tx1"/>
+                </a:solidFill>
+                <a:latin typeface="+mn-lt"/>
+                <a:ea typeface="+mn-ea"/>
+                <a:cs typeface="+mn-cs"/>
+              </a:defRPr>
+            </a:lvl2pPr>
+            <a:lvl3pPr marL="914400" algn="l" defTabSz="914400" rtl="0" eaLnBrk="1" latinLnBrk="0" hangingPunct="1">
+              <a:defRPr sz="1800" kern="1200">
+                <a:solidFill>
+                  <a:schemeClr val="tx1"/>
+                </a:solidFill>
+                <a:latin typeface="+mn-lt"/>
+                <a:ea typeface="+mn-ea"/>
+                <a:cs typeface="+mn-cs"/>
+              </a:defRPr>
+            </a:lvl3pPr>
+            <a:lvl4pPr marL="1371600" algn="l" defTabSz="914400" rtl="0" eaLnBrk="1" latinLnBrk="0" hangingPunct="1">
+              <a:defRPr sz="1800" kern="1200">
+                <a:solidFill>
+                  <a:schemeClr val="tx1"/>
+                </a:solidFill>
+                <a:latin typeface="+mn-lt"/>
+                <a:ea typeface="+mn-ea"/>
+                <a:cs typeface="+mn-cs"/>
+              </a:defRPr>
+            </a:lvl4pPr>
+            <a:lvl5pPr marL="1828800" algn="l" defTabSz="914400" rtl="0" eaLnBrk="1" latinLnBrk="0" hangingPunct="1">
+              <a:defRPr sz="1800" kern="1200">
+                <a:solidFill>
+                  <a:schemeClr val="tx1"/>
+                </a:solidFill>
+                <a:latin typeface="+mn-lt"/>
+                <a:ea typeface="+mn-ea"/>
+                <a:cs typeface="+mn-cs"/>
+              </a:defRPr>
+            </a:lvl5pPr>
+            <a:lvl6pPr marL="2286000" algn="l" defTabSz="914400" rtl="0" eaLnBrk="1" latinLnBrk="0" hangingPunct="1">
+              <a:defRPr sz="1800" kern="1200">
+                <a:solidFill>
+                  <a:schemeClr val="tx1"/>
+                </a:solidFill>
+                <a:latin typeface="+mn-lt"/>
+                <a:ea typeface="+mn-ea"/>
+                <a:cs typeface="+mn-cs"/>
+              </a:defRPr>
+            </a:lvl6pPr>
+            <a:lvl7pPr marL="2743200" algn="l" defTabSz="914400" rtl="0" eaLnBrk="1" latinLnBrk="0" hangingPunct="1">
+              <a:defRPr sz="1800" kern="1200">
+                <a:solidFill>
+                  <a:schemeClr val="tx1"/>
+                </a:solidFill>
+                <a:latin typeface="+mn-lt"/>
+                <a:ea typeface="+mn-ea"/>
+                <a:cs typeface="+mn-cs"/>
+              </a:defRPr>
+            </a:lvl7pPr>
+            <a:lvl8pPr marL="3200400" algn="l" defTabSz="914400" rtl="0" eaLnBrk="1" latinLnBrk="0" hangingPunct="1">
+              <a:defRPr sz="1800" kern="1200">
+                <a:solidFill>
+                  <a:schemeClr val="tx1"/>
+                </a:solidFill>
+                <a:latin typeface="+mn-lt"/>
+                <a:ea typeface="+mn-ea"/>
+                <a:cs typeface="+mn-cs"/>
+              </a:defRPr>
+            </a:lvl8pPr>
+            <a:lvl9pPr marL="3657600" algn="l" defTabSz="914400" rtl="0" eaLnBrk="1" latinLnBrk="0" hangingPunct="1">
+              <a:defRPr sz="1800" kern="1200">
+                <a:solidFill>
+                  <a:schemeClr val="tx1"/>
+                </a:solidFill>
+                <a:latin typeface="+mn-lt"/>
+                <a:ea typeface="+mn-ea"/>
+                <a:cs typeface="+mn-cs"/>
+              </a:defRPr>
+            </a:lvl9pPr>
+          </a:lstStyle>
+          <a:p>
+            <a:pPr algn="r"/>
+            <a:r>
+              <a:rPr lang="en-US" sz="1000" b="1" i="0" dirty="0" smtClean="0">
+                <a:solidFill>
+                  <a:srgbClr val="27AE60"/>
+                </a:solidFill>
+              </a:rPr>
+              <a:t>tsduck.github.io</a:t>
+            </a:r>
+            <a:endParaRPr lang="en-US" sz="1000" b="1" i="0" dirty="0">
+              <a:solidFill>
+                <a:srgbClr val="27AE60"/>
+              </a:solidFill>
+            </a:endParaRPr>
           </a:p>
         </p:txBody>
       </p:sp>
@@ -13972,11 +14064,7 @@
             </a:r>
             <a:r>
               <a:rPr lang="en-US" dirty="0" smtClean="0"/>
-              <a:t> : UDP/IP (unicast or multicast</a:t>
-            </a:r>
-            <a:r>
-              <a:rPr lang="en-US" dirty="0" smtClean="0"/>
-              <a:t>)</a:t>
+              <a:t> : UDP/IP (unicast or multicast)</a:t>
             </a:r>
           </a:p>
           <a:p>

</xml_diff>